<commit_message>
Updated machine learning portion. 11/3/2022
</commit_message>
<xml_diff>
--- a/Presentation/FP_Powerpoint.pptx
+++ b/Presentation/FP_Powerpoint.pptx
@@ -290,7 +290,7 @@
 <file path=ppt/revisionInfo.xml><?xml version="1.0" encoding="utf-8"?>
 <p1510:revInfo xmlns:a="http://schemas.openxmlformats.org/drawingml/2006/main" xmlns:r="http://schemas.openxmlformats.org/officeDocument/2006/relationships" xmlns:p1510="http://schemas.microsoft.com/office/powerpoint/2015/10/main">
   <p1510:revLst>
-    <p1510:client id="{90109AE8-E557-4FA6-8C74-6762FB2FC51A}" v="19" dt="2022-11-01T22:38:49.140"/>
+    <p1510:client id="{90109AE8-E557-4FA6-8C74-6762FB2FC51A}" v="24" dt="2022-11-03T12:21:11.453"/>
   </p1510:revLst>
 </p1510:revInfo>
 </file>
@@ -300,7 +300,7 @@
   <pc:docChgLst>
     <pc:chgData name="Jacqueline Carver" userId="509607fbfe7c8838" providerId="LiveId" clId="{90109AE8-E557-4FA6-8C74-6762FB2FC51A}"/>
     <pc:docChg chg="undo redo custSel delSld modSld sldOrd">
-      <pc:chgData name="Jacqueline Carver" userId="509607fbfe7c8838" providerId="LiveId" clId="{90109AE8-E557-4FA6-8C74-6762FB2FC51A}" dt="2022-11-02T21:29:06.067" v="3427" actId="20577"/>
+      <pc:chgData name="Jacqueline Carver" userId="509607fbfe7c8838" providerId="LiveId" clId="{90109AE8-E557-4FA6-8C74-6762FB2FC51A}" dt="2022-11-03T12:59:13.468" v="5611" actId="20577"/>
       <pc:docMkLst>
         <pc:docMk/>
       </pc:docMkLst>
@@ -502,7 +502,7 @@
         </pc:spChg>
       </pc:sldChg>
       <pc:sldChg chg="addSp delSp modSp mod">
-        <pc:chgData name="Jacqueline Carver" userId="509607fbfe7c8838" providerId="LiveId" clId="{90109AE8-E557-4FA6-8C74-6762FB2FC51A}" dt="2022-11-01T22:45:04.650" v="3349" actId="20577"/>
+        <pc:chgData name="Jacqueline Carver" userId="509607fbfe7c8838" providerId="LiveId" clId="{90109AE8-E557-4FA6-8C74-6762FB2FC51A}" dt="2022-11-03T12:11:39.510" v="3568" actId="20577"/>
         <pc:sldMkLst>
           <pc:docMk/>
           <pc:sldMk cId="0" sldId="260"/>
@@ -532,7 +532,7 @@
           </ac:spMkLst>
         </pc:spChg>
         <pc:spChg chg="add mod">
-          <ac:chgData name="Jacqueline Carver" userId="509607fbfe7c8838" providerId="LiveId" clId="{90109AE8-E557-4FA6-8C74-6762FB2FC51A}" dt="2022-11-01T22:25:56.330" v="3046" actId="2711"/>
+          <ac:chgData name="Jacqueline Carver" userId="509607fbfe7c8838" providerId="LiveId" clId="{90109AE8-E557-4FA6-8C74-6762FB2FC51A}" dt="2022-11-03T12:11:39.510" v="3568" actId="20577"/>
           <ac:spMkLst>
             <pc:docMk/>
             <pc:sldMk cId="0" sldId="260"/>
@@ -573,13 +573,13 @@
         </pc:spChg>
       </pc:sldChg>
       <pc:sldChg chg="addSp delSp modSp mod ord">
-        <pc:chgData name="Jacqueline Carver" userId="509607fbfe7c8838" providerId="LiveId" clId="{90109AE8-E557-4FA6-8C74-6762FB2FC51A}" dt="2022-11-02T21:27:05.120" v="3408" actId="20577"/>
+        <pc:chgData name="Jacqueline Carver" userId="509607fbfe7c8838" providerId="LiveId" clId="{90109AE8-E557-4FA6-8C74-6762FB2FC51A}" dt="2022-11-03T12:59:13.468" v="5611" actId="20577"/>
         <pc:sldMkLst>
           <pc:docMk/>
           <pc:sldMk cId="0" sldId="261"/>
         </pc:sldMkLst>
-        <pc:spChg chg="add mod">
-          <ac:chgData name="Jacqueline Carver" userId="509607fbfe7c8838" providerId="LiveId" clId="{90109AE8-E557-4FA6-8C74-6762FB2FC51A}" dt="2022-11-01T22:12:53.647" v="2848" actId="207"/>
+        <pc:spChg chg="add del mod">
+          <ac:chgData name="Jacqueline Carver" userId="509607fbfe7c8838" providerId="LiveId" clId="{90109AE8-E557-4FA6-8C74-6762FB2FC51A}" dt="2022-11-03T12:20:35.365" v="3918" actId="478"/>
           <ac:spMkLst>
             <pc:docMk/>
             <pc:sldMk cId="0" sldId="261"/>
@@ -587,7 +587,7 @@
           </ac:spMkLst>
         </pc:spChg>
         <pc:spChg chg="add mod">
-          <ac:chgData name="Jacqueline Carver" userId="509607fbfe7c8838" providerId="LiveId" clId="{90109AE8-E557-4FA6-8C74-6762FB2FC51A}" dt="2022-11-01T22:26:01.923" v="3047" actId="2711"/>
+          <ac:chgData name="Jacqueline Carver" userId="509607fbfe7c8838" providerId="LiveId" clId="{90109AE8-E557-4FA6-8C74-6762FB2FC51A}" dt="2022-11-03T12:59:13.468" v="5611" actId="20577"/>
           <ac:spMkLst>
             <pc:docMk/>
             <pc:sldMk cId="0" sldId="261"/>
@@ -595,11 +595,27 @@
           </ac:spMkLst>
         </pc:spChg>
         <pc:spChg chg="add mod">
-          <ac:chgData name="Jacqueline Carver" userId="509607fbfe7c8838" providerId="LiveId" clId="{90109AE8-E557-4FA6-8C74-6762FB2FC51A}" dt="2022-11-02T21:27:05.120" v="3408" actId="20577"/>
+          <ac:chgData name="Jacqueline Carver" userId="509607fbfe7c8838" providerId="LiveId" clId="{90109AE8-E557-4FA6-8C74-6762FB2FC51A}" dt="2022-11-03T12:55:47.708" v="5560" actId="14100"/>
           <ac:spMkLst>
             <pc:docMk/>
             <pc:sldMk cId="0" sldId="261"/>
             <ac:spMk id="4" creationId="{7781BCA2-71CC-92E7-186E-719F8EC2CBFB}"/>
+          </ac:spMkLst>
+        </pc:spChg>
+        <pc:spChg chg="add mod">
+          <ac:chgData name="Jacqueline Carver" userId="509607fbfe7c8838" providerId="LiveId" clId="{90109AE8-E557-4FA6-8C74-6762FB2FC51A}" dt="2022-11-03T12:55:52.007" v="5561" actId="14100"/>
+          <ac:spMkLst>
+            <pc:docMk/>
+            <pc:sldMk cId="0" sldId="261"/>
+            <ac:spMk id="5" creationId="{7C161DFA-049D-90F6-EA65-06C38C5C0860}"/>
+          </ac:spMkLst>
+        </pc:spChg>
+        <pc:spChg chg="add mod">
+          <ac:chgData name="Jacqueline Carver" userId="509607fbfe7c8838" providerId="LiveId" clId="{90109AE8-E557-4FA6-8C74-6762FB2FC51A}" dt="2022-11-03T12:53:53.175" v="5556" actId="1076"/>
+          <ac:spMkLst>
+            <pc:docMk/>
+            <pc:sldMk cId="0" sldId="261"/>
+            <ac:spMk id="6" creationId="{556620CE-7115-9445-DA00-A0367CB6FCDD}"/>
           </ac:spMkLst>
         </pc:spChg>
         <pc:spChg chg="mod">
@@ -32122,12 +32138,8 @@
               <a:buChar char="•"/>
             </a:pPr>
             <a:r>
-              <a:rPr lang="en-US" sz="1600" dirty="0" err="1"/>
-              <a:t>Jupyter</a:t>
-            </a:r>
-            <a:r>
               <a:rPr lang="en-US" sz="1600" dirty="0"/>
-              <a:t> notebook &amp; Excel: preprocessing and merging data</a:t>
+              <a:t>Jupyter notebook &amp; Excel: preprocessing and merging data</a:t>
             </a:r>
             <a:endParaRPr dirty="0"/>
           </a:p>
@@ -32278,15 +32290,7 @@
             </a:pPr>
             <a:r>
               <a:rPr lang="en-US" sz="1600" dirty="0"/>
-              <a:t>Linear Regression, SMOTEENN, and </a:t>
-            </a:r>
-            <a:r>
-              <a:rPr lang="en-US" sz="1600" dirty="0" err="1"/>
-              <a:t>RandomForest</a:t>
-            </a:r>
-            <a:r>
-              <a:rPr lang="en-US" sz="1600" dirty="0"/>
-              <a:t> </a:t>
+              <a:t>Linear Regression, SMOTEENN, and RandomForest </a:t>
             </a:r>
           </a:p>
           <a:p>
@@ -32308,15 +32312,7 @@
             </a:pPr>
             <a:r>
               <a:rPr lang="en-US" sz="1600" dirty="0"/>
-              <a:t>Using </a:t>
-            </a:r>
-            <a:r>
-              <a:rPr lang="en-US" sz="1600" dirty="0" err="1"/>
-              <a:t>Jupyter</a:t>
-            </a:r>
-            <a:r>
-              <a:rPr lang="en-US" sz="1600" dirty="0"/>
-              <a:t> Notebook and Google Collab</a:t>
+              <a:t>Using Jupyter Notebook and Google Collab</a:t>
             </a:r>
             <a:endParaRPr sz="1600" dirty="0"/>
           </a:p>
@@ -40799,21 +40795,7 @@
                 <a:latin typeface="Calibri" panose="020F0502020204030204" pitchFamily="34" charset="0"/>
                 <a:cs typeface="Calibri" panose="020F0502020204030204" pitchFamily="34" charset="0"/>
               </a:rPr>
-              <a:t>Using </a:t>
-            </a:r>
-            <a:r>
-              <a:rPr lang="en-US" sz="2000" dirty="0" err="1">
-                <a:latin typeface="Calibri" panose="020F0502020204030204" pitchFamily="34" charset="0"/>
-                <a:cs typeface="Calibri" panose="020F0502020204030204" pitchFamily="34" charset="0"/>
-              </a:rPr>
-              <a:t>RandomForest</a:t>
-            </a:r>
-            <a:r>
-              <a:rPr lang="en-US" sz="2000" dirty="0">
-                <a:latin typeface="Calibri" panose="020F0502020204030204" pitchFamily="34" charset="0"/>
-                <a:cs typeface="Calibri" panose="020F0502020204030204" pitchFamily="34" charset="0"/>
-              </a:rPr>
-              <a:t> &amp; Logistic Regression</a:t>
+              <a:t>Connects to machine learning through pyspark</a:t>
             </a:r>
           </a:p>
           <a:p>
@@ -40839,7 +40821,33 @@
                 <a:latin typeface="Calibri" panose="020F0502020204030204" pitchFamily="34" charset="0"/>
                 <a:cs typeface="Calibri" panose="020F0502020204030204" pitchFamily="34" charset="0"/>
               </a:rPr>
-              <a:t>Training on Costco locations</a:t>
+              <a:t>Easy to use on multiple platforms</a:t>
+            </a:r>
+          </a:p>
+          <a:p>
+            <a:pPr marL="635000" lvl="0" indent="-457200" algn="l" rtl="0">
+              <a:lnSpc>
+                <a:spcPct val="90000"/>
+              </a:lnSpc>
+              <a:spcBef>
+                <a:spcPts val="0"/>
+              </a:spcBef>
+              <a:spcAft>
+                <a:spcPts val="0"/>
+              </a:spcAft>
+              <a:buClr>
+                <a:schemeClr val="dk1"/>
+              </a:buClr>
+              <a:buSzPts val="2800"/>
+              <a:buFont typeface="Arial" panose="020B0604020202020204" pitchFamily="34" charset="0"/>
+              <a:buChar char="•"/>
+            </a:pPr>
+            <a:r>
+              <a:rPr lang="en-US" sz="2000" dirty="0">
+                <a:latin typeface="Calibri" panose="020F0502020204030204" pitchFamily="34" charset="0"/>
+                <a:cs typeface="Calibri" panose="020F0502020204030204" pitchFamily="34" charset="0"/>
+              </a:rPr>
+              <a:t>Plenty of storage space </a:t>
             </a:r>
           </a:p>
         </p:txBody>
@@ -40907,14 +40915,7 @@
                 <a:latin typeface="Calibri" panose="020F0502020204030204" pitchFamily="34" charset="0"/>
                 <a:cs typeface="Calibri" panose="020F0502020204030204" pitchFamily="34" charset="0"/>
               </a:rPr>
-              <a:t>Connecting changing data to </a:t>
-            </a:r>
-            <a:r>
-              <a:rPr lang="en-US" sz="2000">
-                <a:latin typeface="Calibri" panose="020F0502020204030204" pitchFamily="34" charset="0"/>
-                <a:cs typeface="Calibri" panose="020F0502020204030204" pitchFamily="34" charset="0"/>
-              </a:rPr>
-              <a:t>S3 Bucket</a:t>
+              <a:t>Connecting changing data to S3 Bucket</a:t>
             </a:r>
           </a:p>
         </p:txBody>
@@ -41325,10 +41326,10 @@
       </p:grpSp>
       <p:sp>
         <p:nvSpPr>
-          <p:cNvPr id="2" name="Google Shape;244;p14">
+          <p:cNvPr id="3" name="Google Shape;245;p14">
             <a:extLst>
               <a:ext uri="{FF2B5EF4-FFF2-40B4-BE49-F238E27FC236}">
-                <a16:creationId xmlns:a16="http://schemas.microsoft.com/office/drawing/2014/main" id="{D54E55B5-E688-C23C-E22C-7638A251563D}"/>
+                <a16:creationId xmlns:a16="http://schemas.microsoft.com/office/drawing/2014/main" id="{D9FEB6FC-E977-4B35-5C35-A2D5251294C5}"/>
               </a:ext>
             </a:extLst>
           </p:cNvPr>
@@ -41339,8 +41340,8 @@
         </p:nvSpPr>
         <p:spPr>
           <a:xfrm>
-            <a:off x="755650" y="3198481"/>
-            <a:ext cx="10008603" cy="906011"/>
+            <a:off x="777282" y="2924282"/>
+            <a:ext cx="10637435" cy="1413891"/>
           </a:xfrm>
           <a:prstGeom prst="rect">
             <a:avLst/>
@@ -41352,7 +41353,7 @@
         </p:spPr>
         <p:txBody>
           <a:bodyPr spcFirstLastPara="1" wrap="square" lIns="91425" tIns="45700" rIns="91425" bIns="45700" anchor="t" anchorCtr="0">
-            <a:normAutofit/>
+            <a:noAutofit/>
           </a:bodyPr>
           <a:lstStyle>
             <a:defPPr marR="0" lvl="0" algn="l" rtl="0">
@@ -41602,334 +41603,47 @@
             </a:lvl9pPr>
           </a:lstStyle>
           <a:p>
-            <a:pPr marL="228600" indent="-50800" algn="ctr">
-              <a:spcBef>
-                <a:spcPts val="0"/>
-              </a:spcBef>
-              <a:buFont typeface="Arial"/>
+            <a:pPr marL="177800" indent="0" algn="ctr">
+              <a:spcBef>
+                <a:spcPts val="0"/>
+              </a:spcBef>
               <a:buNone/>
             </a:pPr>
             <a:r>
-              <a:rPr lang="en-US" dirty="0">
+              <a:rPr lang="en-US" sz="2400" dirty="0">
                 <a:solidFill>
                   <a:schemeClr val="accent6">
                     <a:lumMod val="50000"/>
                   </a:schemeClr>
                 </a:solidFill>
-              </a:rPr>
-              <a:t>Needing a machine learning model that predicts the probability of a dependent variable. This will give a binary output.</a:t>
-            </a:r>
-          </a:p>
-        </p:txBody>
-      </p:sp>
-      <p:sp>
-        <p:nvSpPr>
-          <p:cNvPr id="3" name="Google Shape;245;p14">
-            <a:extLst>
-              <a:ext uri="{FF2B5EF4-FFF2-40B4-BE49-F238E27FC236}">
-                <a16:creationId xmlns:a16="http://schemas.microsoft.com/office/drawing/2014/main" id="{D9FEB6FC-E977-4B35-5C35-A2D5251294C5}"/>
-              </a:ext>
-            </a:extLst>
-          </p:cNvPr>
-          <p:cNvSpPr txBox="1">
-            <a:spLocks/>
-          </p:cNvSpPr>
-          <p:nvPr/>
-        </p:nvSpPr>
-        <p:spPr>
-          <a:xfrm>
-            <a:off x="438360" y="4565530"/>
-            <a:ext cx="5071288" cy="2018994"/>
-          </a:xfrm>
-          <a:prstGeom prst="rect">
-            <a:avLst/>
-          </a:prstGeom>
-          <a:noFill/>
-          <a:ln>
-            <a:noFill/>
-          </a:ln>
-        </p:spPr>
-        <p:txBody>
-          <a:bodyPr spcFirstLastPara="1" wrap="square" lIns="91425" tIns="45700" rIns="91425" bIns="45700" anchor="t" anchorCtr="0">
-            <a:normAutofit/>
-          </a:bodyPr>
-          <a:lstStyle>
-            <a:defPPr marR="0" lvl="0" algn="l" rtl="0">
-              <a:lnSpc>
-                <a:spcPct val="100000"/>
-              </a:lnSpc>
-              <a:spcBef>
-                <a:spcPts val="0"/>
-              </a:spcBef>
-              <a:spcAft>
-                <a:spcPts val="0"/>
-              </a:spcAft>
-            </a:defPPr>
-            <a:lvl1pPr marL="457200" marR="0" lvl="0" indent="-406400" algn="l" rtl="0">
-              <a:lnSpc>
-                <a:spcPct val="90000"/>
-              </a:lnSpc>
-              <a:spcBef>
-                <a:spcPts val="1000"/>
-              </a:spcBef>
-              <a:spcAft>
-                <a:spcPts val="0"/>
-              </a:spcAft>
-              <a:buClr>
-                <a:schemeClr val="dk1"/>
-              </a:buClr>
-              <a:buSzPts val="2800"/>
-              <a:buFont typeface="Arial"/>
-              <a:buChar char="•"/>
-              <a:defRPr sz="2800" b="0" i="0" u="none" strike="noStrike" cap="none">
-                <a:solidFill>
-                  <a:schemeClr val="dk1"/>
-                </a:solidFill>
-                <a:latin typeface="Calibri"/>
-                <a:ea typeface="Calibri"/>
-                <a:cs typeface="Calibri"/>
-                <a:sym typeface="Calibri"/>
-              </a:defRPr>
-            </a:lvl1pPr>
-            <a:lvl2pPr marL="914400" marR="0" lvl="1" indent="-381000" algn="l" rtl="0">
-              <a:lnSpc>
-                <a:spcPct val="90000"/>
-              </a:lnSpc>
-              <a:spcBef>
-                <a:spcPts val="500"/>
-              </a:spcBef>
-              <a:spcAft>
-                <a:spcPts val="0"/>
-              </a:spcAft>
-              <a:buClr>
-                <a:schemeClr val="dk1"/>
-              </a:buClr>
-              <a:buSzPts val="2400"/>
-              <a:buFont typeface="Arial"/>
-              <a:buChar char="•"/>
-              <a:defRPr sz="2400" b="0" i="0" u="none" strike="noStrike" cap="none">
-                <a:solidFill>
-                  <a:schemeClr val="dk1"/>
-                </a:solidFill>
-                <a:latin typeface="Calibri"/>
-                <a:ea typeface="Calibri"/>
-                <a:cs typeface="Calibri"/>
-                <a:sym typeface="Calibri"/>
-              </a:defRPr>
-            </a:lvl2pPr>
-            <a:lvl3pPr marL="1371600" marR="0" lvl="2" indent="-355600" algn="l" rtl="0">
-              <a:lnSpc>
-                <a:spcPct val="90000"/>
-              </a:lnSpc>
-              <a:spcBef>
-                <a:spcPts val="500"/>
-              </a:spcBef>
-              <a:spcAft>
-                <a:spcPts val="0"/>
-              </a:spcAft>
-              <a:buClr>
-                <a:schemeClr val="dk1"/>
-              </a:buClr>
-              <a:buSzPts val="2000"/>
-              <a:buFont typeface="Arial"/>
-              <a:buChar char="•"/>
-              <a:defRPr sz="2000" b="0" i="0" u="none" strike="noStrike" cap="none">
-                <a:solidFill>
-                  <a:schemeClr val="dk1"/>
-                </a:solidFill>
-                <a:latin typeface="Calibri"/>
-                <a:ea typeface="Calibri"/>
-                <a:cs typeface="Calibri"/>
-                <a:sym typeface="Calibri"/>
-              </a:defRPr>
-            </a:lvl3pPr>
-            <a:lvl4pPr marL="1828800" marR="0" lvl="3" indent="-342900" algn="l" rtl="0">
-              <a:lnSpc>
-                <a:spcPct val="90000"/>
-              </a:lnSpc>
-              <a:spcBef>
-                <a:spcPts val="500"/>
-              </a:spcBef>
-              <a:spcAft>
-                <a:spcPts val="0"/>
-              </a:spcAft>
-              <a:buClr>
-                <a:schemeClr val="dk1"/>
-              </a:buClr>
-              <a:buSzPts val="1800"/>
-              <a:buFont typeface="Arial"/>
-              <a:buChar char="•"/>
-              <a:defRPr sz="1800" b="0" i="0" u="none" strike="noStrike" cap="none">
-                <a:solidFill>
-                  <a:schemeClr val="dk1"/>
-                </a:solidFill>
-                <a:latin typeface="Calibri"/>
-                <a:ea typeface="Calibri"/>
-                <a:cs typeface="Calibri"/>
-                <a:sym typeface="Calibri"/>
-              </a:defRPr>
-            </a:lvl4pPr>
-            <a:lvl5pPr marL="2286000" marR="0" lvl="4" indent="-342900" algn="l" rtl="0">
-              <a:lnSpc>
-                <a:spcPct val="90000"/>
-              </a:lnSpc>
-              <a:spcBef>
-                <a:spcPts val="500"/>
-              </a:spcBef>
-              <a:spcAft>
-                <a:spcPts val="0"/>
-              </a:spcAft>
-              <a:buClr>
-                <a:schemeClr val="dk1"/>
-              </a:buClr>
-              <a:buSzPts val="1800"/>
-              <a:buFont typeface="Arial"/>
-              <a:buChar char="•"/>
-              <a:defRPr sz="1800" b="0" i="0" u="none" strike="noStrike" cap="none">
-                <a:solidFill>
-                  <a:schemeClr val="dk1"/>
-                </a:solidFill>
-                <a:latin typeface="Calibri"/>
-                <a:ea typeface="Calibri"/>
-                <a:cs typeface="Calibri"/>
-                <a:sym typeface="Calibri"/>
-              </a:defRPr>
-            </a:lvl5pPr>
-            <a:lvl6pPr marL="2743200" marR="0" lvl="5" indent="-342900" algn="l" rtl="0">
-              <a:lnSpc>
-                <a:spcPct val="90000"/>
-              </a:lnSpc>
-              <a:spcBef>
-                <a:spcPts val="500"/>
-              </a:spcBef>
-              <a:spcAft>
-                <a:spcPts val="0"/>
-              </a:spcAft>
-              <a:buClr>
-                <a:schemeClr val="dk1"/>
-              </a:buClr>
-              <a:buSzPts val="1800"/>
-              <a:buFont typeface="Arial"/>
-              <a:buChar char="•"/>
-              <a:defRPr sz="1800" b="0" i="0" u="none" strike="noStrike" cap="none">
-                <a:solidFill>
-                  <a:schemeClr val="dk1"/>
-                </a:solidFill>
-                <a:latin typeface="Calibri"/>
-                <a:ea typeface="Calibri"/>
-                <a:cs typeface="Calibri"/>
-                <a:sym typeface="Calibri"/>
-              </a:defRPr>
-            </a:lvl6pPr>
-            <a:lvl7pPr marL="3200400" marR="0" lvl="6" indent="-342900" algn="l" rtl="0">
-              <a:lnSpc>
-                <a:spcPct val="90000"/>
-              </a:lnSpc>
-              <a:spcBef>
-                <a:spcPts val="500"/>
-              </a:spcBef>
-              <a:spcAft>
-                <a:spcPts val="0"/>
-              </a:spcAft>
-              <a:buClr>
-                <a:schemeClr val="dk1"/>
-              </a:buClr>
-              <a:buSzPts val="1800"/>
-              <a:buFont typeface="Arial"/>
-              <a:buChar char="•"/>
-              <a:defRPr sz="1800" b="0" i="0" u="none" strike="noStrike" cap="none">
-                <a:solidFill>
-                  <a:schemeClr val="dk1"/>
-                </a:solidFill>
-                <a:latin typeface="Calibri"/>
-                <a:ea typeface="Calibri"/>
-                <a:cs typeface="Calibri"/>
-                <a:sym typeface="Calibri"/>
-              </a:defRPr>
-            </a:lvl7pPr>
-            <a:lvl8pPr marL="3657600" marR="0" lvl="7" indent="-342900" algn="l" rtl="0">
-              <a:lnSpc>
-                <a:spcPct val="90000"/>
-              </a:lnSpc>
-              <a:spcBef>
-                <a:spcPts val="500"/>
-              </a:spcBef>
-              <a:spcAft>
-                <a:spcPts val="0"/>
-              </a:spcAft>
-              <a:buClr>
-                <a:schemeClr val="dk1"/>
-              </a:buClr>
-              <a:buSzPts val="1800"/>
-              <a:buFont typeface="Arial"/>
-              <a:buChar char="•"/>
-              <a:defRPr sz="1800" b="0" i="0" u="none" strike="noStrike" cap="none">
-                <a:solidFill>
-                  <a:schemeClr val="dk1"/>
-                </a:solidFill>
-                <a:latin typeface="Calibri"/>
-                <a:ea typeface="Calibri"/>
-                <a:cs typeface="Calibri"/>
-                <a:sym typeface="Calibri"/>
-              </a:defRPr>
-            </a:lvl8pPr>
-            <a:lvl9pPr marL="4114800" marR="0" lvl="8" indent="-342900" algn="l" rtl="0">
-              <a:lnSpc>
-                <a:spcPct val="90000"/>
-              </a:lnSpc>
-              <a:spcBef>
-                <a:spcPts val="500"/>
-              </a:spcBef>
-              <a:spcAft>
-                <a:spcPts val="0"/>
-              </a:spcAft>
-              <a:buClr>
-                <a:schemeClr val="dk1"/>
-              </a:buClr>
-              <a:buSzPts val="1800"/>
-              <a:buFont typeface="Arial"/>
-              <a:buChar char="•"/>
-              <a:defRPr sz="1800" b="0" i="0" u="none" strike="noStrike" cap="none">
-                <a:solidFill>
-                  <a:schemeClr val="dk1"/>
-                </a:solidFill>
-                <a:latin typeface="Calibri"/>
-                <a:ea typeface="Calibri"/>
-                <a:cs typeface="Calibri"/>
-                <a:sym typeface="Calibri"/>
-              </a:defRPr>
-            </a:lvl9pPr>
-          </a:lstStyle>
-          <a:p>
-            <a:pPr marL="635000" indent="-457200">
-              <a:spcBef>
-                <a:spcPts val="0"/>
-              </a:spcBef>
-              <a:buFont typeface="Arial" panose="020B0604020202020204" pitchFamily="34" charset="0"/>
-              <a:buChar char="•"/>
-            </a:pPr>
-            <a:r>
-              <a:rPr lang="en-US" sz="2000" dirty="0">
                 <a:latin typeface="Calibri" panose="020F0502020204030204" pitchFamily="34" charset="0"/>
                 <a:cs typeface="Calibri" panose="020F0502020204030204" pitchFamily="34" charset="0"/>
               </a:rPr>
-              <a:t>A mock-up for structured and unstructured notebooks</a:t>
+              <a:t>Using competitive model structure to find the best </a:t>
             </a:r>
-          </a:p>
-          <a:p>
-            <a:pPr marL="635000" indent="-457200">
-              <a:spcBef>
-                <a:spcPts val="0"/>
-              </a:spcBef>
-              <a:buFont typeface="Arial" panose="020B0604020202020204" pitchFamily="34" charset="0"/>
-              <a:buChar char="•"/>
-            </a:pPr>
             <a:r>
-              <a:rPr lang="en-US" sz="2000" dirty="0">
+              <a:rPr lang="en-US" sz="2400">
+                <a:solidFill>
+                  <a:schemeClr val="accent6">
+                    <a:lumMod val="50000"/>
+                  </a:schemeClr>
+                </a:solidFill>
                 <a:latin typeface="Calibri" panose="020F0502020204030204" pitchFamily="34" charset="0"/>
                 <a:cs typeface="Calibri" panose="020F0502020204030204" pitchFamily="34" charset="0"/>
               </a:rPr>
-              <a:t>Using precision and recall rather than accuracy </a:t>
+              <a:t>machine learning </a:t>
+            </a:r>
+            <a:r>
+              <a:rPr lang="en-US" sz="2400" dirty="0">
+                <a:solidFill>
+                  <a:schemeClr val="accent6">
+                    <a:lumMod val="50000"/>
+                  </a:schemeClr>
+                </a:solidFill>
+                <a:latin typeface="Calibri" panose="020F0502020204030204" pitchFamily="34" charset="0"/>
+                <a:cs typeface="Calibri" panose="020F0502020204030204" pitchFamily="34" charset="0"/>
+              </a:rPr>
+              <a:t>model. Training on Costco locations to recommend where Costco should open a new location, specifically for hearing centers. Using precision and recall rather than accuracy to predict where they should have a hearing center but don’t.</a:t>
             </a:r>
           </a:p>
         </p:txBody>
@@ -41950,8 +41664,8 @@
         </p:nvSpPr>
         <p:spPr>
           <a:xfrm>
-            <a:off x="5949638" y="4565530"/>
-            <a:ext cx="5071288" cy="2018994"/>
+            <a:off x="4358023" y="4559539"/>
+            <a:ext cx="3499301" cy="2227341"/>
           </a:xfrm>
           <a:prstGeom prst="rect">
             <a:avLst/>
@@ -42213,47 +41927,446 @@
             </a:lvl9pPr>
           </a:lstStyle>
           <a:p>
-            <a:pPr marL="635000" lvl="0" indent="-457200" algn="l" rtl="0">
-              <a:lnSpc>
-                <a:spcPct val="90000"/>
-              </a:lnSpc>
-              <a:spcBef>
-                <a:spcPts val="0"/>
-              </a:spcBef>
-              <a:spcAft>
-                <a:spcPts val="0"/>
-              </a:spcAft>
-              <a:buClr>
-                <a:schemeClr val="dk1"/>
-              </a:buClr>
+            <a:pPr marL="177800" lvl="0" indent="0" algn="l" rtl="0">
+              <a:lnSpc>
+                <a:spcPct val="90000"/>
+              </a:lnSpc>
+              <a:spcBef>
+                <a:spcPts val="0"/>
+              </a:spcBef>
+              <a:spcAft>
+                <a:spcPts val="0"/>
+              </a:spcAft>
+              <a:buClr>
+                <a:schemeClr val="dk1"/>
+              </a:buClr>
+              <a:buSzPts val="2800"/>
+              <a:buNone/>
+            </a:pPr>
+            <a:r>
+              <a:rPr lang="en-US" sz="1900" dirty="0">
+                <a:latin typeface="Calibri" panose="020F0502020204030204" pitchFamily="34" charset="0"/>
+                <a:cs typeface="Calibri" panose="020F0502020204030204" pitchFamily="34" charset="0"/>
+              </a:rPr>
+              <a:t>Supervised Machine Learning:</a:t>
+            </a:r>
+          </a:p>
+          <a:p>
+            <a:pPr marL="177800" lvl="0" indent="0" algn="l" rtl="0">
+              <a:lnSpc>
+                <a:spcPct val="90000"/>
+              </a:lnSpc>
+              <a:spcBef>
+                <a:spcPts val="0"/>
+              </a:spcBef>
+              <a:spcAft>
+                <a:spcPts val="0"/>
+              </a:spcAft>
+              <a:buClr>
+                <a:schemeClr val="dk1"/>
+              </a:buClr>
+              <a:buSzPts val="2800"/>
+              <a:buNone/>
+            </a:pPr>
+            <a:r>
+              <a:rPr lang="en-US" sz="1900" i="1" u="sng" dirty="0">
+                <a:latin typeface="Calibri" panose="020F0502020204030204" pitchFamily="34" charset="0"/>
+                <a:cs typeface="Calibri" panose="020F0502020204030204" pitchFamily="34" charset="0"/>
+              </a:rPr>
+              <a:t>SMOTEENN</a:t>
+            </a:r>
+          </a:p>
+          <a:p>
+            <a:pPr marL="635000" indent="-457200">
+              <a:spcBef>
+                <a:spcPts val="0"/>
+              </a:spcBef>
+              <a:buFont typeface="Arial" panose="020B0604020202020204" pitchFamily="34" charset="0"/>
+              <a:buChar char="•"/>
+            </a:pPr>
+            <a:r>
+              <a:rPr lang="en-US" sz="1900" dirty="0">
+                <a:latin typeface="Calibri" panose="020F0502020204030204" pitchFamily="34" charset="0"/>
+                <a:cs typeface="Calibri" panose="020F0502020204030204" pitchFamily="34" charset="0"/>
+              </a:rPr>
+              <a:t>Chooses random points from training data-set to perform calculations (imbalanced classification) </a:t>
+            </a:r>
+            <a:endParaRPr lang="en-US" sz="2300" dirty="0">
+              <a:latin typeface="Calibri" panose="020F0502020204030204" pitchFamily="34" charset="0"/>
+              <a:cs typeface="Calibri" panose="020F0502020204030204" pitchFamily="34" charset="0"/>
+            </a:endParaRPr>
+          </a:p>
+          <a:p>
+            <a:pPr marL="1092200" lvl="1" indent="-457200">
+              <a:spcBef>
+                <a:spcPts val="0"/>
+              </a:spcBef>
               <a:buSzPts val="2800"/>
               <a:buFont typeface="Arial" panose="020B0604020202020204" pitchFamily="34" charset="0"/>
               <a:buChar char="•"/>
             </a:pPr>
             <a:r>
-              <a:rPr lang="en-US" sz="2000" dirty="0">
+              <a:rPr lang="en-US" sz="1600" dirty="0">
                 <a:latin typeface="Calibri" panose="020F0502020204030204" pitchFamily="34" charset="0"/>
                 <a:cs typeface="Calibri" panose="020F0502020204030204" pitchFamily="34" charset="0"/>
               </a:rPr>
-              <a:t>Using </a:t>
+              <a:t>Accuracy is</a:t>
             </a:r>
+          </a:p>
+          <a:p>
+            <a:pPr marL="177800" lvl="0" indent="0" algn="l" rtl="0">
+              <a:lnSpc>
+                <a:spcPct val="90000"/>
+              </a:lnSpc>
+              <a:spcBef>
+                <a:spcPts val="0"/>
+              </a:spcBef>
+              <a:spcAft>
+                <a:spcPts val="0"/>
+              </a:spcAft>
+              <a:buClr>
+                <a:schemeClr val="dk1"/>
+              </a:buClr>
+              <a:buSzPts val="2800"/>
+              <a:buNone/>
+            </a:pPr>
+            <a:endParaRPr lang="en-US" sz="1900" dirty="0">
+              <a:latin typeface="Calibri" panose="020F0502020204030204" pitchFamily="34" charset="0"/>
+              <a:cs typeface="Calibri" panose="020F0502020204030204" pitchFamily="34" charset="0"/>
+            </a:endParaRPr>
+          </a:p>
+        </p:txBody>
+      </p:sp>
+      <p:sp>
+        <p:nvSpPr>
+          <p:cNvPr id="5" name="Google Shape;245;p14">
+            <a:extLst>
+              <a:ext uri="{FF2B5EF4-FFF2-40B4-BE49-F238E27FC236}">
+                <a16:creationId xmlns:a16="http://schemas.microsoft.com/office/drawing/2014/main" id="{7C161DFA-049D-90F6-EA65-06C38C5C0860}"/>
+              </a:ext>
+            </a:extLst>
+          </p:cNvPr>
+          <p:cNvSpPr txBox="1">
+            <a:spLocks/>
+          </p:cNvSpPr>
+          <p:nvPr/>
+        </p:nvSpPr>
+        <p:spPr>
+          <a:xfrm>
+            <a:off x="244458" y="4510226"/>
+            <a:ext cx="4090219" cy="2276653"/>
+          </a:xfrm>
+          <a:prstGeom prst="rect">
+            <a:avLst/>
+          </a:prstGeom>
+          <a:noFill/>
+          <a:ln>
+            <a:noFill/>
+          </a:ln>
+        </p:spPr>
+        <p:txBody>
+          <a:bodyPr spcFirstLastPara="1" wrap="square" lIns="91425" tIns="45700" rIns="91425" bIns="45700" anchor="t" anchorCtr="0">
+            <a:noAutofit/>
+          </a:bodyPr>
+          <a:lstStyle>
+            <a:defPPr marR="0" lvl="0" algn="l" rtl="0">
+              <a:lnSpc>
+                <a:spcPct val="100000"/>
+              </a:lnSpc>
+              <a:spcBef>
+                <a:spcPts val="0"/>
+              </a:spcBef>
+              <a:spcAft>
+                <a:spcPts val="0"/>
+              </a:spcAft>
+            </a:defPPr>
+            <a:lvl1pPr marL="457200" marR="0" lvl="0" indent="-406400" algn="l" rtl="0">
+              <a:lnSpc>
+                <a:spcPct val="90000"/>
+              </a:lnSpc>
+              <a:spcBef>
+                <a:spcPts val="1000"/>
+              </a:spcBef>
+              <a:spcAft>
+                <a:spcPts val="0"/>
+              </a:spcAft>
+              <a:buClr>
+                <a:schemeClr val="dk1"/>
+              </a:buClr>
+              <a:buSzPts val="2800"/>
+              <a:buFont typeface="Arial"/>
+              <a:buChar char="•"/>
+              <a:defRPr sz="2800" b="0" i="0" u="none" strike="noStrike" cap="none">
+                <a:solidFill>
+                  <a:schemeClr val="dk1"/>
+                </a:solidFill>
+                <a:latin typeface="Calibri"/>
+                <a:ea typeface="Calibri"/>
+                <a:cs typeface="Calibri"/>
+                <a:sym typeface="Calibri"/>
+              </a:defRPr>
+            </a:lvl1pPr>
+            <a:lvl2pPr marL="914400" marR="0" lvl="1" indent="-381000" algn="l" rtl="0">
+              <a:lnSpc>
+                <a:spcPct val="90000"/>
+              </a:lnSpc>
+              <a:spcBef>
+                <a:spcPts val="500"/>
+              </a:spcBef>
+              <a:spcAft>
+                <a:spcPts val="0"/>
+              </a:spcAft>
+              <a:buClr>
+                <a:schemeClr val="dk1"/>
+              </a:buClr>
+              <a:buSzPts val="2400"/>
+              <a:buFont typeface="Arial"/>
+              <a:buChar char="•"/>
+              <a:defRPr sz="2400" b="0" i="0" u="none" strike="noStrike" cap="none">
+                <a:solidFill>
+                  <a:schemeClr val="dk1"/>
+                </a:solidFill>
+                <a:latin typeface="Calibri"/>
+                <a:ea typeface="Calibri"/>
+                <a:cs typeface="Calibri"/>
+                <a:sym typeface="Calibri"/>
+              </a:defRPr>
+            </a:lvl2pPr>
+            <a:lvl3pPr marL="1371600" marR="0" lvl="2" indent="-355600" algn="l" rtl="0">
+              <a:lnSpc>
+                <a:spcPct val="90000"/>
+              </a:lnSpc>
+              <a:spcBef>
+                <a:spcPts val="500"/>
+              </a:spcBef>
+              <a:spcAft>
+                <a:spcPts val="0"/>
+              </a:spcAft>
+              <a:buClr>
+                <a:schemeClr val="dk1"/>
+              </a:buClr>
+              <a:buSzPts val="2000"/>
+              <a:buFont typeface="Arial"/>
+              <a:buChar char="•"/>
+              <a:defRPr sz="2000" b="0" i="0" u="none" strike="noStrike" cap="none">
+                <a:solidFill>
+                  <a:schemeClr val="dk1"/>
+                </a:solidFill>
+                <a:latin typeface="Calibri"/>
+                <a:ea typeface="Calibri"/>
+                <a:cs typeface="Calibri"/>
+                <a:sym typeface="Calibri"/>
+              </a:defRPr>
+            </a:lvl3pPr>
+            <a:lvl4pPr marL="1828800" marR="0" lvl="3" indent="-342900" algn="l" rtl="0">
+              <a:lnSpc>
+                <a:spcPct val="90000"/>
+              </a:lnSpc>
+              <a:spcBef>
+                <a:spcPts val="500"/>
+              </a:spcBef>
+              <a:spcAft>
+                <a:spcPts val="0"/>
+              </a:spcAft>
+              <a:buClr>
+                <a:schemeClr val="dk1"/>
+              </a:buClr>
+              <a:buSzPts val="1800"/>
+              <a:buFont typeface="Arial"/>
+              <a:buChar char="•"/>
+              <a:defRPr sz="1800" b="0" i="0" u="none" strike="noStrike" cap="none">
+                <a:solidFill>
+                  <a:schemeClr val="dk1"/>
+                </a:solidFill>
+                <a:latin typeface="Calibri"/>
+                <a:ea typeface="Calibri"/>
+                <a:cs typeface="Calibri"/>
+                <a:sym typeface="Calibri"/>
+              </a:defRPr>
+            </a:lvl4pPr>
+            <a:lvl5pPr marL="2286000" marR="0" lvl="4" indent="-342900" algn="l" rtl="0">
+              <a:lnSpc>
+                <a:spcPct val="90000"/>
+              </a:lnSpc>
+              <a:spcBef>
+                <a:spcPts val="500"/>
+              </a:spcBef>
+              <a:spcAft>
+                <a:spcPts val="0"/>
+              </a:spcAft>
+              <a:buClr>
+                <a:schemeClr val="dk1"/>
+              </a:buClr>
+              <a:buSzPts val="1800"/>
+              <a:buFont typeface="Arial"/>
+              <a:buChar char="•"/>
+              <a:defRPr sz="1800" b="0" i="0" u="none" strike="noStrike" cap="none">
+                <a:solidFill>
+                  <a:schemeClr val="dk1"/>
+                </a:solidFill>
+                <a:latin typeface="Calibri"/>
+                <a:ea typeface="Calibri"/>
+                <a:cs typeface="Calibri"/>
+                <a:sym typeface="Calibri"/>
+              </a:defRPr>
+            </a:lvl5pPr>
+            <a:lvl6pPr marL="2743200" marR="0" lvl="5" indent="-342900" algn="l" rtl="0">
+              <a:lnSpc>
+                <a:spcPct val="90000"/>
+              </a:lnSpc>
+              <a:spcBef>
+                <a:spcPts val="500"/>
+              </a:spcBef>
+              <a:spcAft>
+                <a:spcPts val="0"/>
+              </a:spcAft>
+              <a:buClr>
+                <a:schemeClr val="dk1"/>
+              </a:buClr>
+              <a:buSzPts val="1800"/>
+              <a:buFont typeface="Arial"/>
+              <a:buChar char="•"/>
+              <a:defRPr sz="1800" b="0" i="0" u="none" strike="noStrike" cap="none">
+                <a:solidFill>
+                  <a:schemeClr val="dk1"/>
+                </a:solidFill>
+                <a:latin typeface="Calibri"/>
+                <a:ea typeface="Calibri"/>
+                <a:cs typeface="Calibri"/>
+                <a:sym typeface="Calibri"/>
+              </a:defRPr>
+            </a:lvl6pPr>
+            <a:lvl7pPr marL="3200400" marR="0" lvl="6" indent="-342900" algn="l" rtl="0">
+              <a:lnSpc>
+                <a:spcPct val="90000"/>
+              </a:lnSpc>
+              <a:spcBef>
+                <a:spcPts val="500"/>
+              </a:spcBef>
+              <a:spcAft>
+                <a:spcPts val="0"/>
+              </a:spcAft>
+              <a:buClr>
+                <a:schemeClr val="dk1"/>
+              </a:buClr>
+              <a:buSzPts val="1800"/>
+              <a:buFont typeface="Arial"/>
+              <a:buChar char="•"/>
+              <a:defRPr sz="1800" b="0" i="0" u="none" strike="noStrike" cap="none">
+                <a:solidFill>
+                  <a:schemeClr val="dk1"/>
+                </a:solidFill>
+                <a:latin typeface="Calibri"/>
+                <a:ea typeface="Calibri"/>
+                <a:cs typeface="Calibri"/>
+                <a:sym typeface="Calibri"/>
+              </a:defRPr>
+            </a:lvl7pPr>
+            <a:lvl8pPr marL="3657600" marR="0" lvl="7" indent="-342900" algn="l" rtl="0">
+              <a:lnSpc>
+                <a:spcPct val="90000"/>
+              </a:lnSpc>
+              <a:spcBef>
+                <a:spcPts val="500"/>
+              </a:spcBef>
+              <a:spcAft>
+                <a:spcPts val="0"/>
+              </a:spcAft>
+              <a:buClr>
+                <a:schemeClr val="dk1"/>
+              </a:buClr>
+              <a:buSzPts val="1800"/>
+              <a:buFont typeface="Arial"/>
+              <a:buChar char="•"/>
+              <a:defRPr sz="1800" b="0" i="0" u="none" strike="noStrike" cap="none">
+                <a:solidFill>
+                  <a:schemeClr val="dk1"/>
+                </a:solidFill>
+                <a:latin typeface="Calibri"/>
+                <a:ea typeface="Calibri"/>
+                <a:cs typeface="Calibri"/>
+                <a:sym typeface="Calibri"/>
+              </a:defRPr>
+            </a:lvl8pPr>
+            <a:lvl9pPr marL="4114800" marR="0" lvl="8" indent="-342900" algn="l" rtl="0">
+              <a:lnSpc>
+                <a:spcPct val="90000"/>
+              </a:lnSpc>
+              <a:spcBef>
+                <a:spcPts val="500"/>
+              </a:spcBef>
+              <a:spcAft>
+                <a:spcPts val="0"/>
+              </a:spcAft>
+              <a:buClr>
+                <a:schemeClr val="dk1"/>
+              </a:buClr>
+              <a:buSzPts val="1800"/>
+              <a:buFont typeface="Arial"/>
+              <a:buChar char="•"/>
+              <a:defRPr sz="1800" b="0" i="0" u="none" strike="noStrike" cap="none">
+                <a:solidFill>
+                  <a:schemeClr val="dk1"/>
+                </a:solidFill>
+                <a:latin typeface="Calibri"/>
+                <a:ea typeface="Calibri"/>
+                <a:cs typeface="Calibri"/>
+                <a:sym typeface="Calibri"/>
+              </a:defRPr>
+            </a:lvl9pPr>
+          </a:lstStyle>
+          <a:p>
+            <a:pPr marL="177800" lvl="0" indent="0" algn="l" rtl="0">
+              <a:lnSpc>
+                <a:spcPct val="90000"/>
+              </a:lnSpc>
+              <a:spcBef>
+                <a:spcPts val="0"/>
+              </a:spcBef>
+              <a:spcAft>
+                <a:spcPts val="0"/>
+              </a:spcAft>
+              <a:buClr>
+                <a:schemeClr val="dk1"/>
+              </a:buClr>
+              <a:buSzPts val="2800"/>
+              <a:buNone/>
+            </a:pPr>
             <a:r>
-              <a:rPr lang="en-US" sz="2000" dirty="0" err="1">
+              <a:rPr lang="en-US" sz="1900" dirty="0">
+                <a:latin typeface="Calibri" panose="020F0502020204030204" pitchFamily="34" charset="0"/>
+                <a:cs typeface="Calibri" panose="020F0502020204030204" pitchFamily="34" charset="0"/>
+              </a:rPr>
+              <a:t>Supervised Machine Learning:</a:t>
+            </a:r>
+          </a:p>
+          <a:p>
+            <a:pPr marL="177800" lvl="0" indent="0" algn="l" rtl="0">
+              <a:lnSpc>
+                <a:spcPct val="90000"/>
+              </a:lnSpc>
+              <a:spcBef>
+                <a:spcPts val="0"/>
+              </a:spcBef>
+              <a:spcAft>
+                <a:spcPts val="0"/>
+              </a:spcAft>
+              <a:buClr>
+                <a:schemeClr val="dk1"/>
+              </a:buClr>
+              <a:buSzPts val="2800"/>
+              <a:buNone/>
+            </a:pPr>
+            <a:r>
+              <a:rPr lang="en-US" sz="1900" i="1" u="sng" dirty="0">
                 <a:latin typeface="Calibri" panose="020F0502020204030204" pitchFamily="34" charset="0"/>
                 <a:cs typeface="Calibri" panose="020F0502020204030204" pitchFamily="34" charset="0"/>
               </a:rPr>
               <a:t>RandomForest</a:t>
             </a:r>
-            <a:r>
-              <a:rPr lang="en-US" sz="2000" dirty="0">
-                <a:latin typeface="Calibri" panose="020F0502020204030204" pitchFamily="34" charset="0"/>
-                <a:cs typeface="Calibri" panose="020F0502020204030204" pitchFamily="34" charset="0"/>
-              </a:rPr>
-              <a:t>, SMOTEENN, and Logistic Regression</a:t>
-            </a:r>
           </a:p>
           <a:p>
-            <a:pPr marL="635000" lvl="0" indent="-457200" algn="l" rtl="0">
+            <a:pPr marL="520700" lvl="0" indent="-342900" algn="l" rtl="0">
               <a:lnSpc>
                 <a:spcPct val="90000"/>
               </a:lnSpc>
@@ -42271,12 +42384,484 @@
               <a:buChar char="•"/>
             </a:pPr>
             <a:r>
-              <a:rPr lang="en-US" sz="2000" dirty="0">
+              <a:rPr lang="en-US" sz="1900" dirty="0">
                 <a:latin typeface="Calibri" panose="020F0502020204030204" pitchFamily="34" charset="0"/>
                 <a:cs typeface="Calibri" panose="020F0502020204030204" pitchFamily="34" charset="0"/>
               </a:rPr>
-              <a:t>Training on Costco locations</a:t>
+              <a:t>Builds decision trees on different samples</a:t>
             </a:r>
+          </a:p>
+          <a:p>
+            <a:pPr marL="520700" lvl="0" indent="-342900" algn="l" rtl="0">
+              <a:lnSpc>
+                <a:spcPct val="90000"/>
+              </a:lnSpc>
+              <a:spcBef>
+                <a:spcPts val="0"/>
+              </a:spcBef>
+              <a:spcAft>
+                <a:spcPts val="0"/>
+              </a:spcAft>
+              <a:buClr>
+                <a:schemeClr val="dk1"/>
+              </a:buClr>
+              <a:buSzPts val="2800"/>
+              <a:buFont typeface="Arial" panose="020B0604020202020204" pitchFamily="34" charset="0"/>
+              <a:buChar char="•"/>
+            </a:pPr>
+            <a:r>
+              <a:rPr lang="en-US" sz="1900" dirty="0">
+                <a:latin typeface="Calibri" panose="020F0502020204030204" pitchFamily="34" charset="0"/>
+                <a:cs typeface="Calibri" panose="020F0502020204030204" pitchFamily="34" charset="0"/>
+              </a:rPr>
+              <a:t>Calculates majority for classification</a:t>
+            </a:r>
+          </a:p>
+          <a:p>
+            <a:pPr marL="520700" lvl="0" indent="-342900" algn="l" rtl="0">
+              <a:lnSpc>
+                <a:spcPct val="90000"/>
+              </a:lnSpc>
+              <a:spcBef>
+                <a:spcPts val="0"/>
+              </a:spcBef>
+              <a:spcAft>
+                <a:spcPts val="0"/>
+              </a:spcAft>
+              <a:buClr>
+                <a:schemeClr val="dk1"/>
+              </a:buClr>
+              <a:buSzPts val="2800"/>
+              <a:buFont typeface="Arial" panose="020B0604020202020204" pitchFamily="34" charset="0"/>
+              <a:buChar char="•"/>
+            </a:pPr>
+            <a:r>
+              <a:rPr lang="en-US" sz="1900" dirty="0">
+                <a:latin typeface="Calibri" panose="020F0502020204030204" pitchFamily="34" charset="0"/>
+                <a:cs typeface="Calibri" panose="020F0502020204030204" pitchFamily="34" charset="0"/>
+              </a:rPr>
+              <a:t>Calculates average for regression</a:t>
+            </a:r>
+          </a:p>
+          <a:p>
+            <a:pPr marL="1092200" lvl="1" indent="-457200">
+              <a:spcBef>
+                <a:spcPts val="0"/>
+              </a:spcBef>
+              <a:buSzPts val="2800"/>
+              <a:buFont typeface="Arial" panose="020B0604020202020204" pitchFamily="34" charset="0"/>
+              <a:buChar char="•"/>
+            </a:pPr>
+            <a:r>
+              <a:rPr lang="en-US" sz="1600" dirty="0">
+                <a:latin typeface="Calibri" panose="020F0502020204030204" pitchFamily="34" charset="0"/>
+                <a:cs typeface="Calibri" panose="020F0502020204030204" pitchFamily="34" charset="0"/>
+              </a:rPr>
+              <a:t>Accuracy is </a:t>
+            </a:r>
+          </a:p>
+        </p:txBody>
+      </p:sp>
+      <p:sp>
+        <p:nvSpPr>
+          <p:cNvPr id="6" name="Google Shape;245;p14">
+            <a:extLst>
+              <a:ext uri="{FF2B5EF4-FFF2-40B4-BE49-F238E27FC236}">
+                <a16:creationId xmlns:a16="http://schemas.microsoft.com/office/drawing/2014/main" id="{556620CE-7115-9445-DA00-A0367CB6FCDD}"/>
+              </a:ext>
+            </a:extLst>
+          </p:cNvPr>
+          <p:cNvSpPr txBox="1">
+            <a:spLocks/>
+          </p:cNvSpPr>
+          <p:nvPr/>
+        </p:nvSpPr>
+        <p:spPr>
+          <a:xfrm>
+            <a:off x="7857324" y="4585208"/>
+            <a:ext cx="3822415" cy="2201672"/>
+          </a:xfrm>
+          <a:prstGeom prst="rect">
+            <a:avLst/>
+          </a:prstGeom>
+          <a:noFill/>
+          <a:ln>
+            <a:noFill/>
+          </a:ln>
+        </p:spPr>
+        <p:txBody>
+          <a:bodyPr spcFirstLastPara="1" wrap="square" lIns="91425" tIns="45700" rIns="91425" bIns="45700" anchor="t" anchorCtr="0">
+            <a:normAutofit/>
+          </a:bodyPr>
+          <a:lstStyle>
+            <a:defPPr marR="0" lvl="0" algn="l" rtl="0">
+              <a:lnSpc>
+                <a:spcPct val="100000"/>
+              </a:lnSpc>
+              <a:spcBef>
+                <a:spcPts val="0"/>
+              </a:spcBef>
+              <a:spcAft>
+                <a:spcPts val="0"/>
+              </a:spcAft>
+            </a:defPPr>
+            <a:lvl1pPr marL="457200" marR="0" lvl="0" indent="-406400" algn="l" rtl="0">
+              <a:lnSpc>
+                <a:spcPct val="90000"/>
+              </a:lnSpc>
+              <a:spcBef>
+                <a:spcPts val="1000"/>
+              </a:spcBef>
+              <a:spcAft>
+                <a:spcPts val="0"/>
+              </a:spcAft>
+              <a:buClr>
+                <a:schemeClr val="dk1"/>
+              </a:buClr>
+              <a:buSzPts val="2800"/>
+              <a:buFont typeface="Arial"/>
+              <a:buChar char="•"/>
+              <a:defRPr sz="2800" b="0" i="0" u="none" strike="noStrike" cap="none">
+                <a:solidFill>
+                  <a:schemeClr val="dk1"/>
+                </a:solidFill>
+                <a:latin typeface="Calibri"/>
+                <a:ea typeface="Calibri"/>
+                <a:cs typeface="Calibri"/>
+                <a:sym typeface="Calibri"/>
+              </a:defRPr>
+            </a:lvl1pPr>
+            <a:lvl2pPr marL="914400" marR="0" lvl="1" indent="-381000" algn="l" rtl="0">
+              <a:lnSpc>
+                <a:spcPct val="90000"/>
+              </a:lnSpc>
+              <a:spcBef>
+                <a:spcPts val="500"/>
+              </a:spcBef>
+              <a:spcAft>
+                <a:spcPts val="0"/>
+              </a:spcAft>
+              <a:buClr>
+                <a:schemeClr val="dk1"/>
+              </a:buClr>
+              <a:buSzPts val="2400"/>
+              <a:buFont typeface="Arial"/>
+              <a:buChar char="•"/>
+              <a:defRPr sz="2400" b="0" i="0" u="none" strike="noStrike" cap="none">
+                <a:solidFill>
+                  <a:schemeClr val="dk1"/>
+                </a:solidFill>
+                <a:latin typeface="Calibri"/>
+                <a:ea typeface="Calibri"/>
+                <a:cs typeface="Calibri"/>
+                <a:sym typeface="Calibri"/>
+              </a:defRPr>
+            </a:lvl2pPr>
+            <a:lvl3pPr marL="1371600" marR="0" lvl="2" indent="-355600" algn="l" rtl="0">
+              <a:lnSpc>
+                <a:spcPct val="90000"/>
+              </a:lnSpc>
+              <a:spcBef>
+                <a:spcPts val="500"/>
+              </a:spcBef>
+              <a:spcAft>
+                <a:spcPts val="0"/>
+              </a:spcAft>
+              <a:buClr>
+                <a:schemeClr val="dk1"/>
+              </a:buClr>
+              <a:buSzPts val="2000"/>
+              <a:buFont typeface="Arial"/>
+              <a:buChar char="•"/>
+              <a:defRPr sz="2000" b="0" i="0" u="none" strike="noStrike" cap="none">
+                <a:solidFill>
+                  <a:schemeClr val="dk1"/>
+                </a:solidFill>
+                <a:latin typeface="Calibri"/>
+                <a:ea typeface="Calibri"/>
+                <a:cs typeface="Calibri"/>
+                <a:sym typeface="Calibri"/>
+              </a:defRPr>
+            </a:lvl3pPr>
+            <a:lvl4pPr marL="1828800" marR="0" lvl="3" indent="-342900" algn="l" rtl="0">
+              <a:lnSpc>
+                <a:spcPct val="90000"/>
+              </a:lnSpc>
+              <a:spcBef>
+                <a:spcPts val="500"/>
+              </a:spcBef>
+              <a:spcAft>
+                <a:spcPts val="0"/>
+              </a:spcAft>
+              <a:buClr>
+                <a:schemeClr val="dk1"/>
+              </a:buClr>
+              <a:buSzPts val="1800"/>
+              <a:buFont typeface="Arial"/>
+              <a:buChar char="•"/>
+              <a:defRPr sz="1800" b="0" i="0" u="none" strike="noStrike" cap="none">
+                <a:solidFill>
+                  <a:schemeClr val="dk1"/>
+                </a:solidFill>
+                <a:latin typeface="Calibri"/>
+                <a:ea typeface="Calibri"/>
+                <a:cs typeface="Calibri"/>
+                <a:sym typeface="Calibri"/>
+              </a:defRPr>
+            </a:lvl4pPr>
+            <a:lvl5pPr marL="2286000" marR="0" lvl="4" indent="-342900" algn="l" rtl="0">
+              <a:lnSpc>
+                <a:spcPct val="90000"/>
+              </a:lnSpc>
+              <a:spcBef>
+                <a:spcPts val="500"/>
+              </a:spcBef>
+              <a:spcAft>
+                <a:spcPts val="0"/>
+              </a:spcAft>
+              <a:buClr>
+                <a:schemeClr val="dk1"/>
+              </a:buClr>
+              <a:buSzPts val="1800"/>
+              <a:buFont typeface="Arial"/>
+              <a:buChar char="•"/>
+              <a:defRPr sz="1800" b="0" i="0" u="none" strike="noStrike" cap="none">
+                <a:solidFill>
+                  <a:schemeClr val="dk1"/>
+                </a:solidFill>
+                <a:latin typeface="Calibri"/>
+                <a:ea typeface="Calibri"/>
+                <a:cs typeface="Calibri"/>
+                <a:sym typeface="Calibri"/>
+              </a:defRPr>
+            </a:lvl5pPr>
+            <a:lvl6pPr marL="2743200" marR="0" lvl="5" indent="-342900" algn="l" rtl="0">
+              <a:lnSpc>
+                <a:spcPct val="90000"/>
+              </a:lnSpc>
+              <a:spcBef>
+                <a:spcPts val="500"/>
+              </a:spcBef>
+              <a:spcAft>
+                <a:spcPts val="0"/>
+              </a:spcAft>
+              <a:buClr>
+                <a:schemeClr val="dk1"/>
+              </a:buClr>
+              <a:buSzPts val="1800"/>
+              <a:buFont typeface="Arial"/>
+              <a:buChar char="•"/>
+              <a:defRPr sz="1800" b="0" i="0" u="none" strike="noStrike" cap="none">
+                <a:solidFill>
+                  <a:schemeClr val="dk1"/>
+                </a:solidFill>
+                <a:latin typeface="Calibri"/>
+                <a:ea typeface="Calibri"/>
+                <a:cs typeface="Calibri"/>
+                <a:sym typeface="Calibri"/>
+              </a:defRPr>
+            </a:lvl6pPr>
+            <a:lvl7pPr marL="3200400" marR="0" lvl="6" indent="-342900" algn="l" rtl="0">
+              <a:lnSpc>
+                <a:spcPct val="90000"/>
+              </a:lnSpc>
+              <a:spcBef>
+                <a:spcPts val="500"/>
+              </a:spcBef>
+              <a:spcAft>
+                <a:spcPts val="0"/>
+              </a:spcAft>
+              <a:buClr>
+                <a:schemeClr val="dk1"/>
+              </a:buClr>
+              <a:buSzPts val="1800"/>
+              <a:buFont typeface="Arial"/>
+              <a:buChar char="•"/>
+              <a:defRPr sz="1800" b="0" i="0" u="none" strike="noStrike" cap="none">
+                <a:solidFill>
+                  <a:schemeClr val="dk1"/>
+                </a:solidFill>
+                <a:latin typeface="Calibri"/>
+                <a:ea typeface="Calibri"/>
+                <a:cs typeface="Calibri"/>
+                <a:sym typeface="Calibri"/>
+              </a:defRPr>
+            </a:lvl7pPr>
+            <a:lvl8pPr marL="3657600" marR="0" lvl="7" indent="-342900" algn="l" rtl="0">
+              <a:lnSpc>
+                <a:spcPct val="90000"/>
+              </a:lnSpc>
+              <a:spcBef>
+                <a:spcPts val="500"/>
+              </a:spcBef>
+              <a:spcAft>
+                <a:spcPts val="0"/>
+              </a:spcAft>
+              <a:buClr>
+                <a:schemeClr val="dk1"/>
+              </a:buClr>
+              <a:buSzPts val="1800"/>
+              <a:buFont typeface="Arial"/>
+              <a:buChar char="•"/>
+              <a:defRPr sz="1800" b="0" i="0" u="none" strike="noStrike" cap="none">
+                <a:solidFill>
+                  <a:schemeClr val="dk1"/>
+                </a:solidFill>
+                <a:latin typeface="Calibri"/>
+                <a:ea typeface="Calibri"/>
+                <a:cs typeface="Calibri"/>
+                <a:sym typeface="Calibri"/>
+              </a:defRPr>
+            </a:lvl8pPr>
+            <a:lvl9pPr marL="4114800" marR="0" lvl="8" indent="-342900" algn="l" rtl="0">
+              <a:lnSpc>
+                <a:spcPct val="90000"/>
+              </a:lnSpc>
+              <a:spcBef>
+                <a:spcPts val="500"/>
+              </a:spcBef>
+              <a:spcAft>
+                <a:spcPts val="0"/>
+              </a:spcAft>
+              <a:buClr>
+                <a:schemeClr val="dk1"/>
+              </a:buClr>
+              <a:buSzPts val="1800"/>
+              <a:buFont typeface="Arial"/>
+              <a:buChar char="•"/>
+              <a:defRPr sz="1800" b="0" i="0" u="none" strike="noStrike" cap="none">
+                <a:solidFill>
+                  <a:schemeClr val="dk1"/>
+                </a:solidFill>
+                <a:latin typeface="Calibri"/>
+                <a:ea typeface="Calibri"/>
+                <a:cs typeface="Calibri"/>
+                <a:sym typeface="Calibri"/>
+              </a:defRPr>
+            </a:lvl9pPr>
+          </a:lstStyle>
+          <a:p>
+            <a:pPr marL="177800" lvl="0" indent="0" algn="l" rtl="0">
+              <a:lnSpc>
+                <a:spcPct val="90000"/>
+              </a:lnSpc>
+              <a:spcBef>
+                <a:spcPts val="0"/>
+              </a:spcBef>
+              <a:spcAft>
+                <a:spcPts val="0"/>
+              </a:spcAft>
+              <a:buClr>
+                <a:schemeClr val="dk1"/>
+              </a:buClr>
+              <a:buSzPts val="2800"/>
+              <a:buNone/>
+            </a:pPr>
+            <a:r>
+              <a:rPr lang="en-US" sz="1900" dirty="0">
+                <a:latin typeface="Calibri" panose="020F0502020204030204" pitchFamily="34" charset="0"/>
+                <a:cs typeface="Calibri" panose="020F0502020204030204" pitchFamily="34" charset="0"/>
+              </a:rPr>
+              <a:t>Supervised Machine Learning:</a:t>
+            </a:r>
+          </a:p>
+          <a:p>
+            <a:pPr marL="177800" lvl="0" indent="0" algn="l" rtl="0">
+              <a:lnSpc>
+                <a:spcPct val="90000"/>
+              </a:lnSpc>
+              <a:spcBef>
+                <a:spcPts val="0"/>
+              </a:spcBef>
+              <a:spcAft>
+                <a:spcPts val="0"/>
+              </a:spcAft>
+              <a:buClr>
+                <a:schemeClr val="dk1"/>
+              </a:buClr>
+              <a:buSzPts val="2800"/>
+              <a:buNone/>
+            </a:pPr>
+            <a:r>
+              <a:rPr lang="en-US" sz="1900" i="1" u="sng" dirty="0">
+                <a:latin typeface="Calibri" panose="020F0502020204030204" pitchFamily="34" charset="0"/>
+                <a:cs typeface="Calibri" panose="020F0502020204030204" pitchFamily="34" charset="0"/>
+              </a:rPr>
+              <a:t>Logistic Regression</a:t>
+            </a:r>
+          </a:p>
+          <a:p>
+            <a:pPr marL="520700" lvl="0" indent="-342900" algn="l" rtl="0">
+              <a:lnSpc>
+                <a:spcPct val="90000"/>
+              </a:lnSpc>
+              <a:spcBef>
+                <a:spcPts val="0"/>
+              </a:spcBef>
+              <a:spcAft>
+                <a:spcPts val="0"/>
+              </a:spcAft>
+              <a:buClr>
+                <a:schemeClr val="dk1"/>
+              </a:buClr>
+              <a:buSzPts val="2800"/>
+              <a:buFont typeface="Arial" panose="020B0604020202020204" pitchFamily="34" charset="0"/>
+              <a:buChar char="•"/>
+            </a:pPr>
+            <a:r>
+              <a:rPr lang="en-US" sz="1900" dirty="0">
+                <a:latin typeface="Calibri" panose="020F0502020204030204" pitchFamily="34" charset="0"/>
+                <a:cs typeface="Calibri" panose="020F0502020204030204" pitchFamily="34" charset="0"/>
+              </a:rPr>
+              <a:t>Predicts probability of binary outcome, yes and no</a:t>
+            </a:r>
+          </a:p>
+          <a:p>
+            <a:pPr marL="520700" lvl="0" indent="-342900" algn="l" rtl="0">
+              <a:lnSpc>
+                <a:spcPct val="90000"/>
+              </a:lnSpc>
+              <a:spcBef>
+                <a:spcPts val="0"/>
+              </a:spcBef>
+              <a:spcAft>
+                <a:spcPts val="0"/>
+              </a:spcAft>
+              <a:buClr>
+                <a:schemeClr val="dk1"/>
+              </a:buClr>
+              <a:buSzPts val="2800"/>
+              <a:buFont typeface="Arial" panose="020B0604020202020204" pitchFamily="34" charset="0"/>
+              <a:buChar char="•"/>
+            </a:pPr>
+            <a:r>
+              <a:rPr lang="en-US" sz="1900" dirty="0">
+                <a:latin typeface="Calibri" panose="020F0502020204030204" pitchFamily="34" charset="0"/>
+                <a:cs typeface="Calibri" panose="020F0502020204030204" pitchFamily="34" charset="0"/>
+              </a:rPr>
+              <a:t>Observes a data set to find patterns to allow prediction</a:t>
+            </a:r>
+          </a:p>
+          <a:p>
+            <a:pPr marL="1092200" lvl="1" indent="-457200">
+              <a:spcBef>
+                <a:spcPts val="0"/>
+              </a:spcBef>
+              <a:buSzPts val="2800"/>
+              <a:buFont typeface="Arial" panose="020B0604020202020204" pitchFamily="34" charset="0"/>
+              <a:buChar char="•"/>
+            </a:pPr>
+            <a:r>
+              <a:rPr lang="en-US" sz="1600" dirty="0">
+                <a:latin typeface="Calibri" panose="020F0502020204030204" pitchFamily="34" charset="0"/>
+                <a:cs typeface="Calibri" panose="020F0502020204030204" pitchFamily="34" charset="0"/>
+              </a:rPr>
+              <a:t>Accuracy</a:t>
+            </a:r>
+            <a:endParaRPr lang="en-US" sz="1900" dirty="0">
+              <a:latin typeface="Calibri" panose="020F0502020204030204" pitchFamily="34" charset="0"/>
+              <a:cs typeface="Calibri" panose="020F0502020204030204" pitchFamily="34" charset="0"/>
+            </a:endParaRPr>
           </a:p>
         </p:txBody>
       </p:sp>

</xml_diff>

<commit_message>
Updated presentation w/ team. 11/3/2022
</commit_message>
<xml_diff>
--- a/Presentation/FP_Powerpoint.pptx
+++ b/Presentation/FP_Powerpoint.pptx
@@ -290,7 +290,7 @@
 <file path=ppt/revisionInfo.xml><?xml version="1.0" encoding="utf-8"?>
 <p1510:revInfo xmlns:a="http://schemas.openxmlformats.org/drawingml/2006/main" xmlns:r="http://schemas.openxmlformats.org/officeDocument/2006/relationships" xmlns:p1510="http://schemas.microsoft.com/office/powerpoint/2015/10/main">
   <p1510:revLst>
-    <p1510:client id="{90109AE8-E557-4FA6-8C74-6762FB2FC51A}" v="24" dt="2022-11-03T12:21:11.453"/>
+    <p1510:client id="{90109AE8-E557-4FA6-8C74-6762FB2FC51A}" v="25" dt="2022-11-03T20:14:18.386"/>
   </p1510:revLst>
 </p1510:revInfo>
 </file>
@@ -300,7 +300,7 @@
   <pc:docChgLst>
     <pc:chgData name="Jacqueline Carver" userId="509607fbfe7c8838" providerId="LiveId" clId="{90109AE8-E557-4FA6-8C74-6762FB2FC51A}"/>
     <pc:docChg chg="undo redo custSel delSld modSld sldOrd">
-      <pc:chgData name="Jacqueline Carver" userId="509607fbfe7c8838" providerId="LiveId" clId="{90109AE8-E557-4FA6-8C74-6762FB2FC51A}" dt="2022-11-03T12:59:13.468" v="5611" actId="20577"/>
+      <pc:chgData name="Jacqueline Carver" userId="509607fbfe7c8838" providerId="LiveId" clId="{90109AE8-E557-4FA6-8C74-6762FB2FC51A}" dt="2022-11-03T20:18:30.981" v="5646" actId="120"/>
       <pc:docMkLst>
         <pc:docMk/>
       </pc:docMkLst>
@@ -360,7 +360,7 @@
         </pc:spChg>
       </pc:sldChg>
       <pc:sldChg chg="addSp delSp modSp mod">
-        <pc:chgData name="Jacqueline Carver" userId="509607fbfe7c8838" providerId="LiveId" clId="{90109AE8-E557-4FA6-8C74-6762FB2FC51A}" dt="2022-11-01T22:25:31.951" v="3042" actId="2711"/>
+        <pc:chgData name="Jacqueline Carver" userId="509607fbfe7c8838" providerId="LiveId" clId="{90109AE8-E557-4FA6-8C74-6762FB2FC51A}" dt="2022-11-03T20:16:08.748" v="5635" actId="20577"/>
         <pc:sldMkLst>
           <pc:docMk/>
           <pc:sldMk cId="0" sldId="258"/>
@@ -398,7 +398,7 @@
           </ac:spMkLst>
         </pc:spChg>
         <pc:spChg chg="mod">
-          <ac:chgData name="Jacqueline Carver" userId="509607fbfe7c8838" providerId="LiveId" clId="{90109AE8-E557-4FA6-8C74-6762FB2FC51A}" dt="2022-11-01T22:25:20.263" v="3040" actId="2711"/>
+          <ac:chgData name="Jacqueline Carver" userId="509607fbfe7c8838" providerId="LiveId" clId="{90109AE8-E557-4FA6-8C74-6762FB2FC51A}" dt="2022-11-03T20:16:08.748" v="5635" actId="20577"/>
           <ac:spMkLst>
             <pc:docMk/>
             <pc:sldMk cId="0" sldId="258"/>
@@ -447,7 +447,7 @@
         </pc:picChg>
       </pc:sldChg>
       <pc:sldChg chg="addSp delSp modSp mod">
-        <pc:chgData name="Jacqueline Carver" userId="509607fbfe7c8838" providerId="LiveId" clId="{90109AE8-E557-4FA6-8C74-6762FB2FC51A}" dt="2022-11-01T22:43:46.369" v="3288" actId="207"/>
+        <pc:chgData name="Jacqueline Carver" userId="509607fbfe7c8838" providerId="LiveId" clId="{90109AE8-E557-4FA6-8C74-6762FB2FC51A}" dt="2022-11-03T20:14:39.297" v="5615" actId="20577"/>
         <pc:sldMkLst>
           <pc:docMk/>
           <pc:sldMk cId="0" sldId="259"/>
@@ -461,7 +461,7 @@
           </ac:spMkLst>
         </pc:spChg>
         <pc:spChg chg="add mod">
-          <ac:chgData name="Jacqueline Carver" userId="509607fbfe7c8838" providerId="LiveId" clId="{90109AE8-E557-4FA6-8C74-6762FB2FC51A}" dt="2022-11-01T22:29:05.860" v="3262" actId="20577"/>
+          <ac:chgData name="Jacqueline Carver" userId="509607fbfe7c8838" providerId="LiveId" clId="{90109AE8-E557-4FA6-8C74-6762FB2FC51A}" dt="2022-11-03T20:14:39.297" v="5615" actId="20577"/>
           <ac:spMkLst>
             <pc:docMk/>
             <pc:sldMk cId="0" sldId="259"/>
@@ -502,7 +502,7 @@
         </pc:spChg>
       </pc:sldChg>
       <pc:sldChg chg="addSp delSp modSp mod">
-        <pc:chgData name="Jacqueline Carver" userId="509607fbfe7c8838" providerId="LiveId" clId="{90109AE8-E557-4FA6-8C74-6762FB2FC51A}" dt="2022-11-03T12:11:39.510" v="3568" actId="20577"/>
+        <pc:chgData name="Jacqueline Carver" userId="509607fbfe7c8838" providerId="LiveId" clId="{90109AE8-E557-4FA6-8C74-6762FB2FC51A}" dt="2022-11-03T20:15:56.924" v="5634" actId="20577"/>
         <pc:sldMkLst>
           <pc:docMk/>
           <pc:sldMk cId="0" sldId="260"/>
@@ -556,7 +556,7 @@
           </ac:spMkLst>
         </pc:spChg>
         <pc:spChg chg="mod">
-          <ac:chgData name="Jacqueline Carver" userId="509607fbfe7c8838" providerId="LiveId" clId="{90109AE8-E557-4FA6-8C74-6762FB2FC51A}" dt="2022-11-01T22:43:24.878" v="3286" actId="207"/>
+          <ac:chgData name="Jacqueline Carver" userId="509607fbfe7c8838" providerId="LiveId" clId="{90109AE8-E557-4FA6-8C74-6762FB2FC51A}" dt="2022-11-03T20:15:56.924" v="5634" actId="20577"/>
           <ac:spMkLst>
             <pc:docMk/>
             <pc:sldMk cId="0" sldId="260"/>
@@ -573,7 +573,7 @@
         </pc:spChg>
       </pc:sldChg>
       <pc:sldChg chg="addSp delSp modSp mod ord">
-        <pc:chgData name="Jacqueline Carver" userId="509607fbfe7c8838" providerId="LiveId" clId="{90109AE8-E557-4FA6-8C74-6762FB2FC51A}" dt="2022-11-03T12:59:13.468" v="5611" actId="20577"/>
+        <pc:chgData name="Jacqueline Carver" userId="509607fbfe7c8838" providerId="LiveId" clId="{90109AE8-E557-4FA6-8C74-6762FB2FC51A}" dt="2022-11-03T20:18:30.981" v="5646" actId="120"/>
         <pc:sldMkLst>
           <pc:docMk/>
           <pc:sldMk cId="0" sldId="261"/>
@@ -587,7 +587,7 @@
           </ac:spMkLst>
         </pc:spChg>
         <pc:spChg chg="add mod">
-          <ac:chgData name="Jacqueline Carver" userId="509607fbfe7c8838" providerId="LiveId" clId="{90109AE8-E557-4FA6-8C74-6762FB2FC51A}" dt="2022-11-03T12:59:13.468" v="5611" actId="20577"/>
+          <ac:chgData name="Jacqueline Carver" userId="509607fbfe7c8838" providerId="LiveId" clId="{90109AE8-E557-4FA6-8C74-6762FB2FC51A}" dt="2022-11-03T20:18:30.981" v="5646" actId="120"/>
           <ac:spMkLst>
             <pc:docMk/>
             <pc:sldMk cId="0" sldId="261"/>
@@ -36962,7 +36962,7 @@
                 <a:latin typeface="Calibri" panose="020F0502020204030204" pitchFamily="34" charset="0"/>
                 <a:cs typeface="Calibri" panose="020F0502020204030204" pitchFamily="34" charset="0"/>
               </a:rPr>
-              <a:t>Legislation recently passed regarding hearing aids that will impact a large percent of the population.</a:t>
+              <a:t>Legislation recently passed regarding hearing aids that will impact a large percent of the population</a:t>
             </a:r>
             <a:endParaRPr dirty="0">
               <a:solidFill>
@@ -39995,21 +39995,7 @@
                 <a:latin typeface="Calibri" panose="020F0502020204030204" pitchFamily="34" charset="0"/>
                 <a:cs typeface="Calibri" panose="020F0502020204030204" pitchFamily="34" charset="0"/>
               </a:rPr>
-              <a:t>Using Pandas, the Python library, in </a:t>
-            </a:r>
-            <a:r>
-              <a:rPr lang="en-US" sz="2000" dirty="0" err="1">
-                <a:latin typeface="Calibri" panose="020F0502020204030204" pitchFamily="34" charset="0"/>
-                <a:cs typeface="Calibri" panose="020F0502020204030204" pitchFamily="34" charset="0"/>
-              </a:rPr>
-              <a:t>jupyter</a:t>
-            </a:r>
-            <a:r>
-              <a:rPr lang="en-US" sz="2000" dirty="0">
-                <a:latin typeface="Calibri" panose="020F0502020204030204" pitchFamily="34" charset="0"/>
-                <a:cs typeface="Calibri" panose="020F0502020204030204" pitchFamily="34" charset="0"/>
-              </a:rPr>
-              <a:t> notebook</a:t>
+              <a:t>Using Pandas, the Python library, in Jupyter Notebook</a:t>
             </a:r>
           </a:p>
           <a:p>
@@ -40305,7 +40291,7 @@
                 <a:latin typeface="Calibri" panose="020F0502020204030204" pitchFamily="34" charset="0"/>
                 <a:cs typeface="Calibri" panose="020F0502020204030204" pitchFamily="34" charset="0"/>
               </a:rPr>
-              <a:t>S3 Bucket, an Amazon Web Service application</a:t>
+              <a:t>S3 Bucket, an Amazon Web Service application for data storage</a:t>
             </a:r>
           </a:p>
           <a:p>
@@ -41603,7 +41589,7 @@
             </a:lvl9pPr>
           </a:lstStyle>
           <a:p>
-            <a:pPr marL="177800" indent="0" algn="ctr">
+            <a:pPr marL="177800" indent="0">
               <a:spcBef>
                 <a:spcPts val="0"/>
               </a:spcBef>
@@ -41619,20 +41605,16 @@
                 <a:latin typeface="Calibri" panose="020F0502020204030204" pitchFamily="34" charset="0"/>
                 <a:cs typeface="Calibri" panose="020F0502020204030204" pitchFamily="34" charset="0"/>
               </a:rPr>
-              <a:t>Using competitive model structure to find the best </a:t>
+              <a:t>Using competitive model structure and training on Costco locations to recommend where Costco should open a new location, specifically for hearing centers. </a:t>
             </a:r>
-            <a:r>
-              <a:rPr lang="en-US" sz="2400">
-                <a:solidFill>
-                  <a:schemeClr val="accent6">
-                    <a:lumMod val="50000"/>
-                  </a:schemeClr>
-                </a:solidFill>
-                <a:latin typeface="Calibri" panose="020F0502020204030204" pitchFamily="34" charset="0"/>
-                <a:cs typeface="Calibri" panose="020F0502020204030204" pitchFamily="34" charset="0"/>
-              </a:rPr>
-              <a:t>machine learning </a:t>
-            </a:r>
+          </a:p>
+          <a:p>
+            <a:pPr marL="177800" indent="0">
+              <a:spcBef>
+                <a:spcPts val="0"/>
+              </a:spcBef>
+              <a:buNone/>
+            </a:pPr>
             <a:r>
               <a:rPr lang="en-US" sz="2400" dirty="0">
                 <a:solidFill>
@@ -41643,7 +41625,7 @@
                 <a:latin typeface="Calibri" panose="020F0502020204030204" pitchFamily="34" charset="0"/>
                 <a:cs typeface="Calibri" panose="020F0502020204030204" pitchFamily="34" charset="0"/>
               </a:rPr>
-              <a:t>model. Training on Costco locations to recommend where Costco should open a new location, specifically for hearing centers. Using precision and recall rather than accuracy to predict where they should have a hearing center but don’t.</a:t>
+              <a:t>Using precision and recall rather than accuracy to predict where they should have a hearing center but don’t.</a:t>
             </a:r>
           </a:p>
         </p:txBody>

</xml_diff>

<commit_message>
Updating Readme and Visualization (#3)
* Updated powerpoint. 11/2/2022

* Updating Visualization. 11/2/2022

* Updating data files. 11/2/2022

* Added SMOTEENN into Readme. 11/2/2022

* Updated machine learning portion. 11/3/2022

* Update README.md

* Updated presentation w/ team. 11/3/2022

* Updated pipeline. 11/3/2022

Removing "misspelled" red squiggle under jupyter and randomforest.

* Updating HTML. 11/3/2022
</commit_message>
<xml_diff>
--- a/Presentation/FP_Powerpoint.pptx
+++ b/Presentation/FP_Powerpoint.pptx
@@ -290,7 +290,7 @@
 <file path=ppt/revisionInfo.xml><?xml version="1.0" encoding="utf-8"?>
 <p1510:revInfo xmlns:a="http://schemas.openxmlformats.org/drawingml/2006/main" xmlns:r="http://schemas.openxmlformats.org/officeDocument/2006/relationships" xmlns:p1510="http://schemas.microsoft.com/office/powerpoint/2015/10/main">
   <p1510:revLst>
-    <p1510:client id="{90109AE8-E557-4FA6-8C74-6762FB2FC51A}" v="8" dt="2022-10-28T15:51:26.294"/>
+    <p1510:client id="{90109AE8-E557-4FA6-8C74-6762FB2FC51A}" v="25" dt="2022-11-03T20:14:18.386"/>
   </p1510:revLst>
 </p1510:revInfo>
 </file>
@@ -299,19 +299,51 @@
 <pc:chgInfo xmlns:a="http://schemas.openxmlformats.org/drawingml/2006/main" xmlns:r="http://schemas.openxmlformats.org/officeDocument/2006/relationships" xmlns:ac="http://schemas.microsoft.com/office/drawing/2013/main/command" xmlns:pc="http://schemas.microsoft.com/office/powerpoint/2013/main/command">
   <pc:docChgLst>
     <pc:chgData name="Jacqueline Carver" userId="509607fbfe7c8838" providerId="LiveId" clId="{90109AE8-E557-4FA6-8C74-6762FB2FC51A}"/>
-    <pc:docChg chg="undo redo custSel delSld modSld">
-      <pc:chgData name="Jacqueline Carver" userId="509607fbfe7c8838" providerId="LiveId" clId="{90109AE8-E557-4FA6-8C74-6762FB2FC51A}" dt="2022-10-28T15:51:53.281" v="1744" actId="1076"/>
+    <pc:docChg chg="undo redo custSel delSld modSld sldOrd">
+      <pc:chgData name="Jacqueline Carver" userId="509607fbfe7c8838" providerId="LiveId" clId="{90109AE8-E557-4FA6-8C74-6762FB2FC51A}" dt="2022-11-03T20:18:30.981" v="5646" actId="120"/>
       <pc:docMkLst>
         <pc:docMk/>
       </pc:docMkLst>
       <pc:sldChg chg="modSp mod">
-        <pc:chgData name="Jacqueline Carver" userId="509607fbfe7c8838" providerId="LiveId" clId="{90109AE8-E557-4FA6-8C74-6762FB2FC51A}" dt="2022-10-28T14:51:58.174" v="50" actId="20577"/>
+        <pc:chgData name="Jacqueline Carver" userId="509607fbfe7c8838" providerId="LiveId" clId="{90109AE8-E557-4FA6-8C74-6762FB2FC51A}" dt="2022-11-02T21:24:16.720" v="3389" actId="20577"/>
         <pc:sldMkLst>
           <pc:docMk/>
           <pc:sldMk cId="0" sldId="257"/>
         </pc:sldMkLst>
         <pc:spChg chg="mod">
-          <ac:chgData name="Jacqueline Carver" userId="509607fbfe7c8838" providerId="LiveId" clId="{90109AE8-E557-4FA6-8C74-6762FB2FC51A}" dt="2022-10-28T14:50:48.676" v="25" actId="20577"/>
+          <ac:chgData name="Jacqueline Carver" userId="509607fbfe7c8838" providerId="LiveId" clId="{90109AE8-E557-4FA6-8C74-6762FB2FC51A}" dt="2022-11-01T22:10:57.886" v="2794" actId="108"/>
+          <ac:spMkLst>
+            <pc:docMk/>
+            <pc:sldMk cId="0" sldId="257"/>
+            <ac:spMk id="200" creationId="{00000000-0000-0000-0000-000000000000}"/>
+          </ac:spMkLst>
+        </pc:spChg>
+        <pc:spChg chg="mod">
+          <ac:chgData name="Jacqueline Carver" userId="509607fbfe7c8838" providerId="LiveId" clId="{90109AE8-E557-4FA6-8C74-6762FB2FC51A}" dt="2022-11-01T20:18:26.405" v="2106" actId="1076"/>
+          <ac:spMkLst>
+            <pc:docMk/>
+            <pc:sldMk cId="0" sldId="257"/>
+            <ac:spMk id="201" creationId="{00000000-0000-0000-0000-000000000000}"/>
+          </ac:spMkLst>
+        </pc:spChg>
+        <pc:spChg chg="mod">
+          <ac:chgData name="Jacqueline Carver" userId="509607fbfe7c8838" providerId="LiveId" clId="{90109AE8-E557-4FA6-8C74-6762FB2FC51A}" dt="2022-11-01T20:15:39.071" v="2074"/>
+          <ac:spMkLst>
+            <pc:docMk/>
+            <pc:sldMk cId="0" sldId="257"/>
+            <ac:spMk id="202" creationId="{00000000-0000-0000-0000-000000000000}"/>
+          </ac:spMkLst>
+        </pc:spChg>
+        <pc:spChg chg="mod">
+          <ac:chgData name="Jacqueline Carver" userId="509607fbfe7c8838" providerId="LiveId" clId="{90109AE8-E557-4FA6-8C74-6762FB2FC51A}" dt="2022-11-01T20:14:18.262" v="2055" actId="20577"/>
+          <ac:spMkLst>
+            <pc:docMk/>
+            <pc:sldMk cId="0" sldId="257"/>
+            <ac:spMk id="203" creationId="{00000000-0000-0000-0000-000000000000}"/>
+          </ac:spMkLst>
+        </pc:spChg>
+        <pc:spChg chg="mod">
+          <ac:chgData name="Jacqueline Carver" userId="509607fbfe7c8838" providerId="LiveId" clId="{90109AE8-E557-4FA6-8C74-6762FB2FC51A}" dt="2022-11-01T22:11:13.251" v="2821" actId="20577"/>
           <ac:spMkLst>
             <pc:docMk/>
             <pc:sldMk cId="0" sldId="257"/>
@@ -319,7 +351,7 @@
           </ac:spMkLst>
         </pc:spChg>
         <pc:spChg chg="mod">
-          <ac:chgData name="Jacqueline Carver" userId="509607fbfe7c8838" providerId="LiveId" clId="{90109AE8-E557-4FA6-8C74-6762FB2FC51A}" dt="2022-10-28T14:51:58.174" v="50" actId="20577"/>
+          <ac:chgData name="Jacqueline Carver" userId="509607fbfe7c8838" providerId="LiveId" clId="{90109AE8-E557-4FA6-8C74-6762FB2FC51A}" dt="2022-11-02T21:24:16.720" v="3389" actId="20577"/>
           <ac:spMkLst>
             <pc:docMk/>
             <pc:sldMk cId="0" sldId="257"/>
@@ -328,13 +360,21 @@
         </pc:spChg>
       </pc:sldChg>
       <pc:sldChg chg="addSp delSp modSp mod">
-        <pc:chgData name="Jacqueline Carver" userId="509607fbfe7c8838" providerId="LiveId" clId="{90109AE8-E557-4FA6-8C74-6762FB2FC51A}" dt="2022-10-28T15:19:14.538" v="796" actId="207"/>
+        <pc:chgData name="Jacqueline Carver" userId="509607fbfe7c8838" providerId="LiveId" clId="{90109AE8-E557-4FA6-8C74-6762FB2FC51A}" dt="2022-11-03T20:16:08.748" v="5635" actId="20577"/>
         <pc:sldMkLst>
           <pc:docMk/>
           <pc:sldMk cId="0" sldId="258"/>
         </pc:sldMkLst>
         <pc:spChg chg="add mod">
-          <ac:chgData name="Jacqueline Carver" userId="509607fbfe7c8838" providerId="LiveId" clId="{90109AE8-E557-4FA6-8C74-6762FB2FC51A}" dt="2022-10-28T15:19:08.626" v="795" actId="207"/>
+          <ac:chgData name="Jacqueline Carver" userId="509607fbfe7c8838" providerId="LiveId" clId="{90109AE8-E557-4FA6-8C74-6762FB2FC51A}" dt="2022-11-01T22:25:26.024" v="3041" actId="2711"/>
+          <ac:spMkLst>
+            <pc:docMk/>
+            <pc:sldMk cId="0" sldId="258"/>
+            <ac:spMk id="2" creationId="{076E11CC-1B19-64B7-F1DC-E221DEA8BF3E}"/>
+          </ac:spMkLst>
+        </pc:spChg>
+        <pc:spChg chg="add mod">
+          <ac:chgData name="Jacqueline Carver" userId="509607fbfe7c8838" providerId="LiveId" clId="{90109AE8-E557-4FA6-8C74-6762FB2FC51A}" dt="2022-11-01T22:25:14.312" v="3039" actId="2711"/>
           <ac:spMkLst>
             <pc:docMk/>
             <pc:sldMk cId="0" sldId="258"/>
@@ -349,8 +389,8 @@
             <ac:spMk id="10" creationId="{055A6D67-D98A-F0C9-2936-1EBA5672ACBA}"/>
           </ac:spMkLst>
         </pc:spChg>
-        <pc:spChg chg="add mod">
-          <ac:chgData name="Jacqueline Carver" userId="509607fbfe7c8838" providerId="LiveId" clId="{90109AE8-E557-4FA6-8C74-6762FB2FC51A}" dt="2022-10-28T15:15:03.752" v="767" actId="20577"/>
+        <pc:spChg chg="add del mod">
+          <ac:chgData name="Jacqueline Carver" userId="509607fbfe7c8838" providerId="LiveId" clId="{90109AE8-E557-4FA6-8C74-6762FB2FC51A}" dt="2022-11-01T22:15:20.056" v="2870" actId="478"/>
           <ac:spMkLst>
             <pc:docMk/>
             <pc:sldMk cId="0" sldId="258"/>
@@ -358,7 +398,7 @@
           </ac:spMkLst>
         </pc:spChg>
         <pc:spChg chg="mod">
-          <ac:chgData name="Jacqueline Carver" userId="509607fbfe7c8838" providerId="LiveId" clId="{90109AE8-E557-4FA6-8C74-6762FB2FC51A}" dt="2022-10-28T15:19:14.538" v="796" actId="207"/>
+          <ac:chgData name="Jacqueline Carver" userId="509607fbfe7c8838" providerId="LiveId" clId="{90109AE8-E557-4FA6-8C74-6762FB2FC51A}" dt="2022-11-03T20:16:08.748" v="5635" actId="20577"/>
           <ac:spMkLst>
             <pc:docMk/>
             <pc:sldMk cId="0" sldId="258"/>
@@ -366,7 +406,7 @@
           </ac:spMkLst>
         </pc:spChg>
         <pc:spChg chg="mod">
-          <ac:chgData name="Jacqueline Carver" userId="509607fbfe7c8838" providerId="LiveId" clId="{90109AE8-E557-4FA6-8C74-6762FB2FC51A}" dt="2022-10-28T15:15:10.296" v="769" actId="5793"/>
+          <ac:chgData name="Jacqueline Carver" userId="509607fbfe7c8838" providerId="LiveId" clId="{90109AE8-E557-4FA6-8C74-6762FB2FC51A}" dt="2022-11-01T22:25:31.951" v="3042" actId="2711"/>
           <ac:spMkLst>
             <pc:docMk/>
             <pc:sldMk cId="0" sldId="258"/>
@@ -406,14 +446,14 @@
           </ac:picMkLst>
         </pc:picChg>
       </pc:sldChg>
-      <pc:sldChg chg="addSp modSp mod">
-        <pc:chgData name="Jacqueline Carver" userId="509607fbfe7c8838" providerId="LiveId" clId="{90109AE8-E557-4FA6-8C74-6762FB2FC51A}" dt="2022-10-28T15:36:23.136" v="1284" actId="20577"/>
+      <pc:sldChg chg="addSp delSp modSp mod">
+        <pc:chgData name="Jacqueline Carver" userId="509607fbfe7c8838" providerId="LiveId" clId="{90109AE8-E557-4FA6-8C74-6762FB2FC51A}" dt="2022-11-03T20:14:39.297" v="5615" actId="20577"/>
         <pc:sldMkLst>
           <pc:docMk/>
           <pc:sldMk cId="0" sldId="259"/>
         </pc:sldMkLst>
-        <pc:spChg chg="add mod">
-          <ac:chgData name="Jacqueline Carver" userId="509607fbfe7c8838" providerId="LiveId" clId="{90109AE8-E557-4FA6-8C74-6762FB2FC51A}" dt="2022-10-28T15:18:55.607" v="793" actId="207"/>
+        <pc:spChg chg="add del mod">
+          <ac:chgData name="Jacqueline Carver" userId="509607fbfe7c8838" providerId="LiveId" clId="{90109AE8-E557-4FA6-8C74-6762FB2FC51A}" dt="2022-11-01T22:11:35.189" v="2822" actId="478"/>
           <ac:spMkLst>
             <pc:docMk/>
             <pc:sldMk cId="0" sldId="259"/>
@@ -421,7 +461,7 @@
           </ac:spMkLst>
         </pc:spChg>
         <pc:spChg chg="add mod">
-          <ac:chgData name="Jacqueline Carver" userId="509607fbfe7c8838" providerId="LiveId" clId="{90109AE8-E557-4FA6-8C74-6762FB2FC51A}" dt="2022-10-28T15:31:33.275" v="1133" actId="14100"/>
+          <ac:chgData name="Jacqueline Carver" userId="509607fbfe7c8838" providerId="LiveId" clId="{90109AE8-E557-4FA6-8C74-6762FB2FC51A}" dt="2022-11-03T20:14:39.297" v="5615" actId="20577"/>
           <ac:spMkLst>
             <pc:docMk/>
             <pc:sldMk cId="0" sldId="259"/>
@@ -429,7 +469,7 @@
           </ac:spMkLst>
         </pc:spChg>
         <pc:spChg chg="add mod">
-          <ac:chgData name="Jacqueline Carver" userId="509607fbfe7c8838" providerId="LiveId" clId="{90109AE8-E557-4FA6-8C74-6762FB2FC51A}" dt="2022-10-28T15:36:23.136" v="1284" actId="20577"/>
+          <ac:chgData name="Jacqueline Carver" userId="509607fbfe7c8838" providerId="LiveId" clId="{90109AE8-E557-4FA6-8C74-6762FB2FC51A}" dt="2022-11-01T22:28:28.276" v="3188" actId="20577"/>
           <ac:spMkLst>
             <pc:docMk/>
             <pc:sldMk cId="0" sldId="259"/>
@@ -437,7 +477,15 @@
           </ac:spMkLst>
         </pc:spChg>
         <pc:spChg chg="mod">
-          <ac:chgData name="Jacqueline Carver" userId="509607fbfe7c8838" providerId="LiveId" clId="{90109AE8-E557-4FA6-8C74-6762FB2FC51A}" dt="2022-10-28T15:33:20.053" v="1138" actId="207"/>
+          <ac:chgData name="Jacqueline Carver" userId="509607fbfe7c8838" providerId="LiveId" clId="{90109AE8-E557-4FA6-8C74-6762FB2FC51A}" dt="2022-11-01T21:03:28.684" v="2748" actId="27636"/>
+          <ac:spMkLst>
+            <pc:docMk/>
+            <pc:sldMk cId="0" sldId="259"/>
+            <ac:spMk id="235" creationId="{00000000-0000-0000-0000-000000000000}"/>
+          </ac:spMkLst>
+        </pc:spChg>
+        <pc:spChg chg="mod">
+          <ac:chgData name="Jacqueline Carver" userId="509607fbfe7c8838" providerId="LiveId" clId="{90109AE8-E557-4FA6-8C74-6762FB2FC51A}" dt="2022-11-01T22:43:41.434" v="3287" actId="207"/>
           <ac:spMkLst>
             <pc:docMk/>
             <pc:sldMk cId="0" sldId="259"/>
@@ -445,7 +493,7 @@
           </ac:spMkLst>
         </pc:spChg>
         <pc:spChg chg="mod">
-          <ac:chgData name="Jacqueline Carver" userId="509607fbfe7c8838" providerId="LiveId" clId="{90109AE8-E557-4FA6-8C74-6762FB2FC51A}" dt="2022-10-28T15:33:25.184" v="1139" actId="207"/>
+          <ac:chgData name="Jacqueline Carver" userId="509607fbfe7c8838" providerId="LiveId" clId="{90109AE8-E557-4FA6-8C74-6762FB2FC51A}" dt="2022-11-01T22:43:46.369" v="3288" actId="207"/>
           <ac:spMkLst>
             <pc:docMk/>
             <pc:sldMk cId="0" sldId="259"/>
@@ -454,17 +502,25 @@
         </pc:spChg>
       </pc:sldChg>
       <pc:sldChg chg="addSp delSp modSp mod">
-        <pc:chgData name="Jacqueline Carver" userId="509607fbfe7c8838" providerId="LiveId" clId="{90109AE8-E557-4FA6-8C74-6762FB2FC51A}" dt="2022-10-28T15:51:53.281" v="1744" actId="1076"/>
+        <pc:chgData name="Jacqueline Carver" userId="509607fbfe7c8838" providerId="LiveId" clId="{90109AE8-E557-4FA6-8C74-6762FB2FC51A}" dt="2022-11-03T20:15:56.924" v="5634" actId="20577"/>
         <pc:sldMkLst>
           <pc:docMk/>
           <pc:sldMk cId="0" sldId="260"/>
         </pc:sldMkLst>
-        <pc:spChg chg="add mod">
-          <ac:chgData name="Jacqueline Carver" userId="509607fbfe7c8838" providerId="LiveId" clId="{90109AE8-E557-4FA6-8C74-6762FB2FC51A}" dt="2022-10-28T15:37:45.548" v="1311" actId="207"/>
+        <pc:spChg chg="add del mod">
+          <ac:chgData name="Jacqueline Carver" userId="509607fbfe7c8838" providerId="LiveId" clId="{90109AE8-E557-4FA6-8C74-6762FB2FC51A}" dt="2022-11-01T20:57:12.348" v="2682" actId="478"/>
           <ac:spMkLst>
             <pc:docMk/>
             <pc:sldMk cId="0" sldId="260"/>
             <ac:spMk id="2" creationId="{B775C4FD-D7C6-D70D-8742-1597D1982275}"/>
+          </ac:spMkLst>
+        </pc:spChg>
+        <pc:spChg chg="add mod">
+          <ac:chgData name="Jacqueline Carver" userId="509607fbfe7c8838" providerId="LiveId" clId="{90109AE8-E557-4FA6-8C74-6762FB2FC51A}" dt="2022-11-01T22:45:04.650" v="3349" actId="20577"/>
+          <ac:spMkLst>
+            <pc:docMk/>
+            <pc:sldMk cId="0" sldId="260"/>
+            <ac:spMk id="3" creationId="{7986D3D4-A0AF-21F3-579E-ED9916B19DFC}"/>
           </ac:spMkLst>
         </pc:spChg>
         <pc:spChg chg="add del mod">
@@ -476,15 +532,23 @@
           </ac:spMkLst>
         </pc:spChg>
         <pc:spChg chg="add mod">
-          <ac:chgData name="Jacqueline Carver" userId="509607fbfe7c8838" providerId="LiveId" clId="{90109AE8-E557-4FA6-8C74-6762FB2FC51A}" dt="2022-10-28T15:51:43.720" v="1741" actId="1076"/>
+          <ac:chgData name="Jacqueline Carver" userId="509607fbfe7c8838" providerId="LiveId" clId="{90109AE8-E557-4FA6-8C74-6762FB2FC51A}" dt="2022-11-03T12:11:39.510" v="3568" actId="20577"/>
           <ac:spMkLst>
             <pc:docMk/>
             <pc:sldMk cId="0" sldId="260"/>
             <ac:spMk id="4" creationId="{D2331EC8-9749-C98C-BA61-ADE43FDECBD8}"/>
           </ac:spMkLst>
         </pc:spChg>
+        <pc:spChg chg="add del mod">
+          <ac:chgData name="Jacqueline Carver" userId="509607fbfe7c8838" providerId="LiveId" clId="{90109AE8-E557-4FA6-8C74-6762FB2FC51A}" dt="2022-11-01T22:17:15.849" v="2894" actId="478"/>
+          <ac:spMkLst>
+            <pc:docMk/>
+            <pc:sldMk cId="0" sldId="260"/>
+            <ac:spMk id="6" creationId="{884F12DF-818D-73A7-F7D6-F2570EDFD36E}"/>
+          </ac:spMkLst>
+        </pc:spChg>
         <pc:spChg chg="mod">
-          <ac:chgData name="Jacqueline Carver" userId="509607fbfe7c8838" providerId="LiveId" clId="{90109AE8-E557-4FA6-8C74-6762FB2FC51A}" dt="2022-10-28T15:37:08.284" v="1285" actId="14100"/>
+          <ac:chgData name="Jacqueline Carver" userId="509607fbfe7c8838" providerId="LiveId" clId="{90109AE8-E557-4FA6-8C74-6762FB2FC51A}" dt="2022-11-01T22:16:12.826" v="2889" actId="20577"/>
           <ac:spMkLst>
             <pc:docMk/>
             <pc:sldMk cId="0" sldId="260"/>
@@ -492,19 +556,160 @@
           </ac:spMkLst>
         </pc:spChg>
         <pc:spChg chg="mod">
-          <ac:chgData name="Jacqueline Carver" userId="509607fbfe7c8838" providerId="LiveId" clId="{90109AE8-E557-4FA6-8C74-6762FB2FC51A}" dt="2022-10-28T15:41:15.824" v="1511" actId="20577"/>
+          <ac:chgData name="Jacqueline Carver" userId="509607fbfe7c8838" providerId="LiveId" clId="{90109AE8-E557-4FA6-8C74-6762FB2FC51A}" dt="2022-11-03T20:15:56.924" v="5634" actId="20577"/>
           <ac:spMkLst>
             <pc:docMk/>
             <pc:sldMk cId="0" sldId="260"/>
             <ac:spMk id="244" creationId="{00000000-0000-0000-0000-000000000000}"/>
           </ac:spMkLst>
         </pc:spChg>
-        <pc:spChg chg="mod">
-          <ac:chgData name="Jacqueline Carver" userId="509607fbfe7c8838" providerId="LiveId" clId="{90109AE8-E557-4FA6-8C74-6762FB2FC51A}" dt="2022-10-28T15:51:53.281" v="1744" actId="1076"/>
+        <pc:spChg chg="del mod">
+          <ac:chgData name="Jacqueline Carver" userId="509607fbfe7c8838" providerId="LiveId" clId="{90109AE8-E557-4FA6-8C74-6762FB2FC51A}" dt="2022-11-01T22:17:08.385" v="2892" actId="478"/>
           <ac:spMkLst>
             <pc:docMk/>
             <pc:sldMk cId="0" sldId="260"/>
             <ac:spMk id="245" creationId="{00000000-0000-0000-0000-000000000000}"/>
+          </ac:spMkLst>
+        </pc:spChg>
+      </pc:sldChg>
+      <pc:sldChg chg="addSp delSp modSp mod ord">
+        <pc:chgData name="Jacqueline Carver" userId="509607fbfe7c8838" providerId="LiveId" clId="{90109AE8-E557-4FA6-8C74-6762FB2FC51A}" dt="2022-11-03T20:18:30.981" v="5646" actId="120"/>
+        <pc:sldMkLst>
+          <pc:docMk/>
+          <pc:sldMk cId="0" sldId="261"/>
+        </pc:sldMkLst>
+        <pc:spChg chg="add del mod">
+          <ac:chgData name="Jacqueline Carver" userId="509607fbfe7c8838" providerId="LiveId" clId="{90109AE8-E557-4FA6-8C74-6762FB2FC51A}" dt="2022-11-03T12:20:35.365" v="3918" actId="478"/>
+          <ac:spMkLst>
+            <pc:docMk/>
+            <pc:sldMk cId="0" sldId="261"/>
+            <ac:spMk id="2" creationId="{D54E55B5-E688-C23C-E22C-7638A251563D}"/>
+          </ac:spMkLst>
+        </pc:spChg>
+        <pc:spChg chg="add mod">
+          <ac:chgData name="Jacqueline Carver" userId="509607fbfe7c8838" providerId="LiveId" clId="{90109AE8-E557-4FA6-8C74-6762FB2FC51A}" dt="2022-11-03T20:18:30.981" v="5646" actId="120"/>
+          <ac:spMkLst>
+            <pc:docMk/>
+            <pc:sldMk cId="0" sldId="261"/>
+            <ac:spMk id="3" creationId="{D9FEB6FC-E977-4B35-5C35-A2D5251294C5}"/>
+          </ac:spMkLst>
+        </pc:spChg>
+        <pc:spChg chg="add mod">
+          <ac:chgData name="Jacqueline Carver" userId="509607fbfe7c8838" providerId="LiveId" clId="{90109AE8-E557-4FA6-8C74-6762FB2FC51A}" dt="2022-11-03T12:55:47.708" v="5560" actId="14100"/>
+          <ac:spMkLst>
+            <pc:docMk/>
+            <pc:sldMk cId="0" sldId="261"/>
+            <ac:spMk id="4" creationId="{7781BCA2-71CC-92E7-186E-719F8EC2CBFB}"/>
+          </ac:spMkLst>
+        </pc:spChg>
+        <pc:spChg chg="add mod">
+          <ac:chgData name="Jacqueline Carver" userId="509607fbfe7c8838" providerId="LiveId" clId="{90109AE8-E557-4FA6-8C74-6762FB2FC51A}" dt="2022-11-03T12:55:52.007" v="5561" actId="14100"/>
+          <ac:spMkLst>
+            <pc:docMk/>
+            <pc:sldMk cId="0" sldId="261"/>
+            <ac:spMk id="5" creationId="{7C161DFA-049D-90F6-EA65-06C38C5C0860}"/>
+          </ac:spMkLst>
+        </pc:spChg>
+        <pc:spChg chg="add mod">
+          <ac:chgData name="Jacqueline Carver" userId="509607fbfe7c8838" providerId="LiveId" clId="{90109AE8-E557-4FA6-8C74-6762FB2FC51A}" dt="2022-11-03T12:53:53.175" v="5556" actId="1076"/>
+          <ac:spMkLst>
+            <pc:docMk/>
+            <pc:sldMk cId="0" sldId="261"/>
+            <ac:spMk id="6" creationId="{556620CE-7115-9445-DA00-A0367CB6FCDD}"/>
+          </ac:spMkLst>
+        </pc:spChg>
+        <pc:spChg chg="mod">
+          <ac:chgData name="Jacqueline Carver" userId="509607fbfe7c8838" providerId="LiveId" clId="{90109AE8-E557-4FA6-8C74-6762FB2FC51A}" dt="2022-11-01T22:12:07.775" v="2842" actId="20577"/>
+          <ac:spMkLst>
+            <pc:docMk/>
+            <pc:sldMk cId="0" sldId="261"/>
+            <ac:spMk id="251" creationId="{00000000-0000-0000-0000-000000000000}"/>
+          </ac:spMkLst>
+        </pc:spChg>
+        <pc:spChg chg="del">
+          <ac:chgData name="Jacqueline Carver" userId="509607fbfe7c8838" providerId="LiveId" clId="{90109AE8-E557-4FA6-8C74-6762FB2FC51A}" dt="2022-11-01T22:12:29.573" v="2844" actId="478"/>
+          <ac:spMkLst>
+            <pc:docMk/>
+            <pc:sldMk cId="0" sldId="261"/>
+            <ac:spMk id="252" creationId="{00000000-0000-0000-0000-000000000000}"/>
+          </ac:spMkLst>
+        </pc:spChg>
+        <pc:spChg chg="del">
+          <ac:chgData name="Jacqueline Carver" userId="509607fbfe7c8838" providerId="LiveId" clId="{90109AE8-E557-4FA6-8C74-6762FB2FC51A}" dt="2022-11-01T22:12:38.163" v="2846" actId="478"/>
+          <ac:spMkLst>
+            <pc:docMk/>
+            <pc:sldMk cId="0" sldId="261"/>
+            <ac:spMk id="253" creationId="{00000000-0000-0000-0000-000000000000}"/>
+          </ac:spMkLst>
+        </pc:spChg>
+      </pc:sldChg>
+      <pc:sldChg chg="addSp modSp mod">
+        <pc:chgData name="Jacqueline Carver" userId="509607fbfe7c8838" providerId="LiveId" clId="{90109AE8-E557-4FA6-8C74-6762FB2FC51A}" dt="2022-11-02T21:29:06.067" v="3427" actId="20577"/>
+        <pc:sldMkLst>
+          <pc:docMk/>
+          <pc:sldMk cId="0" sldId="262"/>
+        </pc:sldMkLst>
+        <pc:spChg chg="add mod">
+          <ac:chgData name="Jacqueline Carver" userId="509607fbfe7c8838" providerId="LiveId" clId="{90109AE8-E557-4FA6-8C74-6762FB2FC51A}" dt="2022-11-01T19:50:59.489" v="1761" actId="207"/>
+          <ac:spMkLst>
+            <pc:docMk/>
+            <pc:sldMk cId="0" sldId="262"/>
+            <ac:spMk id="2" creationId="{03C5B56E-BD6E-DC68-0B76-1A962C25CF6E}"/>
+          </ac:spMkLst>
+        </pc:spChg>
+        <pc:spChg chg="add mod">
+          <ac:chgData name="Jacqueline Carver" userId="509607fbfe7c8838" providerId="LiveId" clId="{90109AE8-E557-4FA6-8C74-6762FB2FC51A}" dt="2022-11-01T19:59:49.241" v="1994" actId="207"/>
+          <ac:spMkLst>
+            <pc:docMk/>
+            <pc:sldMk cId="0" sldId="262"/>
+            <ac:spMk id="3" creationId="{861E70B7-3D3B-A128-5599-D9392E7D9044}"/>
+          </ac:spMkLst>
+        </pc:spChg>
+        <pc:spChg chg="add mod">
+          <ac:chgData name="Jacqueline Carver" userId="509607fbfe7c8838" providerId="LiveId" clId="{90109AE8-E557-4FA6-8C74-6762FB2FC51A}" dt="2022-11-01T19:59:51.877" v="1995" actId="207"/>
+          <ac:spMkLst>
+            <pc:docMk/>
+            <pc:sldMk cId="0" sldId="262"/>
+            <ac:spMk id="4" creationId="{DB75041C-F3B4-D61D-0EE3-ED7D6D7805E7}"/>
+          </ac:spMkLst>
+        </pc:spChg>
+        <pc:spChg chg="mod">
+          <ac:chgData name="Jacqueline Carver" userId="509607fbfe7c8838" providerId="LiveId" clId="{90109AE8-E557-4FA6-8C74-6762FB2FC51A}" dt="2022-11-01T19:50:14.558" v="1745" actId="14100"/>
+          <ac:spMkLst>
+            <pc:docMk/>
+            <pc:sldMk cId="0" sldId="262"/>
+            <ac:spMk id="264" creationId="{00000000-0000-0000-0000-000000000000}"/>
+          </ac:spMkLst>
+        </pc:spChg>
+        <pc:spChg chg="mod">
+          <ac:chgData name="Jacqueline Carver" userId="509607fbfe7c8838" providerId="LiveId" clId="{90109AE8-E557-4FA6-8C74-6762FB2FC51A}" dt="2022-11-02T21:29:06.067" v="3427" actId="20577"/>
+          <ac:spMkLst>
+            <pc:docMk/>
+            <pc:sldMk cId="0" sldId="262"/>
+            <ac:spMk id="265" creationId="{00000000-0000-0000-0000-000000000000}"/>
+          </ac:spMkLst>
+        </pc:spChg>
+        <pc:spChg chg="mod">
+          <ac:chgData name="Jacqueline Carver" userId="509607fbfe7c8838" providerId="LiveId" clId="{90109AE8-E557-4FA6-8C74-6762FB2FC51A}" dt="2022-11-01T22:26:16.538" v="3050" actId="2711"/>
+          <ac:spMkLst>
+            <pc:docMk/>
+            <pc:sldMk cId="0" sldId="262"/>
+            <ac:spMk id="266" creationId="{00000000-0000-0000-0000-000000000000}"/>
+          </ac:spMkLst>
+        </pc:spChg>
+      </pc:sldChg>
+      <pc:sldChg chg="addSp modSp mod">
+        <pc:chgData name="Jacqueline Carver" userId="509607fbfe7c8838" providerId="LiveId" clId="{90109AE8-E557-4FA6-8C74-6762FB2FC51A}" dt="2022-11-01T22:39:45.358" v="3278" actId="1076"/>
+        <pc:sldMkLst>
+          <pc:docMk/>
+          <pc:sldMk cId="0" sldId="264"/>
+        </pc:sldMkLst>
+        <pc:spChg chg="add mod">
+          <ac:chgData name="Jacqueline Carver" userId="509607fbfe7c8838" providerId="LiveId" clId="{90109AE8-E557-4FA6-8C74-6762FB2FC51A}" dt="2022-11-01T22:39:45.358" v="3278" actId="1076"/>
+          <ac:spMkLst>
+            <pc:docMk/>
+            <pc:sldMk cId="0" sldId="264"/>
+            <ac:spMk id="2" creationId="{BB004DDD-7EB0-D44E-8D0D-43DDE684A078}"/>
           </ac:spMkLst>
         </pc:spChg>
       </pc:sldChg>
@@ -31531,27 +31736,17 @@
           </a:bodyPr>
           <a:lstStyle/>
           <a:p>
-            <a:pPr marL="0" lvl="0" indent="0" algn="ctr" rtl="0">
-              <a:lnSpc>
-                <a:spcPct val="90000"/>
-              </a:lnSpc>
-              <a:spcBef>
-                <a:spcPts val="0"/>
-              </a:spcBef>
-              <a:spcAft>
-                <a:spcPts val="0"/>
-              </a:spcAft>
-              <a:buClr>
-                <a:schemeClr val="dk1"/>
-              </a:buClr>
+            <a:pPr marL="0" indent="0">
+              <a:spcBef>
+                <a:spcPts val="0"/>
+              </a:spcBef>
               <a:buSzPts val="1400"/>
-              <a:buNone/>
             </a:pPr>
             <a:r>
-              <a:rPr lang="en-US" sz="1400"/>
-              <a:t>Data &amp; Preprocessing</a:t>
+              <a:rPr lang="en-US" sz="1400" dirty="0"/>
+              <a:t>Exploratory Data Analysis</a:t>
             </a:r>
-            <a:endParaRPr/>
+            <a:endParaRPr sz="1400" dirty="0"/>
           </a:p>
         </p:txBody>
       </p:sp>
@@ -31567,8 +31762,8 @@
         </p:nvSpPr>
         <p:spPr>
           <a:xfrm>
-            <a:off x="4327063" y="829215"/>
-            <a:ext cx="1362615" cy="500684"/>
+            <a:off x="4337002" y="939523"/>
+            <a:ext cx="1362615" cy="280417"/>
           </a:xfrm>
           <a:prstGeom prst="rect">
             <a:avLst/>
@@ -31601,10 +31796,10 @@
               <a:buNone/>
             </a:pPr>
             <a:r>
-              <a:rPr lang="en-US" sz="1400"/>
-              <a:t>Machine Learning</a:t>
+              <a:rPr lang="en-US" sz="1400" dirty="0"/>
+              <a:t>Data Storage</a:t>
             </a:r>
-            <a:endParaRPr/>
+            <a:endParaRPr dirty="0"/>
           </a:p>
         </p:txBody>
       </p:sp>
@@ -31654,10 +31849,9 @@
               <a:buNone/>
             </a:pPr>
             <a:r>
-              <a:rPr lang="en-US" sz="1400"/>
-              <a:t>Charts, Graphs, Maps</a:t>
+              <a:rPr lang="en-US" sz="1400" dirty="0"/>
+              <a:t>Machine Learning</a:t>
             </a:r>
-            <a:endParaRPr/>
           </a:p>
         </p:txBody>
       </p:sp>
@@ -31707,10 +31901,10 @@
               <a:buNone/>
             </a:pPr>
             <a:r>
-              <a:rPr lang="en-US" sz="1400"/>
+              <a:rPr lang="en-US" sz="1400" dirty="0"/>
               <a:t>Visualization</a:t>
             </a:r>
-            <a:endParaRPr/>
+            <a:endParaRPr dirty="0"/>
           </a:p>
         </p:txBody>
       </p:sp>
@@ -31815,7 +32009,7 @@
         </p:spPr>
         <p:txBody>
           <a:bodyPr spcFirstLastPara="1" wrap="square" lIns="91425" tIns="45700" rIns="91425" bIns="45700" anchor="t" anchorCtr="0">
-            <a:normAutofit fontScale="92500" lnSpcReduction="20000"/>
+            <a:normAutofit fontScale="92500" lnSpcReduction="10000"/>
           </a:bodyPr>
           <a:lstStyle/>
           <a:p>
@@ -31900,7 +32094,7 @@
                   <a:srgbClr val="D09E00"/>
                 </a:solidFill>
               </a:rPr>
-              <a:t>Data &amp; Preprocessing: </a:t>
+              <a:t>Exploratory Data Analysis: </a:t>
             </a:r>
             <a:endParaRPr dirty="0"/>
           </a:p>
@@ -31923,28 +32117,8 @@
             </a:pPr>
             <a:r>
               <a:rPr lang="en-US" sz="1600" dirty="0"/>
-              <a:t>AWS S3 Bucket: data files, notebooks/script files,</a:t>
+              <a:t>US Census Data, Kaggle, and Costco website</a:t>
             </a:r>
-            <a:endParaRPr sz="1600" dirty="0"/>
-          </a:p>
-          <a:p>
-            <a:pPr marL="0" lvl="0" indent="0" algn="l" rtl="0">
-              <a:lnSpc>
-                <a:spcPct val="90000"/>
-              </a:lnSpc>
-              <a:spcBef>
-                <a:spcPts val="500"/>
-              </a:spcBef>
-              <a:spcAft>
-                <a:spcPts val="0"/>
-              </a:spcAft>
-              <a:buNone/>
-            </a:pPr>
-            <a:r>
-              <a:rPr lang="en-US" sz="1600" dirty="0"/>
-              <a:t>	      images, Readme, presentation</a:t>
-            </a:r>
-            <a:endParaRPr sz="1600" dirty="0"/>
           </a:p>
           <a:p>
             <a:pPr marL="685800" lvl="1" indent="-228600" algn="l" rtl="0">
@@ -31964,12 +32138,8 @@
               <a:buChar char="•"/>
             </a:pPr>
             <a:r>
-              <a:rPr lang="en-US" sz="1600" dirty="0" err="1"/>
-              <a:t>Jupyter</a:t>
-            </a:r>
-            <a:r>
               <a:rPr lang="en-US" sz="1600" dirty="0"/>
-              <a:t> notebook: preprocessing and merging data</a:t>
+              <a:t>Jupyter notebook &amp; Excel: preprocessing and merging data</a:t>
             </a:r>
             <a:endParaRPr dirty="0"/>
           </a:p>
@@ -31996,7 +32166,7 @@
                   <a:srgbClr val="C55A11"/>
                 </a:solidFill>
               </a:rPr>
-              <a:t>Machine Learning: </a:t>
+              <a:t>Data Storage: </a:t>
             </a:r>
             <a:endParaRPr dirty="0"/>
           </a:p>
@@ -32018,25 +32188,12 @@
               <a:buChar char="•"/>
             </a:pPr>
             <a:r>
-              <a:rPr lang="en-US" sz="1600" dirty="0" err="1"/>
-              <a:t>Jupyter</a:t>
+              <a:rPr lang="en-US" sz="1600" dirty="0"/>
+              <a:t>AWS S3 Bucket: data files, notebooks/script files,</a:t>
             </a:r>
-            <a:r>
-              <a:rPr lang="en-US" sz="1600" dirty="0"/>
-              <a:t> notebook &amp; linear regression/</a:t>
-            </a:r>
-            <a:r>
-              <a:rPr lang="en-US" sz="1600" dirty="0" err="1"/>
-              <a:t>RandomForest</a:t>
-            </a:r>
-            <a:r>
-              <a:rPr lang="en-US" sz="1600" dirty="0"/>
-              <a:t>, </a:t>
-            </a:r>
-            <a:endParaRPr sz="1600" dirty="0"/>
           </a:p>
           <a:p>
-            <a:pPr marL="685800" lvl="0" indent="0" algn="l" rtl="0">
+            <a:pPr marL="457200" lvl="1" indent="0" algn="l" rtl="0">
               <a:lnSpc>
                 <a:spcPct val="90000"/>
               </a:lnSpc>
@@ -32046,13 +32203,16 @@
               <a:spcAft>
                 <a:spcPts val="0"/>
               </a:spcAft>
+              <a:buClr>
+                <a:schemeClr val="lt1"/>
+              </a:buClr>
+              <a:buSzPct val="100000"/>
               <a:buNone/>
             </a:pPr>
             <a:r>
               <a:rPr lang="en-US" sz="1600" dirty="0"/>
-              <a:t>K-means</a:t>
+              <a:t>      images, Readme, presentation</a:t>
             </a:r>
-            <a:endParaRPr sz="1600" dirty="0"/>
           </a:p>
         </p:txBody>
       </p:sp>
@@ -32081,7 +32241,7 @@
         </p:spPr>
         <p:txBody>
           <a:bodyPr spcFirstLastPara="1" wrap="square" lIns="91425" tIns="45700" rIns="91425" bIns="45700" anchor="t" anchorCtr="0">
-            <a:normAutofit fontScale="92500" lnSpcReduction="10000"/>
+            <a:normAutofit fontScale="92500" lnSpcReduction="20000"/>
           </a:bodyPr>
           <a:lstStyle/>
           <a:p>
@@ -32107,12 +32267,12 @@
                   <a:srgbClr val="A8D08C"/>
                 </a:solidFill>
               </a:rPr>
-              <a:t>Charts, Graphs, Maps:</a:t>
+              <a:t>Machine Learning:</a:t>
             </a:r>
             <a:endParaRPr sz="2000" dirty="0"/>
           </a:p>
           <a:p>
-            <a:pPr marL="685800" lvl="1" indent="-220979" algn="l" rtl="0">
+            <a:pPr marL="685800" lvl="1" indent="-228600" algn="l" rtl="0">
               <a:lnSpc>
                 <a:spcPct val="90000"/>
               </a:lnSpc>
@@ -32130,12 +32290,11 @@
             </a:pPr>
             <a:r>
               <a:rPr lang="en-US" sz="1600" dirty="0"/>
-              <a:t>Decide on visuals to tell our story</a:t>
+              <a:t>Linear Regression, SMOTEENN, and RandomForest </a:t>
             </a:r>
-            <a:endParaRPr dirty="0"/>
           </a:p>
           <a:p>
-            <a:pPr marL="685800" lvl="1" indent="-134619" algn="l" rtl="0">
+            <a:pPr marL="685800" lvl="1" indent="-228600" algn="l" rtl="0">
               <a:lnSpc>
                 <a:spcPct val="90000"/>
               </a:lnSpc>
@@ -32149,8 +32308,12 @@
                 <a:schemeClr val="lt1"/>
               </a:buClr>
               <a:buSzPct val="100000"/>
-              <a:buNone/>
+              <a:buChar char="•"/>
             </a:pPr>
+            <a:r>
+              <a:rPr lang="en-US" sz="1600" dirty="0"/>
+              <a:t>Using Jupyter Notebook and Google Collab</a:t>
+            </a:r>
             <a:endParaRPr sz="1600" dirty="0"/>
           </a:p>
           <a:p>
@@ -32201,7 +32364,16 @@
               <a:rPr lang="en-US" sz="1600" dirty="0"/>
               <a:t>Create a website using JavaScript &amp; Html files</a:t>
             </a:r>
-            <a:endParaRPr dirty="0"/>
+          </a:p>
+          <a:p>
+            <a:pPr marL="685800" lvl="1" indent="-220979">
+              <a:buSzPct val="100000"/>
+            </a:pPr>
+            <a:r>
+              <a:rPr lang="en-US" sz="1600" dirty="0"/>
+              <a:t>Charts, Graphs, Maps</a:t>
+            </a:r>
+            <a:endParaRPr sz="1600" dirty="0"/>
           </a:p>
           <a:p>
             <a:pPr marL="457200" lvl="1" indent="0" algn="l" rtl="0">
@@ -32250,31 +32422,20 @@
             <a:endParaRPr dirty="0"/>
           </a:p>
           <a:p>
-            <a:pPr marL="685800" lvl="1" indent="-220979" algn="l" rtl="0">
-              <a:lnSpc>
-                <a:spcPct val="100000"/>
-              </a:lnSpc>
-              <a:spcBef>
-                <a:spcPts val="0"/>
-              </a:spcBef>
-              <a:spcAft>
-                <a:spcPts val="0"/>
-              </a:spcAft>
-              <a:buClr>
-                <a:schemeClr val="lt1"/>
-              </a:buClr>
+            <a:pPr marL="685800" lvl="1" indent="-220979">
               <a:buSzPct val="100000"/>
-              <a:buChar char="•"/>
             </a:pPr>
             <a:r>
-              <a:rPr lang="en-US" sz="1600" b="0" i="0" dirty="0">
-                <a:latin typeface="Lato"/>
-                <a:ea typeface="Lato"/>
-                <a:cs typeface="Lato"/>
+              <a:rPr lang="en-US" sz="1600" dirty="0">
                 <a:sym typeface="Lato"/>
               </a:rPr>
               <a:t>Did we address our question by finding opportunities for Costco to open new stores?  </a:t>
             </a:r>
+          </a:p>
+          <a:p>
+            <a:pPr marL="685800" lvl="1" indent="-220979">
+              <a:buSzPct val="100000"/>
+            </a:pPr>
             <a:r>
               <a:rPr lang="en-US" sz="1600" dirty="0"/>
               <a:t>Did we find new locations to consider?</a:t>
@@ -32282,25 +32443,12 @@
             <a:endParaRPr sz="1600" dirty="0"/>
           </a:p>
           <a:p>
-            <a:pPr marL="685800" lvl="1" indent="-220979" algn="l" rtl="0">
-              <a:lnSpc>
-                <a:spcPct val="100000"/>
-              </a:lnSpc>
-              <a:spcBef>
-                <a:spcPts val="0"/>
-              </a:spcBef>
-              <a:spcAft>
-                <a:spcPts val="0"/>
-              </a:spcAft>
-              <a:buClr>
-                <a:schemeClr val="lt1"/>
-              </a:buClr>
+            <a:pPr marL="685800" lvl="1" indent="-220979">
               <a:buSzPct val="100000"/>
-              <a:buChar char="•"/>
             </a:pPr>
             <a:r>
               <a:rPr lang="en-US" sz="1600" dirty="0"/>
-              <a:t>What could we do to better evaluate the data</a:t>
+              <a:t>What could we do to better evaluate the data?</a:t>
             </a:r>
             <a:endParaRPr sz="1600" dirty="0"/>
           </a:p>
@@ -36770,7 +36918,7 @@
         </p:nvSpPr>
         <p:spPr>
           <a:xfrm>
-            <a:off x="755650" y="3198481"/>
+            <a:off x="755649" y="3057132"/>
             <a:ext cx="10666329" cy="906011"/>
           </a:xfrm>
           <a:prstGeom prst="rect">
@@ -36811,9 +36959,10 @@
                   </a:schemeClr>
                 </a:solidFill>
                 <a:effectLst/>
-                <a:latin typeface="-apple-system"/>
+                <a:latin typeface="Calibri" panose="020F0502020204030204" pitchFamily="34" charset="0"/>
+                <a:cs typeface="Calibri" panose="020F0502020204030204" pitchFamily="34" charset="0"/>
               </a:rPr>
-              <a:t>Legislation recently passed regarding hearing aids that will impact a large percent of the population.</a:t>
+              <a:t>Legislation recently passed regarding hearing aids that will impact a large percent of the population</a:t>
             </a:r>
             <a:endParaRPr dirty="0">
               <a:solidFill>
@@ -36821,6 +36970,8 @@
                   <a:lumMod val="75000"/>
                 </a:schemeClr>
               </a:solidFill>
+              <a:latin typeface="Calibri" panose="020F0502020204030204" pitchFamily="34" charset="0"/>
+              <a:cs typeface="Calibri" panose="020F0502020204030204" pitchFamily="34" charset="0"/>
             </a:endParaRPr>
           </a:p>
         </p:txBody>
@@ -36837,7 +36988,7 @@
         </p:nvSpPr>
         <p:spPr>
           <a:xfrm>
-            <a:off x="6096000" y="4700667"/>
+            <a:off x="6088814" y="4175125"/>
             <a:ext cx="4957763" cy="2682875"/>
           </a:xfrm>
           <a:prstGeom prst="rect">
@@ -36872,8 +37023,29 @@
               <a:buChar char="•"/>
             </a:pPr>
             <a:r>
-              <a:rPr lang="en-US" sz="2000" dirty="0"/>
-              <a:t>18% of adults between 20-69 years of age have hearing impairments</a:t>
+              <a:rPr lang="en-US" sz="2000" dirty="0">
+                <a:latin typeface="Calibri" panose="020F0502020204030204" pitchFamily="34" charset="0"/>
+                <a:cs typeface="Calibri" panose="020F0502020204030204" pitchFamily="34" charset="0"/>
+              </a:rPr>
+              <a:t>18% of adults between 20-69 years of age have </a:t>
+            </a:r>
+            <a:r>
+              <a:rPr lang="en-US" sz="2000" dirty="0">
+                <a:solidFill>
+                  <a:srgbClr val="000000"/>
+                </a:solidFill>
+                <a:latin typeface="Calibri" panose="020F0502020204030204" pitchFamily="34" charset="0"/>
+                <a:cs typeface="Calibri" panose="020F0502020204030204" pitchFamily="34" charset="0"/>
+                <a:sym typeface="Arial"/>
+              </a:rPr>
+              <a:t>hearing</a:t>
+            </a:r>
+            <a:r>
+              <a:rPr lang="en-US" sz="2000" dirty="0">
+                <a:latin typeface="Calibri" panose="020F0502020204030204" pitchFamily="34" charset="0"/>
+                <a:cs typeface="Calibri" panose="020F0502020204030204" pitchFamily="34" charset="0"/>
+              </a:rPr>
+              <a:t> impairments</a:t>
             </a:r>
           </a:p>
           <a:p>
@@ -36885,28 +37057,28 @@
               <a:buChar char="•"/>
             </a:pPr>
             <a:r>
-              <a:rPr lang="en-US" sz="2000" dirty="0"/>
-              <a:t>More than 700 locations across the United States</a:t>
+              <a:rPr lang="en-US" sz="2000" dirty="0">
+                <a:latin typeface="Calibri" panose="020F0502020204030204" pitchFamily="34" charset="0"/>
+                <a:cs typeface="Calibri" panose="020F0502020204030204" pitchFamily="34" charset="0"/>
+              </a:rPr>
+              <a:t>More than 550 Costco locations across the United States</a:t>
             </a:r>
           </a:p>
           <a:p>
-            <a:pPr marL="177800" lvl="0" indent="0" algn="l" rtl="0">
-              <a:lnSpc>
-                <a:spcPct val="90000"/>
-              </a:lnSpc>
-              <a:spcBef>
-                <a:spcPts val="0"/>
-              </a:spcBef>
-              <a:spcAft>
-                <a:spcPts val="0"/>
-              </a:spcAft>
-              <a:buClr>
-                <a:schemeClr val="dk1"/>
-              </a:buClr>
-              <a:buSzPts val="2800"/>
-              <a:buNone/>
+            <a:pPr marL="635000" indent="-457200">
+              <a:spcBef>
+                <a:spcPts val="0"/>
+              </a:spcBef>
+              <a:buFont typeface="Arial" panose="020B0604020202020204" pitchFamily="34" charset="0"/>
+              <a:buChar char="•"/>
             </a:pPr>
-            <a:endParaRPr lang="en-US" sz="2000" dirty="0"/>
+            <a:r>
+              <a:rPr lang="en-US" sz="2000" dirty="0">
+                <a:latin typeface="Calibri" panose="020F0502020204030204" pitchFamily="34" charset="0"/>
+                <a:cs typeface="Calibri" panose="020F0502020204030204" pitchFamily="34" charset="0"/>
+              </a:rPr>
+              <a:t>Global hearing market projected to grow at a CAGR of 8.1% for 2022-2029</a:t>
+            </a:r>
           </a:p>
           <a:p>
             <a:pPr marL="635000" lvl="0" indent="-457200" algn="l" rtl="0">
@@ -36926,7 +37098,10 @@
               <a:buFont typeface="Arial" panose="020B0604020202020204" pitchFamily="34" charset="0"/>
               <a:buChar char="•"/>
             </a:pPr>
-            <a:endParaRPr sz="2000" dirty="0"/>
+            <a:endParaRPr sz="2000" dirty="0">
+              <a:latin typeface="Calibri" panose="020F0502020204030204" pitchFamily="34" charset="0"/>
+              <a:cs typeface="Calibri" panose="020F0502020204030204" pitchFamily="34" charset="0"/>
+            </a:endParaRPr>
           </a:p>
         </p:txBody>
       </p:sp>
@@ -38317,6 +38492,8 @@
                     <a:lumMod val="75000"/>
                   </a:schemeClr>
                 </a:solidFill>
+                <a:latin typeface="Calibri" panose="020F0502020204030204" pitchFamily="34" charset="0"/>
+                <a:cs typeface="Calibri" panose="020F0502020204030204" pitchFamily="34" charset="0"/>
               </a:rPr>
               <a:t>How does the need for over-the-counter hearing aids affect Costco?</a:t>
             </a:r>
@@ -38325,38 +38502,292 @@
       </p:sp>
       <p:sp>
         <p:nvSpPr>
-          <p:cNvPr id="11" name="TextBox 10">
+          <p:cNvPr id="2" name="Google Shape;226;p12">
             <a:extLst>
               <a:ext uri="{FF2B5EF4-FFF2-40B4-BE49-F238E27FC236}">
-                <a16:creationId xmlns:a16="http://schemas.microsoft.com/office/drawing/2014/main" id="{E72470E9-B695-FC9A-0D97-F18432E25ADA}"/>
+                <a16:creationId xmlns:a16="http://schemas.microsoft.com/office/drawing/2014/main" id="{076E11CC-1B19-64B7-F1DC-E221DEA8BF3E}"/>
               </a:ext>
             </a:extLst>
           </p:cNvPr>
-          <p:cNvSpPr txBox="1"/>
+          <p:cNvSpPr txBox="1">
+            <a:spLocks/>
+          </p:cNvSpPr>
           <p:nvPr/>
         </p:nvSpPr>
         <p:spPr>
           <a:xfrm>
-            <a:off x="497953" y="4700667"/>
-            <a:ext cx="4957763" cy="1015663"/>
+            <a:off x="770021" y="4104492"/>
+            <a:ext cx="4957763" cy="2682875"/>
           </a:xfrm>
           <a:prstGeom prst="rect">
             <a:avLst/>
           </a:prstGeom>
           <a:noFill/>
+          <a:ln>
+            <a:noFill/>
+          </a:ln>
         </p:spPr>
         <p:txBody>
-          <a:bodyPr wrap="square" rtlCol="0">
-            <a:spAutoFit/>
+          <a:bodyPr spcFirstLastPara="1" wrap="square" lIns="91425" tIns="45700" rIns="91425" bIns="45700" anchor="t" anchorCtr="0">
+            <a:normAutofit/>
           </a:bodyPr>
-          <a:lstStyle/>
+          <a:lstStyle>
+            <a:defPPr marR="0" lvl="0" algn="l" rtl="0">
+              <a:lnSpc>
+                <a:spcPct val="100000"/>
+              </a:lnSpc>
+              <a:spcBef>
+                <a:spcPts val="0"/>
+              </a:spcBef>
+              <a:spcAft>
+                <a:spcPts val="0"/>
+              </a:spcAft>
+            </a:defPPr>
+            <a:lvl1pPr marL="457200" marR="0" lvl="0" indent="-406400" algn="l" rtl="0">
+              <a:lnSpc>
+                <a:spcPct val="90000"/>
+              </a:lnSpc>
+              <a:spcBef>
+                <a:spcPts val="1000"/>
+              </a:spcBef>
+              <a:spcAft>
+                <a:spcPts val="0"/>
+              </a:spcAft>
+              <a:buClr>
+                <a:schemeClr val="dk1"/>
+              </a:buClr>
+              <a:buSzPts val="2800"/>
+              <a:buFont typeface="Arial"/>
+              <a:buChar char="•"/>
+              <a:defRPr sz="2800" b="0" i="0" u="none" strike="noStrike" cap="none">
+                <a:solidFill>
+                  <a:schemeClr val="dk1"/>
+                </a:solidFill>
+                <a:latin typeface="Calibri"/>
+                <a:ea typeface="Calibri"/>
+                <a:cs typeface="Calibri"/>
+                <a:sym typeface="Calibri"/>
+              </a:defRPr>
+            </a:lvl1pPr>
+            <a:lvl2pPr marL="914400" marR="0" lvl="1" indent="-381000" algn="l" rtl="0">
+              <a:lnSpc>
+                <a:spcPct val="90000"/>
+              </a:lnSpc>
+              <a:spcBef>
+                <a:spcPts val="500"/>
+              </a:spcBef>
+              <a:spcAft>
+                <a:spcPts val="0"/>
+              </a:spcAft>
+              <a:buClr>
+                <a:schemeClr val="dk1"/>
+              </a:buClr>
+              <a:buSzPts val="2400"/>
+              <a:buFont typeface="Arial"/>
+              <a:buChar char="•"/>
+              <a:defRPr sz="2400" b="0" i="0" u="none" strike="noStrike" cap="none">
+                <a:solidFill>
+                  <a:schemeClr val="dk1"/>
+                </a:solidFill>
+                <a:latin typeface="Calibri"/>
+                <a:ea typeface="Calibri"/>
+                <a:cs typeface="Calibri"/>
+                <a:sym typeface="Calibri"/>
+              </a:defRPr>
+            </a:lvl2pPr>
+            <a:lvl3pPr marL="1371600" marR="0" lvl="2" indent="-355600" algn="l" rtl="0">
+              <a:lnSpc>
+                <a:spcPct val="90000"/>
+              </a:lnSpc>
+              <a:spcBef>
+                <a:spcPts val="500"/>
+              </a:spcBef>
+              <a:spcAft>
+                <a:spcPts val="0"/>
+              </a:spcAft>
+              <a:buClr>
+                <a:schemeClr val="dk1"/>
+              </a:buClr>
+              <a:buSzPts val="2000"/>
+              <a:buFont typeface="Arial"/>
+              <a:buChar char="•"/>
+              <a:defRPr sz="2000" b="0" i="0" u="none" strike="noStrike" cap="none">
+                <a:solidFill>
+                  <a:schemeClr val="dk1"/>
+                </a:solidFill>
+                <a:latin typeface="Calibri"/>
+                <a:ea typeface="Calibri"/>
+                <a:cs typeface="Calibri"/>
+                <a:sym typeface="Calibri"/>
+              </a:defRPr>
+            </a:lvl3pPr>
+            <a:lvl4pPr marL="1828800" marR="0" lvl="3" indent="-342900" algn="l" rtl="0">
+              <a:lnSpc>
+                <a:spcPct val="90000"/>
+              </a:lnSpc>
+              <a:spcBef>
+                <a:spcPts val="500"/>
+              </a:spcBef>
+              <a:spcAft>
+                <a:spcPts val="0"/>
+              </a:spcAft>
+              <a:buClr>
+                <a:schemeClr val="dk1"/>
+              </a:buClr>
+              <a:buSzPts val="1800"/>
+              <a:buFont typeface="Arial"/>
+              <a:buChar char="•"/>
+              <a:defRPr sz="1800" b="0" i="0" u="none" strike="noStrike" cap="none">
+                <a:solidFill>
+                  <a:schemeClr val="dk1"/>
+                </a:solidFill>
+                <a:latin typeface="Calibri"/>
+                <a:ea typeface="Calibri"/>
+                <a:cs typeface="Calibri"/>
+                <a:sym typeface="Calibri"/>
+              </a:defRPr>
+            </a:lvl4pPr>
+            <a:lvl5pPr marL="2286000" marR="0" lvl="4" indent="-342900" algn="l" rtl="0">
+              <a:lnSpc>
+                <a:spcPct val="90000"/>
+              </a:lnSpc>
+              <a:spcBef>
+                <a:spcPts val="500"/>
+              </a:spcBef>
+              <a:spcAft>
+                <a:spcPts val="0"/>
+              </a:spcAft>
+              <a:buClr>
+                <a:schemeClr val="dk1"/>
+              </a:buClr>
+              <a:buSzPts val="1800"/>
+              <a:buFont typeface="Arial"/>
+              <a:buChar char="•"/>
+              <a:defRPr sz="1800" b="0" i="0" u="none" strike="noStrike" cap="none">
+                <a:solidFill>
+                  <a:schemeClr val="dk1"/>
+                </a:solidFill>
+                <a:latin typeface="Calibri"/>
+                <a:ea typeface="Calibri"/>
+                <a:cs typeface="Calibri"/>
+                <a:sym typeface="Calibri"/>
+              </a:defRPr>
+            </a:lvl5pPr>
+            <a:lvl6pPr marL="2743200" marR="0" lvl="5" indent="-342900" algn="l" rtl="0">
+              <a:lnSpc>
+                <a:spcPct val="90000"/>
+              </a:lnSpc>
+              <a:spcBef>
+                <a:spcPts val="500"/>
+              </a:spcBef>
+              <a:spcAft>
+                <a:spcPts val="0"/>
+              </a:spcAft>
+              <a:buClr>
+                <a:schemeClr val="dk1"/>
+              </a:buClr>
+              <a:buSzPts val="1800"/>
+              <a:buFont typeface="Arial"/>
+              <a:buChar char="•"/>
+              <a:defRPr sz="1800" b="0" i="0" u="none" strike="noStrike" cap="none">
+                <a:solidFill>
+                  <a:schemeClr val="dk1"/>
+                </a:solidFill>
+                <a:latin typeface="Calibri"/>
+                <a:ea typeface="Calibri"/>
+                <a:cs typeface="Calibri"/>
+                <a:sym typeface="Calibri"/>
+              </a:defRPr>
+            </a:lvl6pPr>
+            <a:lvl7pPr marL="3200400" marR="0" lvl="6" indent="-342900" algn="l" rtl="0">
+              <a:lnSpc>
+                <a:spcPct val="90000"/>
+              </a:lnSpc>
+              <a:spcBef>
+                <a:spcPts val="500"/>
+              </a:spcBef>
+              <a:spcAft>
+                <a:spcPts val="0"/>
+              </a:spcAft>
+              <a:buClr>
+                <a:schemeClr val="dk1"/>
+              </a:buClr>
+              <a:buSzPts val="1800"/>
+              <a:buFont typeface="Arial"/>
+              <a:buChar char="•"/>
+              <a:defRPr sz="1800" b="0" i="0" u="none" strike="noStrike" cap="none">
+                <a:solidFill>
+                  <a:schemeClr val="dk1"/>
+                </a:solidFill>
+                <a:latin typeface="Calibri"/>
+                <a:ea typeface="Calibri"/>
+                <a:cs typeface="Calibri"/>
+                <a:sym typeface="Calibri"/>
+              </a:defRPr>
+            </a:lvl7pPr>
+            <a:lvl8pPr marL="3657600" marR="0" lvl="7" indent="-342900" algn="l" rtl="0">
+              <a:lnSpc>
+                <a:spcPct val="90000"/>
+              </a:lnSpc>
+              <a:spcBef>
+                <a:spcPts val="500"/>
+              </a:spcBef>
+              <a:spcAft>
+                <a:spcPts val="0"/>
+              </a:spcAft>
+              <a:buClr>
+                <a:schemeClr val="dk1"/>
+              </a:buClr>
+              <a:buSzPts val="1800"/>
+              <a:buFont typeface="Arial"/>
+              <a:buChar char="•"/>
+              <a:defRPr sz="1800" b="0" i="0" u="none" strike="noStrike" cap="none">
+                <a:solidFill>
+                  <a:schemeClr val="dk1"/>
+                </a:solidFill>
+                <a:latin typeface="Calibri"/>
+                <a:ea typeface="Calibri"/>
+                <a:cs typeface="Calibri"/>
+                <a:sym typeface="Calibri"/>
+              </a:defRPr>
+            </a:lvl8pPr>
+            <a:lvl9pPr marL="4114800" marR="0" lvl="8" indent="-342900" algn="l" rtl="0">
+              <a:lnSpc>
+                <a:spcPct val="90000"/>
+              </a:lnSpc>
+              <a:spcBef>
+                <a:spcPts val="500"/>
+              </a:spcBef>
+              <a:spcAft>
+                <a:spcPts val="0"/>
+              </a:spcAft>
+              <a:buClr>
+                <a:schemeClr val="dk1"/>
+              </a:buClr>
+              <a:buSzPts val="1800"/>
+              <a:buFont typeface="Arial"/>
+              <a:buChar char="•"/>
+              <a:defRPr sz="1800" b="0" i="0" u="none" strike="noStrike" cap="none">
+                <a:solidFill>
+                  <a:schemeClr val="dk1"/>
+                </a:solidFill>
+                <a:latin typeface="Calibri"/>
+                <a:ea typeface="Calibri"/>
+                <a:cs typeface="Calibri"/>
+                <a:sym typeface="Calibri"/>
+              </a:defRPr>
+            </a:lvl9pPr>
+          </a:lstStyle>
           <a:p>
-            <a:pPr marL="285750" indent="-285750">
+            <a:pPr marL="342900" indent="-342900">
               <a:buFont typeface="Arial" panose="020B0604020202020204" pitchFamily="34" charset="0"/>
               <a:buChar char="•"/>
             </a:pPr>
             <a:r>
-              <a:rPr lang="en-US" sz="2000" dirty="0"/>
+              <a:rPr lang="en-US" sz="2000" dirty="0">
+                <a:latin typeface="Calibri" panose="020F0502020204030204" pitchFamily="34" charset="0"/>
+                <a:cs typeface="Calibri" panose="020F0502020204030204" pitchFamily="34" charset="0"/>
+              </a:rPr>
               <a:t>More than a 20% decrease in price</a:t>
             </a:r>
           </a:p>
@@ -38366,7 +38797,10 @@
               <a:buChar char="•"/>
             </a:pPr>
             <a:r>
-              <a:rPr lang="en-US" sz="2000" dirty="0"/>
+              <a:rPr lang="en-US" sz="2000" dirty="0">
+                <a:latin typeface="Calibri" panose="020F0502020204030204" pitchFamily="34" charset="0"/>
+                <a:cs typeface="Calibri" panose="020F0502020204030204" pitchFamily="34" charset="0"/>
+              </a:rPr>
               <a:t>Less costly testing procedures</a:t>
             </a:r>
           </a:p>
@@ -38376,9 +38810,38 @@
               <a:buChar char="•"/>
             </a:pPr>
             <a:r>
-              <a:rPr lang="en-US" sz="2000" dirty="0"/>
+              <a:rPr lang="en-US" sz="2000" dirty="0">
+                <a:latin typeface="Calibri" panose="020F0502020204030204" pitchFamily="34" charset="0"/>
+                <a:cs typeface="Calibri" panose="020F0502020204030204" pitchFamily="34" charset="0"/>
+              </a:rPr>
               <a:t>Accessibility through cost and location</a:t>
             </a:r>
+          </a:p>
+          <a:p>
+            <a:pPr marL="285750" indent="-285750">
+              <a:buFont typeface="Arial" panose="020B0604020202020204" pitchFamily="34" charset="0"/>
+              <a:buChar char="•"/>
+            </a:pPr>
+            <a:r>
+              <a:rPr lang="en-US" sz="2000" dirty="0">
+                <a:latin typeface="Calibri" panose="020F0502020204030204" pitchFamily="34" charset="0"/>
+                <a:cs typeface="Calibri" panose="020F0502020204030204" pitchFamily="34" charset="0"/>
+              </a:rPr>
+              <a:t>National Institute of Health indicates that millennial and Gen Z individuals are more likely to experience hearing loss compared to previous generations</a:t>
+            </a:r>
+          </a:p>
+          <a:p>
+            <a:pPr marL="635000" indent="-457200">
+              <a:spcBef>
+                <a:spcPts val="0"/>
+              </a:spcBef>
+              <a:buFont typeface="Arial" panose="020B0604020202020204" pitchFamily="34" charset="0"/>
+              <a:buChar char="•"/>
+            </a:pPr>
+            <a:endParaRPr lang="en-US" sz="2000" dirty="0">
+              <a:latin typeface="Calibri" panose="020F0502020204030204" pitchFamily="34" charset="0"/>
+              <a:cs typeface="Calibri" panose="020F0502020204030204" pitchFamily="34" charset="0"/>
+            </a:endParaRPr>
           </a:p>
         </p:txBody>
       </p:sp>
@@ -38440,40 +38903,27 @@
           </a:bodyPr>
           <a:lstStyle/>
           <a:p>
-            <a:pPr marL="0" marR="0" lvl="0" indent="0" algn="l" rtl="0">
-              <a:lnSpc>
-                <a:spcPct val="90000"/>
-              </a:lnSpc>
-              <a:spcBef>
-                <a:spcPts val="0"/>
-              </a:spcBef>
-              <a:spcAft>
-                <a:spcPts val="0"/>
-              </a:spcAft>
-              <a:buClr>
-                <a:srgbClr val="FFD966"/>
-              </a:buClr>
-              <a:buSzPts val="4400"/>
-              <a:buFont typeface="Calibri"/>
-              <a:buNone/>
+            <a:pPr>
+              <a:lnSpc>
+                <a:spcPct val="90000"/>
+              </a:lnSpc>
+              <a:spcBef>
+                <a:spcPts val="1000"/>
+              </a:spcBef>
+              <a:buClr>
+                <a:srgbClr val="D09E00"/>
+              </a:buClr>
+              <a:buSzPct val="100000"/>
             </a:pPr>
             <a:r>
-              <a:rPr lang="en-US" sz="4400">
+              <a:rPr lang="en-US" sz="4400" dirty="0">
                 <a:solidFill>
                   <a:srgbClr val="D09E00"/>
                 </a:solidFill>
-                <a:latin typeface="Calibri"/>
-                <a:ea typeface="Calibri"/>
-                <a:cs typeface="Calibri"/>
-                <a:sym typeface="Calibri"/>
               </a:rPr>
-              <a:t>Data &amp; Preprocessing: </a:t>
+              <a:t>Exploratory Data Analysis: </a:t>
             </a:r>
-            <a:endParaRPr>
-              <a:solidFill>
-                <a:srgbClr val="D09E00"/>
-              </a:solidFill>
-            </a:endParaRPr>
+            <a:endParaRPr lang="en-US" sz="7200" dirty="0"/>
           </a:p>
         </p:txBody>
       </p:sp>
@@ -38489,7 +38939,7 @@
         </p:nvSpPr>
         <p:spPr>
           <a:xfrm>
-            <a:off x="565719" y="3198482"/>
+            <a:off x="565719" y="2939721"/>
             <a:ext cx="5484729" cy="651624"/>
           </a:xfrm>
           <a:prstGeom prst="rect">
@@ -38506,35 +38956,25 @@
           </a:bodyPr>
           <a:lstStyle/>
           <a:p>
-            <a:pPr marL="228600" lvl="0" indent="-50800" algn="ctr" rtl="0">
-              <a:lnSpc>
-                <a:spcPct val="90000"/>
-              </a:lnSpc>
-              <a:spcBef>
-                <a:spcPts val="0"/>
-              </a:spcBef>
-              <a:spcAft>
-                <a:spcPts val="0"/>
-              </a:spcAft>
-              <a:buClr>
-                <a:schemeClr val="dk1"/>
-              </a:buClr>
-              <a:buSzPts val="2800"/>
+            <a:pPr marL="228600" indent="-50800" algn="ctr">
+              <a:spcBef>
+                <a:spcPts val="0"/>
+              </a:spcBef>
               <a:buNone/>
             </a:pPr>
             <a:r>
               <a:rPr lang="en-US" sz="3600" dirty="0">
                 <a:solidFill>
-                  <a:schemeClr val="accent2">
+                  <a:schemeClr val="accent4">
                     <a:lumMod val="50000"/>
                   </a:schemeClr>
                 </a:solidFill>
               </a:rPr>
-              <a:t>Exploratory Data Analysis</a:t>
+              <a:t>Data Search</a:t>
             </a:r>
             <a:endParaRPr sz="3600" dirty="0">
               <a:solidFill>
-                <a:schemeClr val="accent2">
+                <a:schemeClr val="accent4">
                   <a:lumMod val="50000"/>
                 </a:schemeClr>
               </a:solidFill>
@@ -38554,7 +38994,7 @@
         </p:nvSpPr>
         <p:spPr>
           <a:xfrm>
-            <a:off x="5835372" y="3178672"/>
+            <a:off x="5835372" y="2950332"/>
             <a:ext cx="4957763" cy="671434"/>
           </a:xfrm>
           <a:prstGeom prst="rect">
@@ -38571,35 +39011,25 @@
           </a:bodyPr>
           <a:lstStyle/>
           <a:p>
-            <a:pPr marL="228600" lvl="0" indent="-50800" algn="ctr" rtl="0">
-              <a:lnSpc>
-                <a:spcPct val="90000"/>
-              </a:lnSpc>
-              <a:spcBef>
-                <a:spcPts val="0"/>
-              </a:spcBef>
-              <a:spcAft>
-                <a:spcPts val="0"/>
-              </a:spcAft>
-              <a:buClr>
-                <a:schemeClr val="dk1"/>
-              </a:buClr>
-              <a:buSzPts val="2800"/>
+            <a:pPr marL="228600" lvl="0" indent="-50800" algn="ctr">
+              <a:spcBef>
+                <a:spcPts val="0"/>
+              </a:spcBef>
               <a:buNone/>
             </a:pPr>
             <a:r>
               <a:rPr lang="en-US" sz="3600" dirty="0">
                 <a:solidFill>
-                  <a:schemeClr val="accent2">
+                  <a:schemeClr val="accent4">
                     <a:lumMod val="50000"/>
                   </a:schemeClr>
                 </a:solidFill>
               </a:rPr>
-              <a:t>Database</a:t>
+              <a:t>Preprocessing</a:t>
             </a:r>
             <a:endParaRPr sz="3600" dirty="0">
               <a:solidFill>
-                <a:schemeClr val="accent2">
+                <a:schemeClr val="accent4">
                   <a:lumMod val="50000"/>
                 </a:schemeClr>
               </a:solidFill>
@@ -39530,47 +39960,6 @@
       </p:sp>
       <p:sp>
         <p:nvSpPr>
-          <p:cNvPr id="2" name="TextBox 1">
-            <a:extLst>
-              <a:ext uri="{FF2B5EF4-FFF2-40B4-BE49-F238E27FC236}">
-                <a16:creationId xmlns:a16="http://schemas.microsoft.com/office/drawing/2014/main" id="{3A6E9C0C-116B-EDB0-95EF-31812B9C221A}"/>
-              </a:ext>
-            </a:extLst>
-          </p:cNvPr>
-          <p:cNvSpPr txBox="1"/>
-          <p:nvPr/>
-        </p:nvSpPr>
-        <p:spPr>
-          <a:xfrm>
-            <a:off x="5535335" y="473233"/>
-            <a:ext cx="3018503" cy="523220"/>
-          </a:xfrm>
-          <a:prstGeom prst="rect">
-            <a:avLst/>
-          </a:prstGeom>
-          <a:noFill/>
-        </p:spPr>
-        <p:txBody>
-          <a:bodyPr wrap="square" rtlCol="0">
-            <a:spAutoFit/>
-          </a:bodyPr>
-          <a:lstStyle/>
-          <a:p>
-            <a:r>
-              <a:rPr lang="en-US" sz="2800" dirty="0">
-                <a:solidFill>
-                  <a:schemeClr val="accent2">
-                    <a:lumMod val="50000"/>
-                  </a:schemeClr>
-                </a:solidFill>
-              </a:rPr>
-              <a:t>AWS S3 Bucket</a:t>
-            </a:r>
-          </a:p>
-        </p:txBody>
-      </p:sp>
-      <p:sp>
-        <p:nvSpPr>
           <p:cNvPr id="3" name="TextBox 2">
             <a:extLst>
               <a:ext uri="{FF2B5EF4-FFF2-40B4-BE49-F238E27FC236}">
@@ -39583,8 +39972,8 @@
         </p:nvSpPr>
         <p:spPr>
           <a:xfrm>
-            <a:off x="545432" y="3850106"/>
-            <a:ext cx="5694947" cy="2308324"/>
+            <a:off x="6096000" y="3859940"/>
+            <a:ext cx="5694947" cy="2554545"/>
           </a:xfrm>
           <a:prstGeom prst="rect">
             <a:avLst/>
@@ -39602,16 +39991,11 @@
               <a:buChar char="•"/>
             </a:pPr>
             <a:r>
-              <a:rPr lang="en-US" sz="2400" dirty="0"/>
-              <a:t>Using pandas in </a:t>
-            </a:r>
-            <a:r>
-              <a:rPr lang="en-US" sz="2400" dirty="0" err="1"/>
-              <a:t>jupyter</a:t>
-            </a:r>
-            <a:r>
-              <a:rPr lang="en-US" sz="2400" dirty="0"/>
-              <a:t> notebook</a:t>
+              <a:rPr lang="en-US" sz="2000" dirty="0">
+                <a:latin typeface="Calibri" panose="020F0502020204030204" pitchFamily="34" charset="0"/>
+                <a:cs typeface="Calibri" panose="020F0502020204030204" pitchFamily="34" charset="0"/>
+              </a:rPr>
+              <a:t>Using Pandas, the Python library, in Jupyter Notebook</a:t>
             </a:r>
           </a:p>
           <a:p>
@@ -39620,7 +40004,23 @@
               <a:buChar char="•"/>
             </a:pPr>
             <a:r>
-              <a:rPr lang="en-US" sz="2400" dirty="0"/>
+              <a:rPr lang="en-US" sz="2000" dirty="0">
+                <a:latin typeface="Calibri" panose="020F0502020204030204" pitchFamily="34" charset="0"/>
+                <a:cs typeface="Calibri" panose="020F0502020204030204" pitchFamily="34" charset="0"/>
+              </a:rPr>
+              <a:t>Using Excel to edit Costco file</a:t>
+            </a:r>
+          </a:p>
+          <a:p>
+            <a:pPr marL="285750" indent="-285750">
+              <a:buFont typeface="Arial" panose="020B0604020202020204" pitchFamily="34" charset="0"/>
+              <a:buChar char="•"/>
+            </a:pPr>
+            <a:r>
+              <a:rPr lang="en-US" sz="2000" dirty="0">
+                <a:latin typeface="Calibri" panose="020F0502020204030204" pitchFamily="34" charset="0"/>
+                <a:cs typeface="Calibri" panose="020F0502020204030204" pitchFamily="34" charset="0"/>
+              </a:rPr>
               <a:t>Dropping irrelevant columns</a:t>
             </a:r>
           </a:p>
@@ -39630,7 +40030,10 @@
               <a:buChar char="•"/>
             </a:pPr>
             <a:r>
-              <a:rPr lang="en-US" sz="2400" dirty="0"/>
+              <a:rPr lang="en-US" sz="2000" dirty="0">
+                <a:latin typeface="Calibri" panose="020F0502020204030204" pitchFamily="34" charset="0"/>
+                <a:cs typeface="Calibri" panose="020F0502020204030204" pitchFamily="34" charset="0"/>
+              </a:rPr>
               <a:t>Creating consistency in label names</a:t>
             </a:r>
           </a:p>
@@ -39640,7 +40043,10 @@
               <a:buChar char="•"/>
             </a:pPr>
             <a:r>
-              <a:rPr lang="en-US" sz="2400" dirty="0"/>
+              <a:rPr lang="en-US" sz="2000" dirty="0">
+                <a:latin typeface="Calibri" panose="020F0502020204030204" pitchFamily="34" charset="0"/>
+                <a:cs typeface="Calibri" panose="020F0502020204030204" pitchFamily="34" charset="0"/>
+              </a:rPr>
               <a:t>Locating Costco hearing clinics</a:t>
             </a:r>
           </a:p>
@@ -39650,7 +40056,10 @@
               <a:buChar char="•"/>
             </a:pPr>
             <a:r>
-              <a:rPr lang="en-US" sz="2400" dirty="0"/>
+              <a:rPr lang="en-US" sz="2000" dirty="0">
+                <a:latin typeface="Calibri" panose="020F0502020204030204" pitchFamily="34" charset="0"/>
+                <a:cs typeface="Calibri" panose="020F0502020204030204" pitchFamily="34" charset="0"/>
+              </a:rPr>
               <a:t>Merging demographic</a:t>
             </a:r>
           </a:p>
@@ -39660,7 +40069,10 @@
               <a:buChar char="•"/>
             </a:pPr>
             <a:r>
-              <a:rPr lang="en-US" sz="2400" dirty="0"/>
+              <a:rPr lang="en-US" sz="2000" dirty="0">
+                <a:latin typeface="Calibri" panose="020F0502020204030204" pitchFamily="34" charset="0"/>
+                <a:cs typeface="Calibri" panose="020F0502020204030204" pitchFamily="34" charset="0"/>
+              </a:rPr>
               <a:t>Transformed census data into csv files</a:t>
             </a:r>
           </a:p>
@@ -39680,8 +40092,8 @@
         </p:nvSpPr>
         <p:spPr>
           <a:xfrm>
-            <a:off x="6260666" y="3850106"/>
-            <a:ext cx="5694947" cy="1938992"/>
+            <a:off x="565719" y="4006124"/>
+            <a:ext cx="5694947" cy="1323439"/>
           </a:xfrm>
           <a:prstGeom prst="rect">
             <a:avLst/>
@@ -39699,8 +40111,11 @@
               <a:buChar char="•"/>
             </a:pPr>
             <a:r>
-              <a:rPr lang="en-US" sz="2400" dirty="0"/>
-              <a:t>S3 Bucket (an Amazon Web Service application)</a:t>
+              <a:rPr lang="en-US" sz="2000" dirty="0">
+                <a:latin typeface="Calibri" panose="020F0502020204030204" pitchFamily="34" charset="0"/>
+                <a:cs typeface="Calibri" panose="020F0502020204030204" pitchFamily="34" charset="0"/>
+              </a:rPr>
+              <a:t>Manual search from each team member</a:t>
             </a:r>
           </a:p>
           <a:p>
@@ -39709,8 +40124,11 @@
               <a:buChar char="•"/>
             </a:pPr>
             <a:r>
-              <a:rPr lang="en-US" sz="2400" dirty="0"/>
-              <a:t>Storing pictures, files, graphs, and more</a:t>
+              <a:rPr lang="en-US" sz="2000" dirty="0">
+                <a:latin typeface="Calibri" panose="020F0502020204030204" pitchFamily="34" charset="0"/>
+                <a:cs typeface="Calibri" panose="020F0502020204030204" pitchFamily="34" charset="0"/>
+              </a:rPr>
+              <a:t>US Census Data</a:t>
             </a:r>
           </a:p>
           <a:p>
@@ -39719,8 +40137,24 @@
               <a:buChar char="•"/>
             </a:pPr>
             <a:r>
-              <a:rPr lang="en-US" sz="2400" dirty="0"/>
-              <a:t>Easily accessible among teammates</a:t>
+              <a:rPr lang="en-US" sz="2000" dirty="0">
+                <a:latin typeface="Calibri" panose="020F0502020204030204" pitchFamily="34" charset="0"/>
+                <a:cs typeface="Calibri" panose="020F0502020204030204" pitchFamily="34" charset="0"/>
+              </a:rPr>
+              <a:t>Kaggle</a:t>
+            </a:r>
+          </a:p>
+          <a:p>
+            <a:pPr marL="285750" indent="-285750">
+              <a:buFont typeface="Arial" panose="020B0604020202020204" pitchFamily="34" charset="0"/>
+              <a:buChar char="•"/>
+            </a:pPr>
+            <a:r>
+              <a:rPr lang="en-US" sz="2000" dirty="0">
+                <a:latin typeface="Calibri" panose="020F0502020204030204" pitchFamily="34" charset="0"/>
+                <a:cs typeface="Calibri" panose="020F0502020204030204" pitchFamily="34" charset="0"/>
+              </a:rPr>
+              <a:t>Costco Website</a:t>
             </a:r>
           </a:p>
         </p:txBody>
@@ -39793,7 +40227,7 @@
               <a:buNone/>
             </a:pPr>
             <a:r>
-              <a:rPr lang="en-US" sz="4400">
+              <a:rPr lang="en-US" sz="4400" dirty="0">
                 <a:solidFill>
                   <a:srgbClr val="C55A11"/>
                 </a:solidFill>
@@ -39802,9 +40236,9 @@
                 <a:cs typeface="Calibri"/>
                 <a:sym typeface="Calibri"/>
               </a:rPr>
-              <a:t>Machine Learning: </a:t>
+              <a:t>Data Storage: </a:t>
             </a:r>
-            <a:endParaRPr>
+            <a:endParaRPr dirty="0">
               <a:solidFill>
                 <a:srgbClr val="C55A11"/>
               </a:solidFill>
@@ -39841,32 +40275,42 @@
           </a:bodyPr>
           <a:lstStyle/>
           <a:p>
-            <a:pPr marL="228600" lvl="0" indent="-50800" algn="ctr" rtl="0">
-              <a:lnSpc>
-                <a:spcPct val="90000"/>
-              </a:lnSpc>
-              <a:spcBef>
-                <a:spcPts val="0"/>
-              </a:spcBef>
-              <a:spcAft>
-                <a:spcPts val="0"/>
-              </a:spcAft>
-              <a:buClr>
-                <a:schemeClr val="dk1"/>
-              </a:buClr>
-              <a:buSzPts val="2800"/>
+            <a:pPr marL="228600" indent="-50800" algn="ctr">
+              <a:spcBef>
+                <a:spcPts val="0"/>
+              </a:spcBef>
               <a:buNone/>
             </a:pPr>
             <a:r>
-              <a:rPr lang="en-US" dirty="0">
+              <a:rPr lang="en-US" sz="2800" dirty="0">
                 <a:solidFill>
                   <a:schemeClr val="accent2">
                     <a:lumMod val="50000"/>
                   </a:schemeClr>
                 </a:solidFill>
+                <a:latin typeface="Calibri" panose="020F0502020204030204" pitchFamily="34" charset="0"/>
+                <a:cs typeface="Calibri" panose="020F0502020204030204" pitchFamily="34" charset="0"/>
               </a:rPr>
-              <a:t>Needing a machine learning model that predicts the probability of a dependent variable. This will give a binary output.</a:t>
+              <a:t>S3 Bucket, an Amazon Web Service application for data storage</a:t>
             </a:r>
+          </a:p>
+          <a:p>
+            <a:pPr marL="228600" lvl="0" indent="-50800" algn="ctr" rtl="0">
+              <a:lnSpc>
+                <a:spcPct val="90000"/>
+              </a:lnSpc>
+              <a:spcBef>
+                <a:spcPts val="0"/>
+              </a:spcBef>
+              <a:spcAft>
+                <a:spcPts val="0"/>
+              </a:spcAft>
+              <a:buClr>
+                <a:schemeClr val="dk1"/>
+              </a:buClr>
+              <a:buSzPts val="2800"/>
+              <a:buNone/>
+            </a:pPr>
             <a:endParaRPr dirty="0">
               <a:solidFill>
                 <a:schemeClr val="accent2">
@@ -39874,83 +40318,6 @@
                 </a:schemeClr>
               </a:solidFill>
             </a:endParaRPr>
-          </a:p>
-        </p:txBody>
-      </p:sp>
-      <p:sp>
-        <p:nvSpPr>
-          <p:cNvPr id="245" name="Google Shape;245;p14"/>
-          <p:cNvSpPr txBox="1">
-            <a:spLocks noGrp="1"/>
-          </p:cNvSpPr>
-          <p:nvPr>
-            <p:ph type="body" idx="2"/>
-          </p:nvPr>
-        </p:nvSpPr>
-        <p:spPr>
-          <a:xfrm>
-            <a:off x="438360" y="4565530"/>
-            <a:ext cx="5071288" cy="2018994"/>
-          </a:xfrm>
-          <a:prstGeom prst="rect">
-            <a:avLst/>
-          </a:prstGeom>
-          <a:noFill/>
-          <a:ln>
-            <a:noFill/>
-          </a:ln>
-        </p:spPr>
-        <p:txBody>
-          <a:bodyPr spcFirstLastPara="1" wrap="square" lIns="91425" tIns="45700" rIns="91425" bIns="45700" anchor="t" anchorCtr="0">
-            <a:normAutofit/>
-          </a:bodyPr>
-          <a:lstStyle/>
-          <a:p>
-            <a:pPr marL="635000" lvl="0" indent="-457200" algn="l" rtl="0">
-              <a:lnSpc>
-                <a:spcPct val="90000"/>
-              </a:lnSpc>
-              <a:spcBef>
-                <a:spcPts val="0"/>
-              </a:spcBef>
-              <a:spcAft>
-                <a:spcPts val="0"/>
-              </a:spcAft>
-              <a:buClr>
-                <a:schemeClr val="dk1"/>
-              </a:buClr>
-              <a:buSzPts val="2800"/>
-              <a:buFont typeface="Arial" panose="020B0604020202020204" pitchFamily="34" charset="0"/>
-              <a:buChar char="•"/>
-            </a:pPr>
-            <a:r>
-              <a:rPr lang="en-US" dirty="0"/>
-              <a:t>A mock-up for structured and unstructured notebooks</a:t>
-            </a:r>
-          </a:p>
-          <a:p>
-            <a:pPr marL="635000" lvl="0" indent="-457200" algn="l" rtl="0">
-              <a:lnSpc>
-                <a:spcPct val="90000"/>
-              </a:lnSpc>
-              <a:spcBef>
-                <a:spcPts val="0"/>
-              </a:spcBef>
-              <a:spcAft>
-                <a:spcPts val="0"/>
-              </a:spcAft>
-              <a:buClr>
-                <a:schemeClr val="dk1"/>
-              </a:buClr>
-              <a:buSzPts val="2800"/>
-              <a:buFont typeface="Arial" panose="020B0604020202020204" pitchFamily="34" charset="0"/>
-              <a:buChar char="•"/>
-            </a:pPr>
-            <a:r>
-              <a:rPr lang="en-US" dirty="0"/>
-              <a:t>Using precision and recall</a:t>
-            </a:r>
-            <a:endParaRPr dirty="0"/>
           </a:p>
         </p:txBody>
       </p:sp>
@@ -40115,78 +40482,6 @@
       </p:sp>
       <p:sp>
         <p:nvSpPr>
-          <p:cNvPr id="2" name="Google Shape;243;p14">
-            <a:extLst>
-              <a:ext uri="{FF2B5EF4-FFF2-40B4-BE49-F238E27FC236}">
-                <a16:creationId xmlns:a16="http://schemas.microsoft.com/office/drawing/2014/main" id="{B775C4FD-D7C6-D70D-8742-1597D1982275}"/>
-              </a:ext>
-            </a:extLst>
-          </p:cNvPr>
-          <p:cNvSpPr txBox="1"/>
-          <p:nvPr/>
-        </p:nvSpPr>
-        <p:spPr>
-          <a:xfrm>
-            <a:off x="4716379" y="273476"/>
-            <a:ext cx="4438844" cy="906011"/>
-          </a:xfrm>
-          <a:prstGeom prst="rect">
-            <a:avLst/>
-          </a:prstGeom>
-          <a:noFill/>
-          <a:ln>
-            <a:noFill/>
-          </a:ln>
-        </p:spPr>
-        <p:txBody>
-          <a:bodyPr spcFirstLastPara="1" wrap="square" lIns="91425" tIns="45700" rIns="91425" bIns="45700" anchor="ctr" anchorCtr="0">
-            <a:normAutofit fontScale="92500"/>
-          </a:bodyPr>
-          <a:lstStyle/>
-          <a:p>
-            <a:pPr marL="0" marR="0" lvl="0" indent="0" algn="l" rtl="0">
-              <a:lnSpc>
-                <a:spcPct val="90000"/>
-              </a:lnSpc>
-              <a:spcBef>
-                <a:spcPts val="0"/>
-              </a:spcBef>
-              <a:spcAft>
-                <a:spcPts val="0"/>
-              </a:spcAft>
-              <a:buClr>
-                <a:srgbClr val="FFD966"/>
-              </a:buClr>
-              <a:buSzPts val="4400"/>
-              <a:buFont typeface="Calibri"/>
-              <a:buNone/>
-            </a:pPr>
-            <a:r>
-              <a:rPr lang="en-US" sz="4400" dirty="0">
-                <a:solidFill>
-                  <a:schemeClr val="accent2">
-                    <a:lumMod val="50000"/>
-                  </a:schemeClr>
-                </a:solidFill>
-                <a:latin typeface="Calibri"/>
-                <a:ea typeface="Calibri"/>
-                <a:cs typeface="Calibri"/>
-                <a:sym typeface="Calibri"/>
-              </a:rPr>
-              <a:t>Logistic Regression</a:t>
-            </a:r>
-            <a:endParaRPr dirty="0">
-              <a:solidFill>
-                <a:schemeClr val="accent2">
-                  <a:lumMod val="50000"/>
-                </a:schemeClr>
-              </a:solidFill>
-            </a:endParaRPr>
-          </a:p>
-        </p:txBody>
-      </p:sp>
-      <p:sp>
-        <p:nvSpPr>
           <p:cNvPr id="4" name="Google Shape;245;p14">
             <a:extLst>
               <a:ext uri="{FF2B5EF4-FFF2-40B4-BE49-F238E27FC236}">
@@ -40201,7 +40496,7 @@
         </p:nvSpPr>
         <p:spPr>
           <a:xfrm>
-            <a:off x="5949638" y="4565530"/>
+            <a:off x="6365062" y="4420377"/>
             <a:ext cx="5071288" cy="2018994"/>
           </a:xfrm>
           <a:prstGeom prst="rect">
@@ -40482,16 +40777,11 @@
               <a:buChar char="•"/>
             </a:pPr>
             <a:r>
-              <a:rPr lang="en-US" dirty="0"/>
-              <a:t>Using </a:t>
-            </a:r>
-            <a:r>
-              <a:rPr lang="en-US" dirty="0" err="1"/>
-              <a:t>RandomForest</a:t>
-            </a:r>
-            <a:r>
-              <a:rPr lang="en-US" dirty="0"/>
-              <a:t> and K-Means for feature selection</a:t>
+              <a:rPr lang="en-US" sz="2000" dirty="0">
+                <a:latin typeface="Calibri" panose="020F0502020204030204" pitchFamily="34" charset="0"/>
+                <a:cs typeface="Calibri" panose="020F0502020204030204" pitchFamily="34" charset="0"/>
+              </a:rPr>
+              <a:t>Connects to machine learning through pyspark</a:t>
             </a:r>
           </a:p>
           <a:p>
@@ -40513,8 +40803,105 @@
               <a:buChar char="•"/>
             </a:pPr>
             <a:r>
-              <a:rPr lang="en-US" dirty="0"/>
-              <a:t>Training on Costco locations</a:t>
+              <a:rPr lang="en-US" sz="2000" dirty="0">
+                <a:latin typeface="Calibri" panose="020F0502020204030204" pitchFamily="34" charset="0"/>
+                <a:cs typeface="Calibri" panose="020F0502020204030204" pitchFamily="34" charset="0"/>
+              </a:rPr>
+              <a:t>Easy to use on multiple platforms</a:t>
+            </a:r>
+          </a:p>
+          <a:p>
+            <a:pPr marL="635000" lvl="0" indent="-457200" algn="l" rtl="0">
+              <a:lnSpc>
+                <a:spcPct val="90000"/>
+              </a:lnSpc>
+              <a:spcBef>
+                <a:spcPts val="0"/>
+              </a:spcBef>
+              <a:spcAft>
+                <a:spcPts val="0"/>
+              </a:spcAft>
+              <a:buClr>
+                <a:schemeClr val="dk1"/>
+              </a:buClr>
+              <a:buSzPts val="2800"/>
+              <a:buFont typeface="Arial" panose="020B0604020202020204" pitchFamily="34" charset="0"/>
+              <a:buChar char="•"/>
+            </a:pPr>
+            <a:r>
+              <a:rPr lang="en-US" sz="2000" dirty="0">
+                <a:latin typeface="Calibri" panose="020F0502020204030204" pitchFamily="34" charset="0"/>
+                <a:cs typeface="Calibri" panose="020F0502020204030204" pitchFamily="34" charset="0"/>
+              </a:rPr>
+              <a:t>Plenty of storage space </a:t>
+            </a:r>
+          </a:p>
+        </p:txBody>
+      </p:sp>
+      <p:sp>
+        <p:nvSpPr>
+          <p:cNvPr id="3" name="TextBox 2">
+            <a:extLst>
+              <a:ext uri="{FF2B5EF4-FFF2-40B4-BE49-F238E27FC236}">
+                <a16:creationId xmlns:a16="http://schemas.microsoft.com/office/drawing/2014/main" id="{7986D3D4-A0AF-21F3-579E-ED9916B19DFC}"/>
+              </a:ext>
+            </a:extLst>
+          </p:cNvPr>
+          <p:cNvSpPr txBox="1"/>
+          <p:nvPr/>
+        </p:nvSpPr>
+        <p:spPr>
+          <a:xfrm>
+            <a:off x="755650" y="4429175"/>
+            <a:ext cx="5694947" cy="1015663"/>
+          </a:xfrm>
+          <a:prstGeom prst="rect">
+            <a:avLst/>
+          </a:prstGeom>
+          <a:noFill/>
+        </p:spPr>
+        <p:txBody>
+          <a:bodyPr wrap="square" rtlCol="0">
+            <a:spAutoFit/>
+          </a:bodyPr>
+          <a:lstStyle/>
+          <a:p>
+            <a:pPr marL="285750" indent="-285750">
+              <a:buFont typeface="Arial" panose="020B0604020202020204" pitchFamily="34" charset="0"/>
+              <a:buChar char="•"/>
+            </a:pPr>
+            <a:r>
+              <a:rPr lang="en-US" sz="2000" dirty="0">
+                <a:latin typeface="Calibri" panose="020F0502020204030204" pitchFamily="34" charset="0"/>
+                <a:cs typeface="Calibri" panose="020F0502020204030204" pitchFamily="34" charset="0"/>
+              </a:rPr>
+              <a:t>Storing pictures, files, graphs, and more</a:t>
+            </a:r>
+          </a:p>
+          <a:p>
+            <a:pPr marL="285750" indent="-285750">
+              <a:buFont typeface="Arial" panose="020B0604020202020204" pitchFamily="34" charset="0"/>
+              <a:buChar char="•"/>
+            </a:pPr>
+            <a:r>
+              <a:rPr lang="en-US" sz="2000" dirty="0">
+                <a:latin typeface="Calibri" panose="020F0502020204030204" pitchFamily="34" charset="0"/>
+                <a:cs typeface="Calibri" panose="020F0502020204030204" pitchFamily="34" charset="0"/>
+              </a:rPr>
+              <a:t>Easily accessible among teammates</a:t>
+            </a:r>
+          </a:p>
+          <a:p>
+            <a:pPr marL="285750" indent="-285750">
+              <a:buFont typeface="Arial" panose="020B0604020202020204" pitchFamily="34" charset="0"/>
+              <a:buChar char="•"/>
+            </a:pPr>
+            <a:r>
+              <a:rPr lang="en-US" sz="2000" dirty="0">
+                <a:latin typeface="Calibri" panose="020F0502020204030204" pitchFamily="34" charset="0"/>
+                <a:cs typeface="Calibri" panose="020F0502020204030204" pitchFamily="34" charset="0"/>
+              </a:rPr>
+              <a:t>Connecting changing data to S3 Bucket</a:t>
             </a:r>
           </a:p>
         </p:txBody>
@@ -40587,7 +40974,7 @@
               <a:buNone/>
             </a:pPr>
             <a:r>
-              <a:rPr lang="en-US" sz="4400">
+              <a:rPr lang="en-US" sz="4400" dirty="0">
                 <a:solidFill>
                   <a:srgbClr val="A8D08C"/>
                 </a:solidFill>
@@ -40596,10 +40983,10 @@
                 <a:cs typeface="Calibri"/>
                 <a:sym typeface="Calibri"/>
               </a:rPr>
-              <a:t>Charts, Graphs &amp; Maps:</a:t>
+              <a:t>Machine Learning:</a:t>
             </a:r>
             <a:r>
-              <a:rPr lang="en-US" sz="4400">
+              <a:rPr lang="en-US" sz="4400" dirty="0">
                 <a:solidFill>
                   <a:srgbClr val="FFD966"/>
                 </a:solidFill>
@@ -40610,105 +40997,7 @@
               </a:rPr>
               <a:t> </a:t>
             </a:r>
-            <a:endParaRPr/>
-          </a:p>
-        </p:txBody>
-      </p:sp>
-      <p:sp>
-        <p:nvSpPr>
-          <p:cNvPr id="252" name="Google Shape;252;p15"/>
-          <p:cNvSpPr txBox="1">
-            <a:spLocks noGrp="1"/>
-          </p:cNvSpPr>
-          <p:nvPr>
-            <p:ph type="body" idx="1"/>
-          </p:nvPr>
-        </p:nvSpPr>
-        <p:spPr>
-          <a:xfrm>
-            <a:off x="755650" y="3198481"/>
-            <a:ext cx="4957763" cy="2682875"/>
-          </a:xfrm>
-          <a:prstGeom prst="rect">
-            <a:avLst/>
-          </a:prstGeom>
-          <a:noFill/>
-          <a:ln>
-            <a:noFill/>
-          </a:ln>
-        </p:spPr>
-        <p:txBody>
-          <a:bodyPr spcFirstLastPara="1" wrap="square" lIns="91425" tIns="45700" rIns="91425" bIns="45700" anchor="t" anchorCtr="0">
-            <a:normAutofit/>
-          </a:bodyPr>
-          <a:lstStyle/>
-          <a:p>
-            <a:pPr marL="228600" lvl="0" indent="-50800" algn="l" rtl="0">
-              <a:lnSpc>
-                <a:spcPct val="90000"/>
-              </a:lnSpc>
-              <a:spcBef>
-                <a:spcPts val="0"/>
-              </a:spcBef>
-              <a:spcAft>
-                <a:spcPts val="0"/>
-              </a:spcAft>
-              <a:buClr>
-                <a:schemeClr val="dk1"/>
-              </a:buClr>
-              <a:buSzPts val="2800"/>
-              <a:buNone/>
-            </a:pPr>
-            <a:endParaRPr/>
-          </a:p>
-        </p:txBody>
-      </p:sp>
-      <p:sp>
-        <p:nvSpPr>
-          <p:cNvPr id="253" name="Google Shape;253;p15"/>
-          <p:cNvSpPr txBox="1">
-            <a:spLocks noGrp="1"/>
-          </p:cNvSpPr>
-          <p:nvPr>
-            <p:ph type="body" idx="2"/>
-          </p:nvPr>
-        </p:nvSpPr>
-        <p:spPr>
-          <a:xfrm>
-            <a:off x="6490359" y="3178672"/>
-            <a:ext cx="4957763" cy="2682875"/>
-          </a:xfrm>
-          <a:prstGeom prst="rect">
-            <a:avLst/>
-          </a:prstGeom>
-          <a:noFill/>
-          <a:ln>
-            <a:noFill/>
-          </a:ln>
-        </p:spPr>
-        <p:txBody>
-          <a:bodyPr spcFirstLastPara="1" wrap="square" lIns="91425" tIns="45700" rIns="91425" bIns="45700" anchor="t" anchorCtr="0">
-            <a:normAutofit/>
-          </a:bodyPr>
-          <a:lstStyle/>
-          <a:p>
-            <a:pPr marL="228600" lvl="0" indent="-50800" algn="l" rtl="0">
-              <a:lnSpc>
-                <a:spcPct val="90000"/>
-              </a:lnSpc>
-              <a:spcBef>
-                <a:spcPts val="0"/>
-              </a:spcBef>
-              <a:spcAft>
-                <a:spcPts val="0"/>
-              </a:spcAft>
-              <a:buClr>
-                <a:schemeClr val="dk1"/>
-              </a:buClr>
-              <a:buSzPts val="2800"/>
-              <a:buNone/>
-            </a:pPr>
-            <a:endParaRPr/>
+            <a:endParaRPr dirty="0"/>
           </a:p>
         </p:txBody>
       </p:sp>
@@ -41021,6 +41310,1543 @@
           </p:txBody>
         </p:sp>
       </p:grpSp>
+      <p:sp>
+        <p:nvSpPr>
+          <p:cNvPr id="3" name="Google Shape;245;p14">
+            <a:extLst>
+              <a:ext uri="{FF2B5EF4-FFF2-40B4-BE49-F238E27FC236}">
+                <a16:creationId xmlns:a16="http://schemas.microsoft.com/office/drawing/2014/main" id="{D9FEB6FC-E977-4B35-5C35-A2D5251294C5}"/>
+              </a:ext>
+            </a:extLst>
+          </p:cNvPr>
+          <p:cNvSpPr txBox="1">
+            <a:spLocks/>
+          </p:cNvSpPr>
+          <p:nvPr/>
+        </p:nvSpPr>
+        <p:spPr>
+          <a:xfrm>
+            <a:off x="777282" y="2924282"/>
+            <a:ext cx="10637435" cy="1413891"/>
+          </a:xfrm>
+          <a:prstGeom prst="rect">
+            <a:avLst/>
+          </a:prstGeom>
+          <a:noFill/>
+          <a:ln>
+            <a:noFill/>
+          </a:ln>
+        </p:spPr>
+        <p:txBody>
+          <a:bodyPr spcFirstLastPara="1" wrap="square" lIns="91425" tIns="45700" rIns="91425" bIns="45700" anchor="t" anchorCtr="0">
+            <a:noAutofit/>
+          </a:bodyPr>
+          <a:lstStyle>
+            <a:defPPr marR="0" lvl="0" algn="l" rtl="0">
+              <a:lnSpc>
+                <a:spcPct val="100000"/>
+              </a:lnSpc>
+              <a:spcBef>
+                <a:spcPts val="0"/>
+              </a:spcBef>
+              <a:spcAft>
+                <a:spcPts val="0"/>
+              </a:spcAft>
+            </a:defPPr>
+            <a:lvl1pPr marL="457200" marR="0" lvl="0" indent="-406400" algn="l" rtl="0">
+              <a:lnSpc>
+                <a:spcPct val="90000"/>
+              </a:lnSpc>
+              <a:spcBef>
+                <a:spcPts val="1000"/>
+              </a:spcBef>
+              <a:spcAft>
+                <a:spcPts val="0"/>
+              </a:spcAft>
+              <a:buClr>
+                <a:schemeClr val="dk1"/>
+              </a:buClr>
+              <a:buSzPts val="2800"/>
+              <a:buFont typeface="Arial"/>
+              <a:buChar char="•"/>
+              <a:defRPr sz="2800" b="0" i="0" u="none" strike="noStrike" cap="none">
+                <a:solidFill>
+                  <a:schemeClr val="dk1"/>
+                </a:solidFill>
+                <a:latin typeface="Calibri"/>
+                <a:ea typeface="Calibri"/>
+                <a:cs typeface="Calibri"/>
+                <a:sym typeface="Calibri"/>
+              </a:defRPr>
+            </a:lvl1pPr>
+            <a:lvl2pPr marL="914400" marR="0" lvl="1" indent="-381000" algn="l" rtl="0">
+              <a:lnSpc>
+                <a:spcPct val="90000"/>
+              </a:lnSpc>
+              <a:spcBef>
+                <a:spcPts val="500"/>
+              </a:spcBef>
+              <a:spcAft>
+                <a:spcPts val="0"/>
+              </a:spcAft>
+              <a:buClr>
+                <a:schemeClr val="dk1"/>
+              </a:buClr>
+              <a:buSzPts val="2400"/>
+              <a:buFont typeface="Arial"/>
+              <a:buChar char="•"/>
+              <a:defRPr sz="2400" b="0" i="0" u="none" strike="noStrike" cap="none">
+                <a:solidFill>
+                  <a:schemeClr val="dk1"/>
+                </a:solidFill>
+                <a:latin typeface="Calibri"/>
+                <a:ea typeface="Calibri"/>
+                <a:cs typeface="Calibri"/>
+                <a:sym typeface="Calibri"/>
+              </a:defRPr>
+            </a:lvl2pPr>
+            <a:lvl3pPr marL="1371600" marR="0" lvl="2" indent="-355600" algn="l" rtl="0">
+              <a:lnSpc>
+                <a:spcPct val="90000"/>
+              </a:lnSpc>
+              <a:spcBef>
+                <a:spcPts val="500"/>
+              </a:spcBef>
+              <a:spcAft>
+                <a:spcPts val="0"/>
+              </a:spcAft>
+              <a:buClr>
+                <a:schemeClr val="dk1"/>
+              </a:buClr>
+              <a:buSzPts val="2000"/>
+              <a:buFont typeface="Arial"/>
+              <a:buChar char="•"/>
+              <a:defRPr sz="2000" b="0" i="0" u="none" strike="noStrike" cap="none">
+                <a:solidFill>
+                  <a:schemeClr val="dk1"/>
+                </a:solidFill>
+                <a:latin typeface="Calibri"/>
+                <a:ea typeface="Calibri"/>
+                <a:cs typeface="Calibri"/>
+                <a:sym typeface="Calibri"/>
+              </a:defRPr>
+            </a:lvl3pPr>
+            <a:lvl4pPr marL="1828800" marR="0" lvl="3" indent="-342900" algn="l" rtl="0">
+              <a:lnSpc>
+                <a:spcPct val="90000"/>
+              </a:lnSpc>
+              <a:spcBef>
+                <a:spcPts val="500"/>
+              </a:spcBef>
+              <a:spcAft>
+                <a:spcPts val="0"/>
+              </a:spcAft>
+              <a:buClr>
+                <a:schemeClr val="dk1"/>
+              </a:buClr>
+              <a:buSzPts val="1800"/>
+              <a:buFont typeface="Arial"/>
+              <a:buChar char="•"/>
+              <a:defRPr sz="1800" b="0" i="0" u="none" strike="noStrike" cap="none">
+                <a:solidFill>
+                  <a:schemeClr val="dk1"/>
+                </a:solidFill>
+                <a:latin typeface="Calibri"/>
+                <a:ea typeface="Calibri"/>
+                <a:cs typeface="Calibri"/>
+                <a:sym typeface="Calibri"/>
+              </a:defRPr>
+            </a:lvl4pPr>
+            <a:lvl5pPr marL="2286000" marR="0" lvl="4" indent="-342900" algn="l" rtl="0">
+              <a:lnSpc>
+                <a:spcPct val="90000"/>
+              </a:lnSpc>
+              <a:spcBef>
+                <a:spcPts val="500"/>
+              </a:spcBef>
+              <a:spcAft>
+                <a:spcPts val="0"/>
+              </a:spcAft>
+              <a:buClr>
+                <a:schemeClr val="dk1"/>
+              </a:buClr>
+              <a:buSzPts val="1800"/>
+              <a:buFont typeface="Arial"/>
+              <a:buChar char="•"/>
+              <a:defRPr sz="1800" b="0" i="0" u="none" strike="noStrike" cap="none">
+                <a:solidFill>
+                  <a:schemeClr val="dk1"/>
+                </a:solidFill>
+                <a:latin typeface="Calibri"/>
+                <a:ea typeface="Calibri"/>
+                <a:cs typeface="Calibri"/>
+                <a:sym typeface="Calibri"/>
+              </a:defRPr>
+            </a:lvl5pPr>
+            <a:lvl6pPr marL="2743200" marR="0" lvl="5" indent="-342900" algn="l" rtl="0">
+              <a:lnSpc>
+                <a:spcPct val="90000"/>
+              </a:lnSpc>
+              <a:spcBef>
+                <a:spcPts val="500"/>
+              </a:spcBef>
+              <a:spcAft>
+                <a:spcPts val="0"/>
+              </a:spcAft>
+              <a:buClr>
+                <a:schemeClr val="dk1"/>
+              </a:buClr>
+              <a:buSzPts val="1800"/>
+              <a:buFont typeface="Arial"/>
+              <a:buChar char="•"/>
+              <a:defRPr sz="1800" b="0" i="0" u="none" strike="noStrike" cap="none">
+                <a:solidFill>
+                  <a:schemeClr val="dk1"/>
+                </a:solidFill>
+                <a:latin typeface="Calibri"/>
+                <a:ea typeface="Calibri"/>
+                <a:cs typeface="Calibri"/>
+                <a:sym typeface="Calibri"/>
+              </a:defRPr>
+            </a:lvl6pPr>
+            <a:lvl7pPr marL="3200400" marR="0" lvl="6" indent="-342900" algn="l" rtl="0">
+              <a:lnSpc>
+                <a:spcPct val="90000"/>
+              </a:lnSpc>
+              <a:spcBef>
+                <a:spcPts val="500"/>
+              </a:spcBef>
+              <a:spcAft>
+                <a:spcPts val="0"/>
+              </a:spcAft>
+              <a:buClr>
+                <a:schemeClr val="dk1"/>
+              </a:buClr>
+              <a:buSzPts val="1800"/>
+              <a:buFont typeface="Arial"/>
+              <a:buChar char="•"/>
+              <a:defRPr sz="1800" b="0" i="0" u="none" strike="noStrike" cap="none">
+                <a:solidFill>
+                  <a:schemeClr val="dk1"/>
+                </a:solidFill>
+                <a:latin typeface="Calibri"/>
+                <a:ea typeface="Calibri"/>
+                <a:cs typeface="Calibri"/>
+                <a:sym typeface="Calibri"/>
+              </a:defRPr>
+            </a:lvl7pPr>
+            <a:lvl8pPr marL="3657600" marR="0" lvl="7" indent="-342900" algn="l" rtl="0">
+              <a:lnSpc>
+                <a:spcPct val="90000"/>
+              </a:lnSpc>
+              <a:spcBef>
+                <a:spcPts val="500"/>
+              </a:spcBef>
+              <a:spcAft>
+                <a:spcPts val="0"/>
+              </a:spcAft>
+              <a:buClr>
+                <a:schemeClr val="dk1"/>
+              </a:buClr>
+              <a:buSzPts val="1800"/>
+              <a:buFont typeface="Arial"/>
+              <a:buChar char="•"/>
+              <a:defRPr sz="1800" b="0" i="0" u="none" strike="noStrike" cap="none">
+                <a:solidFill>
+                  <a:schemeClr val="dk1"/>
+                </a:solidFill>
+                <a:latin typeface="Calibri"/>
+                <a:ea typeface="Calibri"/>
+                <a:cs typeface="Calibri"/>
+                <a:sym typeface="Calibri"/>
+              </a:defRPr>
+            </a:lvl8pPr>
+            <a:lvl9pPr marL="4114800" marR="0" lvl="8" indent="-342900" algn="l" rtl="0">
+              <a:lnSpc>
+                <a:spcPct val="90000"/>
+              </a:lnSpc>
+              <a:spcBef>
+                <a:spcPts val="500"/>
+              </a:spcBef>
+              <a:spcAft>
+                <a:spcPts val="0"/>
+              </a:spcAft>
+              <a:buClr>
+                <a:schemeClr val="dk1"/>
+              </a:buClr>
+              <a:buSzPts val="1800"/>
+              <a:buFont typeface="Arial"/>
+              <a:buChar char="•"/>
+              <a:defRPr sz="1800" b="0" i="0" u="none" strike="noStrike" cap="none">
+                <a:solidFill>
+                  <a:schemeClr val="dk1"/>
+                </a:solidFill>
+                <a:latin typeface="Calibri"/>
+                <a:ea typeface="Calibri"/>
+                <a:cs typeface="Calibri"/>
+                <a:sym typeface="Calibri"/>
+              </a:defRPr>
+            </a:lvl9pPr>
+          </a:lstStyle>
+          <a:p>
+            <a:pPr marL="177800" indent="0">
+              <a:spcBef>
+                <a:spcPts val="0"/>
+              </a:spcBef>
+              <a:buNone/>
+            </a:pPr>
+            <a:r>
+              <a:rPr lang="en-US" sz="2400" dirty="0">
+                <a:solidFill>
+                  <a:schemeClr val="accent6">
+                    <a:lumMod val="50000"/>
+                  </a:schemeClr>
+                </a:solidFill>
+                <a:latin typeface="Calibri" panose="020F0502020204030204" pitchFamily="34" charset="0"/>
+                <a:cs typeface="Calibri" panose="020F0502020204030204" pitchFamily="34" charset="0"/>
+              </a:rPr>
+              <a:t>Using competitive model structure and training on Costco locations to recommend where Costco should open a new location, specifically for hearing centers. </a:t>
+            </a:r>
+          </a:p>
+          <a:p>
+            <a:pPr marL="177800" indent="0">
+              <a:spcBef>
+                <a:spcPts val="0"/>
+              </a:spcBef>
+              <a:buNone/>
+            </a:pPr>
+            <a:r>
+              <a:rPr lang="en-US" sz="2400" dirty="0">
+                <a:solidFill>
+                  <a:schemeClr val="accent6">
+                    <a:lumMod val="50000"/>
+                  </a:schemeClr>
+                </a:solidFill>
+                <a:latin typeface="Calibri" panose="020F0502020204030204" pitchFamily="34" charset="0"/>
+                <a:cs typeface="Calibri" panose="020F0502020204030204" pitchFamily="34" charset="0"/>
+              </a:rPr>
+              <a:t>Using precision and recall rather than accuracy to predict where they should have a hearing center but don’t.</a:t>
+            </a:r>
+          </a:p>
+        </p:txBody>
+      </p:sp>
+      <p:sp>
+        <p:nvSpPr>
+          <p:cNvPr id="4" name="Google Shape;245;p14">
+            <a:extLst>
+              <a:ext uri="{FF2B5EF4-FFF2-40B4-BE49-F238E27FC236}">
+                <a16:creationId xmlns:a16="http://schemas.microsoft.com/office/drawing/2014/main" id="{7781BCA2-71CC-92E7-186E-719F8EC2CBFB}"/>
+              </a:ext>
+            </a:extLst>
+          </p:cNvPr>
+          <p:cNvSpPr txBox="1">
+            <a:spLocks/>
+          </p:cNvSpPr>
+          <p:nvPr/>
+        </p:nvSpPr>
+        <p:spPr>
+          <a:xfrm>
+            <a:off x="4358023" y="4559539"/>
+            <a:ext cx="3499301" cy="2227341"/>
+          </a:xfrm>
+          <a:prstGeom prst="rect">
+            <a:avLst/>
+          </a:prstGeom>
+          <a:noFill/>
+          <a:ln>
+            <a:noFill/>
+          </a:ln>
+        </p:spPr>
+        <p:txBody>
+          <a:bodyPr spcFirstLastPara="1" wrap="square" lIns="91425" tIns="45700" rIns="91425" bIns="45700" anchor="t" anchorCtr="0">
+            <a:normAutofit/>
+          </a:bodyPr>
+          <a:lstStyle>
+            <a:defPPr marR="0" lvl="0" algn="l" rtl="0">
+              <a:lnSpc>
+                <a:spcPct val="100000"/>
+              </a:lnSpc>
+              <a:spcBef>
+                <a:spcPts val="0"/>
+              </a:spcBef>
+              <a:spcAft>
+                <a:spcPts val="0"/>
+              </a:spcAft>
+            </a:defPPr>
+            <a:lvl1pPr marL="457200" marR="0" lvl="0" indent="-406400" algn="l" rtl="0">
+              <a:lnSpc>
+                <a:spcPct val="90000"/>
+              </a:lnSpc>
+              <a:spcBef>
+                <a:spcPts val="1000"/>
+              </a:spcBef>
+              <a:spcAft>
+                <a:spcPts val="0"/>
+              </a:spcAft>
+              <a:buClr>
+                <a:schemeClr val="dk1"/>
+              </a:buClr>
+              <a:buSzPts val="2800"/>
+              <a:buFont typeface="Arial"/>
+              <a:buChar char="•"/>
+              <a:defRPr sz="2800" b="0" i="0" u="none" strike="noStrike" cap="none">
+                <a:solidFill>
+                  <a:schemeClr val="dk1"/>
+                </a:solidFill>
+                <a:latin typeface="Calibri"/>
+                <a:ea typeface="Calibri"/>
+                <a:cs typeface="Calibri"/>
+                <a:sym typeface="Calibri"/>
+              </a:defRPr>
+            </a:lvl1pPr>
+            <a:lvl2pPr marL="914400" marR="0" lvl="1" indent="-381000" algn="l" rtl="0">
+              <a:lnSpc>
+                <a:spcPct val="90000"/>
+              </a:lnSpc>
+              <a:spcBef>
+                <a:spcPts val="500"/>
+              </a:spcBef>
+              <a:spcAft>
+                <a:spcPts val="0"/>
+              </a:spcAft>
+              <a:buClr>
+                <a:schemeClr val="dk1"/>
+              </a:buClr>
+              <a:buSzPts val="2400"/>
+              <a:buFont typeface="Arial"/>
+              <a:buChar char="•"/>
+              <a:defRPr sz="2400" b="0" i="0" u="none" strike="noStrike" cap="none">
+                <a:solidFill>
+                  <a:schemeClr val="dk1"/>
+                </a:solidFill>
+                <a:latin typeface="Calibri"/>
+                <a:ea typeface="Calibri"/>
+                <a:cs typeface="Calibri"/>
+                <a:sym typeface="Calibri"/>
+              </a:defRPr>
+            </a:lvl2pPr>
+            <a:lvl3pPr marL="1371600" marR="0" lvl="2" indent="-355600" algn="l" rtl="0">
+              <a:lnSpc>
+                <a:spcPct val="90000"/>
+              </a:lnSpc>
+              <a:spcBef>
+                <a:spcPts val="500"/>
+              </a:spcBef>
+              <a:spcAft>
+                <a:spcPts val="0"/>
+              </a:spcAft>
+              <a:buClr>
+                <a:schemeClr val="dk1"/>
+              </a:buClr>
+              <a:buSzPts val="2000"/>
+              <a:buFont typeface="Arial"/>
+              <a:buChar char="•"/>
+              <a:defRPr sz="2000" b="0" i="0" u="none" strike="noStrike" cap="none">
+                <a:solidFill>
+                  <a:schemeClr val="dk1"/>
+                </a:solidFill>
+                <a:latin typeface="Calibri"/>
+                <a:ea typeface="Calibri"/>
+                <a:cs typeface="Calibri"/>
+                <a:sym typeface="Calibri"/>
+              </a:defRPr>
+            </a:lvl3pPr>
+            <a:lvl4pPr marL="1828800" marR="0" lvl="3" indent="-342900" algn="l" rtl="0">
+              <a:lnSpc>
+                <a:spcPct val="90000"/>
+              </a:lnSpc>
+              <a:spcBef>
+                <a:spcPts val="500"/>
+              </a:spcBef>
+              <a:spcAft>
+                <a:spcPts val="0"/>
+              </a:spcAft>
+              <a:buClr>
+                <a:schemeClr val="dk1"/>
+              </a:buClr>
+              <a:buSzPts val="1800"/>
+              <a:buFont typeface="Arial"/>
+              <a:buChar char="•"/>
+              <a:defRPr sz="1800" b="0" i="0" u="none" strike="noStrike" cap="none">
+                <a:solidFill>
+                  <a:schemeClr val="dk1"/>
+                </a:solidFill>
+                <a:latin typeface="Calibri"/>
+                <a:ea typeface="Calibri"/>
+                <a:cs typeface="Calibri"/>
+                <a:sym typeface="Calibri"/>
+              </a:defRPr>
+            </a:lvl4pPr>
+            <a:lvl5pPr marL="2286000" marR="0" lvl="4" indent="-342900" algn="l" rtl="0">
+              <a:lnSpc>
+                <a:spcPct val="90000"/>
+              </a:lnSpc>
+              <a:spcBef>
+                <a:spcPts val="500"/>
+              </a:spcBef>
+              <a:spcAft>
+                <a:spcPts val="0"/>
+              </a:spcAft>
+              <a:buClr>
+                <a:schemeClr val="dk1"/>
+              </a:buClr>
+              <a:buSzPts val="1800"/>
+              <a:buFont typeface="Arial"/>
+              <a:buChar char="•"/>
+              <a:defRPr sz="1800" b="0" i="0" u="none" strike="noStrike" cap="none">
+                <a:solidFill>
+                  <a:schemeClr val="dk1"/>
+                </a:solidFill>
+                <a:latin typeface="Calibri"/>
+                <a:ea typeface="Calibri"/>
+                <a:cs typeface="Calibri"/>
+                <a:sym typeface="Calibri"/>
+              </a:defRPr>
+            </a:lvl5pPr>
+            <a:lvl6pPr marL="2743200" marR="0" lvl="5" indent="-342900" algn="l" rtl="0">
+              <a:lnSpc>
+                <a:spcPct val="90000"/>
+              </a:lnSpc>
+              <a:spcBef>
+                <a:spcPts val="500"/>
+              </a:spcBef>
+              <a:spcAft>
+                <a:spcPts val="0"/>
+              </a:spcAft>
+              <a:buClr>
+                <a:schemeClr val="dk1"/>
+              </a:buClr>
+              <a:buSzPts val="1800"/>
+              <a:buFont typeface="Arial"/>
+              <a:buChar char="•"/>
+              <a:defRPr sz="1800" b="0" i="0" u="none" strike="noStrike" cap="none">
+                <a:solidFill>
+                  <a:schemeClr val="dk1"/>
+                </a:solidFill>
+                <a:latin typeface="Calibri"/>
+                <a:ea typeface="Calibri"/>
+                <a:cs typeface="Calibri"/>
+                <a:sym typeface="Calibri"/>
+              </a:defRPr>
+            </a:lvl6pPr>
+            <a:lvl7pPr marL="3200400" marR="0" lvl="6" indent="-342900" algn="l" rtl="0">
+              <a:lnSpc>
+                <a:spcPct val="90000"/>
+              </a:lnSpc>
+              <a:spcBef>
+                <a:spcPts val="500"/>
+              </a:spcBef>
+              <a:spcAft>
+                <a:spcPts val="0"/>
+              </a:spcAft>
+              <a:buClr>
+                <a:schemeClr val="dk1"/>
+              </a:buClr>
+              <a:buSzPts val="1800"/>
+              <a:buFont typeface="Arial"/>
+              <a:buChar char="•"/>
+              <a:defRPr sz="1800" b="0" i="0" u="none" strike="noStrike" cap="none">
+                <a:solidFill>
+                  <a:schemeClr val="dk1"/>
+                </a:solidFill>
+                <a:latin typeface="Calibri"/>
+                <a:ea typeface="Calibri"/>
+                <a:cs typeface="Calibri"/>
+                <a:sym typeface="Calibri"/>
+              </a:defRPr>
+            </a:lvl7pPr>
+            <a:lvl8pPr marL="3657600" marR="0" lvl="7" indent="-342900" algn="l" rtl="0">
+              <a:lnSpc>
+                <a:spcPct val="90000"/>
+              </a:lnSpc>
+              <a:spcBef>
+                <a:spcPts val="500"/>
+              </a:spcBef>
+              <a:spcAft>
+                <a:spcPts val="0"/>
+              </a:spcAft>
+              <a:buClr>
+                <a:schemeClr val="dk1"/>
+              </a:buClr>
+              <a:buSzPts val="1800"/>
+              <a:buFont typeface="Arial"/>
+              <a:buChar char="•"/>
+              <a:defRPr sz="1800" b="0" i="0" u="none" strike="noStrike" cap="none">
+                <a:solidFill>
+                  <a:schemeClr val="dk1"/>
+                </a:solidFill>
+                <a:latin typeface="Calibri"/>
+                <a:ea typeface="Calibri"/>
+                <a:cs typeface="Calibri"/>
+                <a:sym typeface="Calibri"/>
+              </a:defRPr>
+            </a:lvl8pPr>
+            <a:lvl9pPr marL="4114800" marR="0" lvl="8" indent="-342900" algn="l" rtl="0">
+              <a:lnSpc>
+                <a:spcPct val="90000"/>
+              </a:lnSpc>
+              <a:spcBef>
+                <a:spcPts val="500"/>
+              </a:spcBef>
+              <a:spcAft>
+                <a:spcPts val="0"/>
+              </a:spcAft>
+              <a:buClr>
+                <a:schemeClr val="dk1"/>
+              </a:buClr>
+              <a:buSzPts val="1800"/>
+              <a:buFont typeface="Arial"/>
+              <a:buChar char="•"/>
+              <a:defRPr sz="1800" b="0" i="0" u="none" strike="noStrike" cap="none">
+                <a:solidFill>
+                  <a:schemeClr val="dk1"/>
+                </a:solidFill>
+                <a:latin typeface="Calibri"/>
+                <a:ea typeface="Calibri"/>
+                <a:cs typeface="Calibri"/>
+                <a:sym typeface="Calibri"/>
+              </a:defRPr>
+            </a:lvl9pPr>
+          </a:lstStyle>
+          <a:p>
+            <a:pPr marL="177800" lvl="0" indent="0" algn="l" rtl="0">
+              <a:lnSpc>
+                <a:spcPct val="90000"/>
+              </a:lnSpc>
+              <a:spcBef>
+                <a:spcPts val="0"/>
+              </a:spcBef>
+              <a:spcAft>
+                <a:spcPts val="0"/>
+              </a:spcAft>
+              <a:buClr>
+                <a:schemeClr val="dk1"/>
+              </a:buClr>
+              <a:buSzPts val="2800"/>
+              <a:buNone/>
+            </a:pPr>
+            <a:r>
+              <a:rPr lang="en-US" sz="1900" dirty="0">
+                <a:latin typeface="Calibri" panose="020F0502020204030204" pitchFamily="34" charset="0"/>
+                <a:cs typeface="Calibri" panose="020F0502020204030204" pitchFamily="34" charset="0"/>
+              </a:rPr>
+              <a:t>Supervised Machine Learning:</a:t>
+            </a:r>
+          </a:p>
+          <a:p>
+            <a:pPr marL="177800" lvl="0" indent="0" algn="l" rtl="0">
+              <a:lnSpc>
+                <a:spcPct val="90000"/>
+              </a:lnSpc>
+              <a:spcBef>
+                <a:spcPts val="0"/>
+              </a:spcBef>
+              <a:spcAft>
+                <a:spcPts val="0"/>
+              </a:spcAft>
+              <a:buClr>
+                <a:schemeClr val="dk1"/>
+              </a:buClr>
+              <a:buSzPts val="2800"/>
+              <a:buNone/>
+            </a:pPr>
+            <a:r>
+              <a:rPr lang="en-US" sz="1900" i="1" u="sng" dirty="0">
+                <a:latin typeface="Calibri" panose="020F0502020204030204" pitchFamily="34" charset="0"/>
+                <a:cs typeface="Calibri" panose="020F0502020204030204" pitchFamily="34" charset="0"/>
+              </a:rPr>
+              <a:t>SMOTEENN</a:t>
+            </a:r>
+          </a:p>
+          <a:p>
+            <a:pPr marL="635000" indent="-457200">
+              <a:spcBef>
+                <a:spcPts val="0"/>
+              </a:spcBef>
+              <a:buFont typeface="Arial" panose="020B0604020202020204" pitchFamily="34" charset="0"/>
+              <a:buChar char="•"/>
+            </a:pPr>
+            <a:r>
+              <a:rPr lang="en-US" sz="1900" dirty="0">
+                <a:latin typeface="Calibri" panose="020F0502020204030204" pitchFamily="34" charset="0"/>
+                <a:cs typeface="Calibri" panose="020F0502020204030204" pitchFamily="34" charset="0"/>
+              </a:rPr>
+              <a:t>Chooses random points from training data-set to perform calculations (imbalanced classification) </a:t>
+            </a:r>
+            <a:endParaRPr lang="en-US" sz="2300" dirty="0">
+              <a:latin typeface="Calibri" panose="020F0502020204030204" pitchFamily="34" charset="0"/>
+              <a:cs typeface="Calibri" panose="020F0502020204030204" pitchFamily="34" charset="0"/>
+            </a:endParaRPr>
+          </a:p>
+          <a:p>
+            <a:pPr marL="1092200" lvl="1" indent="-457200">
+              <a:spcBef>
+                <a:spcPts val="0"/>
+              </a:spcBef>
+              <a:buSzPts val="2800"/>
+              <a:buFont typeface="Arial" panose="020B0604020202020204" pitchFamily="34" charset="0"/>
+              <a:buChar char="•"/>
+            </a:pPr>
+            <a:r>
+              <a:rPr lang="en-US" sz="1600" dirty="0">
+                <a:latin typeface="Calibri" panose="020F0502020204030204" pitchFamily="34" charset="0"/>
+                <a:cs typeface="Calibri" panose="020F0502020204030204" pitchFamily="34" charset="0"/>
+              </a:rPr>
+              <a:t>Accuracy is</a:t>
+            </a:r>
+          </a:p>
+          <a:p>
+            <a:pPr marL="177800" lvl="0" indent="0" algn="l" rtl="0">
+              <a:lnSpc>
+                <a:spcPct val="90000"/>
+              </a:lnSpc>
+              <a:spcBef>
+                <a:spcPts val="0"/>
+              </a:spcBef>
+              <a:spcAft>
+                <a:spcPts val="0"/>
+              </a:spcAft>
+              <a:buClr>
+                <a:schemeClr val="dk1"/>
+              </a:buClr>
+              <a:buSzPts val="2800"/>
+              <a:buNone/>
+            </a:pPr>
+            <a:endParaRPr lang="en-US" sz="1900" dirty="0">
+              <a:latin typeface="Calibri" panose="020F0502020204030204" pitchFamily="34" charset="0"/>
+              <a:cs typeface="Calibri" panose="020F0502020204030204" pitchFamily="34" charset="0"/>
+            </a:endParaRPr>
+          </a:p>
+        </p:txBody>
+      </p:sp>
+      <p:sp>
+        <p:nvSpPr>
+          <p:cNvPr id="5" name="Google Shape;245;p14">
+            <a:extLst>
+              <a:ext uri="{FF2B5EF4-FFF2-40B4-BE49-F238E27FC236}">
+                <a16:creationId xmlns:a16="http://schemas.microsoft.com/office/drawing/2014/main" id="{7C161DFA-049D-90F6-EA65-06C38C5C0860}"/>
+              </a:ext>
+            </a:extLst>
+          </p:cNvPr>
+          <p:cNvSpPr txBox="1">
+            <a:spLocks/>
+          </p:cNvSpPr>
+          <p:nvPr/>
+        </p:nvSpPr>
+        <p:spPr>
+          <a:xfrm>
+            <a:off x="244458" y="4510226"/>
+            <a:ext cx="4090219" cy="2276653"/>
+          </a:xfrm>
+          <a:prstGeom prst="rect">
+            <a:avLst/>
+          </a:prstGeom>
+          <a:noFill/>
+          <a:ln>
+            <a:noFill/>
+          </a:ln>
+        </p:spPr>
+        <p:txBody>
+          <a:bodyPr spcFirstLastPara="1" wrap="square" lIns="91425" tIns="45700" rIns="91425" bIns="45700" anchor="t" anchorCtr="0">
+            <a:noAutofit/>
+          </a:bodyPr>
+          <a:lstStyle>
+            <a:defPPr marR="0" lvl="0" algn="l" rtl="0">
+              <a:lnSpc>
+                <a:spcPct val="100000"/>
+              </a:lnSpc>
+              <a:spcBef>
+                <a:spcPts val="0"/>
+              </a:spcBef>
+              <a:spcAft>
+                <a:spcPts val="0"/>
+              </a:spcAft>
+            </a:defPPr>
+            <a:lvl1pPr marL="457200" marR="0" lvl="0" indent="-406400" algn="l" rtl="0">
+              <a:lnSpc>
+                <a:spcPct val="90000"/>
+              </a:lnSpc>
+              <a:spcBef>
+                <a:spcPts val="1000"/>
+              </a:spcBef>
+              <a:spcAft>
+                <a:spcPts val="0"/>
+              </a:spcAft>
+              <a:buClr>
+                <a:schemeClr val="dk1"/>
+              </a:buClr>
+              <a:buSzPts val="2800"/>
+              <a:buFont typeface="Arial"/>
+              <a:buChar char="•"/>
+              <a:defRPr sz="2800" b="0" i="0" u="none" strike="noStrike" cap="none">
+                <a:solidFill>
+                  <a:schemeClr val="dk1"/>
+                </a:solidFill>
+                <a:latin typeface="Calibri"/>
+                <a:ea typeface="Calibri"/>
+                <a:cs typeface="Calibri"/>
+                <a:sym typeface="Calibri"/>
+              </a:defRPr>
+            </a:lvl1pPr>
+            <a:lvl2pPr marL="914400" marR="0" lvl="1" indent="-381000" algn="l" rtl="0">
+              <a:lnSpc>
+                <a:spcPct val="90000"/>
+              </a:lnSpc>
+              <a:spcBef>
+                <a:spcPts val="500"/>
+              </a:spcBef>
+              <a:spcAft>
+                <a:spcPts val="0"/>
+              </a:spcAft>
+              <a:buClr>
+                <a:schemeClr val="dk1"/>
+              </a:buClr>
+              <a:buSzPts val="2400"/>
+              <a:buFont typeface="Arial"/>
+              <a:buChar char="•"/>
+              <a:defRPr sz="2400" b="0" i="0" u="none" strike="noStrike" cap="none">
+                <a:solidFill>
+                  <a:schemeClr val="dk1"/>
+                </a:solidFill>
+                <a:latin typeface="Calibri"/>
+                <a:ea typeface="Calibri"/>
+                <a:cs typeface="Calibri"/>
+                <a:sym typeface="Calibri"/>
+              </a:defRPr>
+            </a:lvl2pPr>
+            <a:lvl3pPr marL="1371600" marR="0" lvl="2" indent="-355600" algn="l" rtl="0">
+              <a:lnSpc>
+                <a:spcPct val="90000"/>
+              </a:lnSpc>
+              <a:spcBef>
+                <a:spcPts val="500"/>
+              </a:spcBef>
+              <a:spcAft>
+                <a:spcPts val="0"/>
+              </a:spcAft>
+              <a:buClr>
+                <a:schemeClr val="dk1"/>
+              </a:buClr>
+              <a:buSzPts val="2000"/>
+              <a:buFont typeface="Arial"/>
+              <a:buChar char="•"/>
+              <a:defRPr sz="2000" b="0" i="0" u="none" strike="noStrike" cap="none">
+                <a:solidFill>
+                  <a:schemeClr val="dk1"/>
+                </a:solidFill>
+                <a:latin typeface="Calibri"/>
+                <a:ea typeface="Calibri"/>
+                <a:cs typeface="Calibri"/>
+                <a:sym typeface="Calibri"/>
+              </a:defRPr>
+            </a:lvl3pPr>
+            <a:lvl4pPr marL="1828800" marR="0" lvl="3" indent="-342900" algn="l" rtl="0">
+              <a:lnSpc>
+                <a:spcPct val="90000"/>
+              </a:lnSpc>
+              <a:spcBef>
+                <a:spcPts val="500"/>
+              </a:spcBef>
+              <a:spcAft>
+                <a:spcPts val="0"/>
+              </a:spcAft>
+              <a:buClr>
+                <a:schemeClr val="dk1"/>
+              </a:buClr>
+              <a:buSzPts val="1800"/>
+              <a:buFont typeface="Arial"/>
+              <a:buChar char="•"/>
+              <a:defRPr sz="1800" b="0" i="0" u="none" strike="noStrike" cap="none">
+                <a:solidFill>
+                  <a:schemeClr val="dk1"/>
+                </a:solidFill>
+                <a:latin typeface="Calibri"/>
+                <a:ea typeface="Calibri"/>
+                <a:cs typeface="Calibri"/>
+                <a:sym typeface="Calibri"/>
+              </a:defRPr>
+            </a:lvl4pPr>
+            <a:lvl5pPr marL="2286000" marR="0" lvl="4" indent="-342900" algn="l" rtl="0">
+              <a:lnSpc>
+                <a:spcPct val="90000"/>
+              </a:lnSpc>
+              <a:spcBef>
+                <a:spcPts val="500"/>
+              </a:spcBef>
+              <a:spcAft>
+                <a:spcPts val="0"/>
+              </a:spcAft>
+              <a:buClr>
+                <a:schemeClr val="dk1"/>
+              </a:buClr>
+              <a:buSzPts val="1800"/>
+              <a:buFont typeface="Arial"/>
+              <a:buChar char="•"/>
+              <a:defRPr sz="1800" b="0" i="0" u="none" strike="noStrike" cap="none">
+                <a:solidFill>
+                  <a:schemeClr val="dk1"/>
+                </a:solidFill>
+                <a:latin typeface="Calibri"/>
+                <a:ea typeface="Calibri"/>
+                <a:cs typeface="Calibri"/>
+                <a:sym typeface="Calibri"/>
+              </a:defRPr>
+            </a:lvl5pPr>
+            <a:lvl6pPr marL="2743200" marR="0" lvl="5" indent="-342900" algn="l" rtl="0">
+              <a:lnSpc>
+                <a:spcPct val="90000"/>
+              </a:lnSpc>
+              <a:spcBef>
+                <a:spcPts val="500"/>
+              </a:spcBef>
+              <a:spcAft>
+                <a:spcPts val="0"/>
+              </a:spcAft>
+              <a:buClr>
+                <a:schemeClr val="dk1"/>
+              </a:buClr>
+              <a:buSzPts val="1800"/>
+              <a:buFont typeface="Arial"/>
+              <a:buChar char="•"/>
+              <a:defRPr sz="1800" b="0" i="0" u="none" strike="noStrike" cap="none">
+                <a:solidFill>
+                  <a:schemeClr val="dk1"/>
+                </a:solidFill>
+                <a:latin typeface="Calibri"/>
+                <a:ea typeface="Calibri"/>
+                <a:cs typeface="Calibri"/>
+                <a:sym typeface="Calibri"/>
+              </a:defRPr>
+            </a:lvl6pPr>
+            <a:lvl7pPr marL="3200400" marR="0" lvl="6" indent="-342900" algn="l" rtl="0">
+              <a:lnSpc>
+                <a:spcPct val="90000"/>
+              </a:lnSpc>
+              <a:spcBef>
+                <a:spcPts val="500"/>
+              </a:spcBef>
+              <a:spcAft>
+                <a:spcPts val="0"/>
+              </a:spcAft>
+              <a:buClr>
+                <a:schemeClr val="dk1"/>
+              </a:buClr>
+              <a:buSzPts val="1800"/>
+              <a:buFont typeface="Arial"/>
+              <a:buChar char="•"/>
+              <a:defRPr sz="1800" b="0" i="0" u="none" strike="noStrike" cap="none">
+                <a:solidFill>
+                  <a:schemeClr val="dk1"/>
+                </a:solidFill>
+                <a:latin typeface="Calibri"/>
+                <a:ea typeface="Calibri"/>
+                <a:cs typeface="Calibri"/>
+                <a:sym typeface="Calibri"/>
+              </a:defRPr>
+            </a:lvl7pPr>
+            <a:lvl8pPr marL="3657600" marR="0" lvl="7" indent="-342900" algn="l" rtl="0">
+              <a:lnSpc>
+                <a:spcPct val="90000"/>
+              </a:lnSpc>
+              <a:spcBef>
+                <a:spcPts val="500"/>
+              </a:spcBef>
+              <a:spcAft>
+                <a:spcPts val="0"/>
+              </a:spcAft>
+              <a:buClr>
+                <a:schemeClr val="dk1"/>
+              </a:buClr>
+              <a:buSzPts val="1800"/>
+              <a:buFont typeface="Arial"/>
+              <a:buChar char="•"/>
+              <a:defRPr sz="1800" b="0" i="0" u="none" strike="noStrike" cap="none">
+                <a:solidFill>
+                  <a:schemeClr val="dk1"/>
+                </a:solidFill>
+                <a:latin typeface="Calibri"/>
+                <a:ea typeface="Calibri"/>
+                <a:cs typeface="Calibri"/>
+                <a:sym typeface="Calibri"/>
+              </a:defRPr>
+            </a:lvl8pPr>
+            <a:lvl9pPr marL="4114800" marR="0" lvl="8" indent="-342900" algn="l" rtl="0">
+              <a:lnSpc>
+                <a:spcPct val="90000"/>
+              </a:lnSpc>
+              <a:spcBef>
+                <a:spcPts val="500"/>
+              </a:spcBef>
+              <a:spcAft>
+                <a:spcPts val="0"/>
+              </a:spcAft>
+              <a:buClr>
+                <a:schemeClr val="dk1"/>
+              </a:buClr>
+              <a:buSzPts val="1800"/>
+              <a:buFont typeface="Arial"/>
+              <a:buChar char="•"/>
+              <a:defRPr sz="1800" b="0" i="0" u="none" strike="noStrike" cap="none">
+                <a:solidFill>
+                  <a:schemeClr val="dk1"/>
+                </a:solidFill>
+                <a:latin typeface="Calibri"/>
+                <a:ea typeface="Calibri"/>
+                <a:cs typeface="Calibri"/>
+                <a:sym typeface="Calibri"/>
+              </a:defRPr>
+            </a:lvl9pPr>
+          </a:lstStyle>
+          <a:p>
+            <a:pPr marL="177800" lvl="0" indent="0" algn="l" rtl="0">
+              <a:lnSpc>
+                <a:spcPct val="90000"/>
+              </a:lnSpc>
+              <a:spcBef>
+                <a:spcPts val="0"/>
+              </a:spcBef>
+              <a:spcAft>
+                <a:spcPts val="0"/>
+              </a:spcAft>
+              <a:buClr>
+                <a:schemeClr val="dk1"/>
+              </a:buClr>
+              <a:buSzPts val="2800"/>
+              <a:buNone/>
+            </a:pPr>
+            <a:r>
+              <a:rPr lang="en-US" sz="1900" dirty="0">
+                <a:latin typeface="Calibri" panose="020F0502020204030204" pitchFamily="34" charset="0"/>
+                <a:cs typeface="Calibri" panose="020F0502020204030204" pitchFamily="34" charset="0"/>
+              </a:rPr>
+              <a:t>Supervised Machine Learning:</a:t>
+            </a:r>
+          </a:p>
+          <a:p>
+            <a:pPr marL="177800" lvl="0" indent="0" algn="l" rtl="0">
+              <a:lnSpc>
+                <a:spcPct val="90000"/>
+              </a:lnSpc>
+              <a:spcBef>
+                <a:spcPts val="0"/>
+              </a:spcBef>
+              <a:spcAft>
+                <a:spcPts val="0"/>
+              </a:spcAft>
+              <a:buClr>
+                <a:schemeClr val="dk1"/>
+              </a:buClr>
+              <a:buSzPts val="2800"/>
+              <a:buNone/>
+            </a:pPr>
+            <a:r>
+              <a:rPr lang="en-US" sz="1900" i="1" u="sng" dirty="0">
+                <a:latin typeface="Calibri" panose="020F0502020204030204" pitchFamily="34" charset="0"/>
+                <a:cs typeface="Calibri" panose="020F0502020204030204" pitchFamily="34" charset="0"/>
+              </a:rPr>
+              <a:t>RandomForest</a:t>
+            </a:r>
+          </a:p>
+          <a:p>
+            <a:pPr marL="520700" lvl="0" indent="-342900" algn="l" rtl="0">
+              <a:lnSpc>
+                <a:spcPct val="90000"/>
+              </a:lnSpc>
+              <a:spcBef>
+                <a:spcPts val="0"/>
+              </a:spcBef>
+              <a:spcAft>
+                <a:spcPts val="0"/>
+              </a:spcAft>
+              <a:buClr>
+                <a:schemeClr val="dk1"/>
+              </a:buClr>
+              <a:buSzPts val="2800"/>
+              <a:buFont typeface="Arial" panose="020B0604020202020204" pitchFamily="34" charset="0"/>
+              <a:buChar char="•"/>
+            </a:pPr>
+            <a:r>
+              <a:rPr lang="en-US" sz="1900" dirty="0">
+                <a:latin typeface="Calibri" panose="020F0502020204030204" pitchFamily="34" charset="0"/>
+                <a:cs typeface="Calibri" panose="020F0502020204030204" pitchFamily="34" charset="0"/>
+              </a:rPr>
+              <a:t>Builds decision trees on different samples</a:t>
+            </a:r>
+          </a:p>
+          <a:p>
+            <a:pPr marL="520700" lvl="0" indent="-342900" algn="l" rtl="0">
+              <a:lnSpc>
+                <a:spcPct val="90000"/>
+              </a:lnSpc>
+              <a:spcBef>
+                <a:spcPts val="0"/>
+              </a:spcBef>
+              <a:spcAft>
+                <a:spcPts val="0"/>
+              </a:spcAft>
+              <a:buClr>
+                <a:schemeClr val="dk1"/>
+              </a:buClr>
+              <a:buSzPts val="2800"/>
+              <a:buFont typeface="Arial" panose="020B0604020202020204" pitchFamily="34" charset="0"/>
+              <a:buChar char="•"/>
+            </a:pPr>
+            <a:r>
+              <a:rPr lang="en-US" sz="1900" dirty="0">
+                <a:latin typeface="Calibri" panose="020F0502020204030204" pitchFamily="34" charset="0"/>
+                <a:cs typeface="Calibri" panose="020F0502020204030204" pitchFamily="34" charset="0"/>
+              </a:rPr>
+              <a:t>Calculates majority for classification</a:t>
+            </a:r>
+          </a:p>
+          <a:p>
+            <a:pPr marL="520700" lvl="0" indent="-342900" algn="l" rtl="0">
+              <a:lnSpc>
+                <a:spcPct val="90000"/>
+              </a:lnSpc>
+              <a:spcBef>
+                <a:spcPts val="0"/>
+              </a:spcBef>
+              <a:spcAft>
+                <a:spcPts val="0"/>
+              </a:spcAft>
+              <a:buClr>
+                <a:schemeClr val="dk1"/>
+              </a:buClr>
+              <a:buSzPts val="2800"/>
+              <a:buFont typeface="Arial" panose="020B0604020202020204" pitchFamily="34" charset="0"/>
+              <a:buChar char="•"/>
+            </a:pPr>
+            <a:r>
+              <a:rPr lang="en-US" sz="1900" dirty="0">
+                <a:latin typeface="Calibri" panose="020F0502020204030204" pitchFamily="34" charset="0"/>
+                <a:cs typeface="Calibri" panose="020F0502020204030204" pitchFamily="34" charset="0"/>
+              </a:rPr>
+              <a:t>Calculates average for regression</a:t>
+            </a:r>
+          </a:p>
+          <a:p>
+            <a:pPr marL="1092200" lvl="1" indent="-457200">
+              <a:spcBef>
+                <a:spcPts val="0"/>
+              </a:spcBef>
+              <a:buSzPts val="2800"/>
+              <a:buFont typeface="Arial" panose="020B0604020202020204" pitchFamily="34" charset="0"/>
+              <a:buChar char="•"/>
+            </a:pPr>
+            <a:r>
+              <a:rPr lang="en-US" sz="1600" dirty="0">
+                <a:latin typeface="Calibri" panose="020F0502020204030204" pitchFamily="34" charset="0"/>
+                <a:cs typeface="Calibri" panose="020F0502020204030204" pitchFamily="34" charset="0"/>
+              </a:rPr>
+              <a:t>Accuracy is </a:t>
+            </a:r>
+          </a:p>
+        </p:txBody>
+      </p:sp>
+      <p:sp>
+        <p:nvSpPr>
+          <p:cNvPr id="6" name="Google Shape;245;p14">
+            <a:extLst>
+              <a:ext uri="{FF2B5EF4-FFF2-40B4-BE49-F238E27FC236}">
+                <a16:creationId xmlns:a16="http://schemas.microsoft.com/office/drawing/2014/main" id="{556620CE-7115-9445-DA00-A0367CB6FCDD}"/>
+              </a:ext>
+            </a:extLst>
+          </p:cNvPr>
+          <p:cNvSpPr txBox="1">
+            <a:spLocks/>
+          </p:cNvSpPr>
+          <p:nvPr/>
+        </p:nvSpPr>
+        <p:spPr>
+          <a:xfrm>
+            <a:off x="7857324" y="4585208"/>
+            <a:ext cx="3822415" cy="2201672"/>
+          </a:xfrm>
+          <a:prstGeom prst="rect">
+            <a:avLst/>
+          </a:prstGeom>
+          <a:noFill/>
+          <a:ln>
+            <a:noFill/>
+          </a:ln>
+        </p:spPr>
+        <p:txBody>
+          <a:bodyPr spcFirstLastPara="1" wrap="square" lIns="91425" tIns="45700" rIns="91425" bIns="45700" anchor="t" anchorCtr="0">
+            <a:normAutofit/>
+          </a:bodyPr>
+          <a:lstStyle>
+            <a:defPPr marR="0" lvl="0" algn="l" rtl="0">
+              <a:lnSpc>
+                <a:spcPct val="100000"/>
+              </a:lnSpc>
+              <a:spcBef>
+                <a:spcPts val="0"/>
+              </a:spcBef>
+              <a:spcAft>
+                <a:spcPts val="0"/>
+              </a:spcAft>
+            </a:defPPr>
+            <a:lvl1pPr marL="457200" marR="0" lvl="0" indent="-406400" algn="l" rtl="0">
+              <a:lnSpc>
+                <a:spcPct val="90000"/>
+              </a:lnSpc>
+              <a:spcBef>
+                <a:spcPts val="1000"/>
+              </a:spcBef>
+              <a:spcAft>
+                <a:spcPts val="0"/>
+              </a:spcAft>
+              <a:buClr>
+                <a:schemeClr val="dk1"/>
+              </a:buClr>
+              <a:buSzPts val="2800"/>
+              <a:buFont typeface="Arial"/>
+              <a:buChar char="•"/>
+              <a:defRPr sz="2800" b="0" i="0" u="none" strike="noStrike" cap="none">
+                <a:solidFill>
+                  <a:schemeClr val="dk1"/>
+                </a:solidFill>
+                <a:latin typeface="Calibri"/>
+                <a:ea typeface="Calibri"/>
+                <a:cs typeface="Calibri"/>
+                <a:sym typeface="Calibri"/>
+              </a:defRPr>
+            </a:lvl1pPr>
+            <a:lvl2pPr marL="914400" marR="0" lvl="1" indent="-381000" algn="l" rtl="0">
+              <a:lnSpc>
+                <a:spcPct val="90000"/>
+              </a:lnSpc>
+              <a:spcBef>
+                <a:spcPts val="500"/>
+              </a:spcBef>
+              <a:spcAft>
+                <a:spcPts val="0"/>
+              </a:spcAft>
+              <a:buClr>
+                <a:schemeClr val="dk1"/>
+              </a:buClr>
+              <a:buSzPts val="2400"/>
+              <a:buFont typeface="Arial"/>
+              <a:buChar char="•"/>
+              <a:defRPr sz="2400" b="0" i="0" u="none" strike="noStrike" cap="none">
+                <a:solidFill>
+                  <a:schemeClr val="dk1"/>
+                </a:solidFill>
+                <a:latin typeface="Calibri"/>
+                <a:ea typeface="Calibri"/>
+                <a:cs typeface="Calibri"/>
+                <a:sym typeface="Calibri"/>
+              </a:defRPr>
+            </a:lvl2pPr>
+            <a:lvl3pPr marL="1371600" marR="0" lvl="2" indent="-355600" algn="l" rtl="0">
+              <a:lnSpc>
+                <a:spcPct val="90000"/>
+              </a:lnSpc>
+              <a:spcBef>
+                <a:spcPts val="500"/>
+              </a:spcBef>
+              <a:spcAft>
+                <a:spcPts val="0"/>
+              </a:spcAft>
+              <a:buClr>
+                <a:schemeClr val="dk1"/>
+              </a:buClr>
+              <a:buSzPts val="2000"/>
+              <a:buFont typeface="Arial"/>
+              <a:buChar char="•"/>
+              <a:defRPr sz="2000" b="0" i="0" u="none" strike="noStrike" cap="none">
+                <a:solidFill>
+                  <a:schemeClr val="dk1"/>
+                </a:solidFill>
+                <a:latin typeface="Calibri"/>
+                <a:ea typeface="Calibri"/>
+                <a:cs typeface="Calibri"/>
+                <a:sym typeface="Calibri"/>
+              </a:defRPr>
+            </a:lvl3pPr>
+            <a:lvl4pPr marL="1828800" marR="0" lvl="3" indent="-342900" algn="l" rtl="0">
+              <a:lnSpc>
+                <a:spcPct val="90000"/>
+              </a:lnSpc>
+              <a:spcBef>
+                <a:spcPts val="500"/>
+              </a:spcBef>
+              <a:spcAft>
+                <a:spcPts val="0"/>
+              </a:spcAft>
+              <a:buClr>
+                <a:schemeClr val="dk1"/>
+              </a:buClr>
+              <a:buSzPts val="1800"/>
+              <a:buFont typeface="Arial"/>
+              <a:buChar char="•"/>
+              <a:defRPr sz="1800" b="0" i="0" u="none" strike="noStrike" cap="none">
+                <a:solidFill>
+                  <a:schemeClr val="dk1"/>
+                </a:solidFill>
+                <a:latin typeface="Calibri"/>
+                <a:ea typeface="Calibri"/>
+                <a:cs typeface="Calibri"/>
+                <a:sym typeface="Calibri"/>
+              </a:defRPr>
+            </a:lvl4pPr>
+            <a:lvl5pPr marL="2286000" marR="0" lvl="4" indent="-342900" algn="l" rtl="0">
+              <a:lnSpc>
+                <a:spcPct val="90000"/>
+              </a:lnSpc>
+              <a:spcBef>
+                <a:spcPts val="500"/>
+              </a:spcBef>
+              <a:spcAft>
+                <a:spcPts val="0"/>
+              </a:spcAft>
+              <a:buClr>
+                <a:schemeClr val="dk1"/>
+              </a:buClr>
+              <a:buSzPts val="1800"/>
+              <a:buFont typeface="Arial"/>
+              <a:buChar char="•"/>
+              <a:defRPr sz="1800" b="0" i="0" u="none" strike="noStrike" cap="none">
+                <a:solidFill>
+                  <a:schemeClr val="dk1"/>
+                </a:solidFill>
+                <a:latin typeface="Calibri"/>
+                <a:ea typeface="Calibri"/>
+                <a:cs typeface="Calibri"/>
+                <a:sym typeface="Calibri"/>
+              </a:defRPr>
+            </a:lvl5pPr>
+            <a:lvl6pPr marL="2743200" marR="0" lvl="5" indent="-342900" algn="l" rtl="0">
+              <a:lnSpc>
+                <a:spcPct val="90000"/>
+              </a:lnSpc>
+              <a:spcBef>
+                <a:spcPts val="500"/>
+              </a:spcBef>
+              <a:spcAft>
+                <a:spcPts val="0"/>
+              </a:spcAft>
+              <a:buClr>
+                <a:schemeClr val="dk1"/>
+              </a:buClr>
+              <a:buSzPts val="1800"/>
+              <a:buFont typeface="Arial"/>
+              <a:buChar char="•"/>
+              <a:defRPr sz="1800" b="0" i="0" u="none" strike="noStrike" cap="none">
+                <a:solidFill>
+                  <a:schemeClr val="dk1"/>
+                </a:solidFill>
+                <a:latin typeface="Calibri"/>
+                <a:ea typeface="Calibri"/>
+                <a:cs typeface="Calibri"/>
+                <a:sym typeface="Calibri"/>
+              </a:defRPr>
+            </a:lvl6pPr>
+            <a:lvl7pPr marL="3200400" marR="0" lvl="6" indent="-342900" algn="l" rtl="0">
+              <a:lnSpc>
+                <a:spcPct val="90000"/>
+              </a:lnSpc>
+              <a:spcBef>
+                <a:spcPts val="500"/>
+              </a:spcBef>
+              <a:spcAft>
+                <a:spcPts val="0"/>
+              </a:spcAft>
+              <a:buClr>
+                <a:schemeClr val="dk1"/>
+              </a:buClr>
+              <a:buSzPts val="1800"/>
+              <a:buFont typeface="Arial"/>
+              <a:buChar char="•"/>
+              <a:defRPr sz="1800" b="0" i="0" u="none" strike="noStrike" cap="none">
+                <a:solidFill>
+                  <a:schemeClr val="dk1"/>
+                </a:solidFill>
+                <a:latin typeface="Calibri"/>
+                <a:ea typeface="Calibri"/>
+                <a:cs typeface="Calibri"/>
+                <a:sym typeface="Calibri"/>
+              </a:defRPr>
+            </a:lvl7pPr>
+            <a:lvl8pPr marL="3657600" marR="0" lvl="7" indent="-342900" algn="l" rtl="0">
+              <a:lnSpc>
+                <a:spcPct val="90000"/>
+              </a:lnSpc>
+              <a:spcBef>
+                <a:spcPts val="500"/>
+              </a:spcBef>
+              <a:spcAft>
+                <a:spcPts val="0"/>
+              </a:spcAft>
+              <a:buClr>
+                <a:schemeClr val="dk1"/>
+              </a:buClr>
+              <a:buSzPts val="1800"/>
+              <a:buFont typeface="Arial"/>
+              <a:buChar char="•"/>
+              <a:defRPr sz="1800" b="0" i="0" u="none" strike="noStrike" cap="none">
+                <a:solidFill>
+                  <a:schemeClr val="dk1"/>
+                </a:solidFill>
+                <a:latin typeface="Calibri"/>
+                <a:ea typeface="Calibri"/>
+                <a:cs typeface="Calibri"/>
+                <a:sym typeface="Calibri"/>
+              </a:defRPr>
+            </a:lvl8pPr>
+            <a:lvl9pPr marL="4114800" marR="0" lvl="8" indent="-342900" algn="l" rtl="0">
+              <a:lnSpc>
+                <a:spcPct val="90000"/>
+              </a:lnSpc>
+              <a:spcBef>
+                <a:spcPts val="500"/>
+              </a:spcBef>
+              <a:spcAft>
+                <a:spcPts val="0"/>
+              </a:spcAft>
+              <a:buClr>
+                <a:schemeClr val="dk1"/>
+              </a:buClr>
+              <a:buSzPts val="1800"/>
+              <a:buFont typeface="Arial"/>
+              <a:buChar char="•"/>
+              <a:defRPr sz="1800" b="0" i="0" u="none" strike="noStrike" cap="none">
+                <a:solidFill>
+                  <a:schemeClr val="dk1"/>
+                </a:solidFill>
+                <a:latin typeface="Calibri"/>
+                <a:ea typeface="Calibri"/>
+                <a:cs typeface="Calibri"/>
+                <a:sym typeface="Calibri"/>
+              </a:defRPr>
+            </a:lvl9pPr>
+          </a:lstStyle>
+          <a:p>
+            <a:pPr marL="177800" lvl="0" indent="0" algn="l" rtl="0">
+              <a:lnSpc>
+                <a:spcPct val="90000"/>
+              </a:lnSpc>
+              <a:spcBef>
+                <a:spcPts val="0"/>
+              </a:spcBef>
+              <a:spcAft>
+                <a:spcPts val="0"/>
+              </a:spcAft>
+              <a:buClr>
+                <a:schemeClr val="dk1"/>
+              </a:buClr>
+              <a:buSzPts val="2800"/>
+              <a:buNone/>
+            </a:pPr>
+            <a:r>
+              <a:rPr lang="en-US" sz="1900" dirty="0">
+                <a:latin typeface="Calibri" panose="020F0502020204030204" pitchFamily="34" charset="0"/>
+                <a:cs typeface="Calibri" panose="020F0502020204030204" pitchFamily="34" charset="0"/>
+              </a:rPr>
+              <a:t>Supervised Machine Learning:</a:t>
+            </a:r>
+          </a:p>
+          <a:p>
+            <a:pPr marL="177800" lvl="0" indent="0" algn="l" rtl="0">
+              <a:lnSpc>
+                <a:spcPct val="90000"/>
+              </a:lnSpc>
+              <a:spcBef>
+                <a:spcPts val="0"/>
+              </a:spcBef>
+              <a:spcAft>
+                <a:spcPts val="0"/>
+              </a:spcAft>
+              <a:buClr>
+                <a:schemeClr val="dk1"/>
+              </a:buClr>
+              <a:buSzPts val="2800"/>
+              <a:buNone/>
+            </a:pPr>
+            <a:r>
+              <a:rPr lang="en-US" sz="1900" i="1" u="sng" dirty="0">
+                <a:latin typeface="Calibri" panose="020F0502020204030204" pitchFamily="34" charset="0"/>
+                <a:cs typeface="Calibri" panose="020F0502020204030204" pitchFamily="34" charset="0"/>
+              </a:rPr>
+              <a:t>Logistic Regression</a:t>
+            </a:r>
+          </a:p>
+          <a:p>
+            <a:pPr marL="520700" lvl="0" indent="-342900" algn="l" rtl="0">
+              <a:lnSpc>
+                <a:spcPct val="90000"/>
+              </a:lnSpc>
+              <a:spcBef>
+                <a:spcPts val="0"/>
+              </a:spcBef>
+              <a:spcAft>
+                <a:spcPts val="0"/>
+              </a:spcAft>
+              <a:buClr>
+                <a:schemeClr val="dk1"/>
+              </a:buClr>
+              <a:buSzPts val="2800"/>
+              <a:buFont typeface="Arial" panose="020B0604020202020204" pitchFamily="34" charset="0"/>
+              <a:buChar char="•"/>
+            </a:pPr>
+            <a:r>
+              <a:rPr lang="en-US" sz="1900" dirty="0">
+                <a:latin typeface="Calibri" panose="020F0502020204030204" pitchFamily="34" charset="0"/>
+                <a:cs typeface="Calibri" panose="020F0502020204030204" pitchFamily="34" charset="0"/>
+              </a:rPr>
+              <a:t>Predicts probability of binary outcome, yes and no</a:t>
+            </a:r>
+          </a:p>
+          <a:p>
+            <a:pPr marL="520700" lvl="0" indent="-342900" algn="l" rtl="0">
+              <a:lnSpc>
+                <a:spcPct val="90000"/>
+              </a:lnSpc>
+              <a:spcBef>
+                <a:spcPts val="0"/>
+              </a:spcBef>
+              <a:spcAft>
+                <a:spcPts val="0"/>
+              </a:spcAft>
+              <a:buClr>
+                <a:schemeClr val="dk1"/>
+              </a:buClr>
+              <a:buSzPts val="2800"/>
+              <a:buFont typeface="Arial" panose="020B0604020202020204" pitchFamily="34" charset="0"/>
+              <a:buChar char="•"/>
+            </a:pPr>
+            <a:r>
+              <a:rPr lang="en-US" sz="1900" dirty="0">
+                <a:latin typeface="Calibri" panose="020F0502020204030204" pitchFamily="34" charset="0"/>
+                <a:cs typeface="Calibri" panose="020F0502020204030204" pitchFamily="34" charset="0"/>
+              </a:rPr>
+              <a:t>Observes a data set to find patterns to allow prediction</a:t>
+            </a:r>
+          </a:p>
+          <a:p>
+            <a:pPr marL="1092200" lvl="1" indent="-457200">
+              <a:spcBef>
+                <a:spcPts val="0"/>
+              </a:spcBef>
+              <a:buSzPts val="2800"/>
+              <a:buFont typeface="Arial" panose="020B0604020202020204" pitchFamily="34" charset="0"/>
+              <a:buChar char="•"/>
+            </a:pPr>
+            <a:r>
+              <a:rPr lang="en-US" sz="1600" dirty="0">
+                <a:latin typeface="Calibri" panose="020F0502020204030204" pitchFamily="34" charset="0"/>
+                <a:cs typeface="Calibri" panose="020F0502020204030204" pitchFamily="34" charset="0"/>
+              </a:rPr>
+              <a:t>Accuracy</a:t>
+            </a:r>
+            <a:endParaRPr lang="en-US" sz="1900" dirty="0">
+              <a:latin typeface="Calibri" panose="020F0502020204030204" pitchFamily="34" charset="0"/>
+              <a:cs typeface="Calibri" panose="020F0502020204030204" pitchFamily="34" charset="0"/>
+            </a:endParaRPr>
+          </a:p>
+        </p:txBody>
+      </p:sp>
     </p:spTree>
   </p:cSld>
   <p:clrMapOvr>
@@ -41055,7 +42881,7 @@
         <p:spPr>
           <a:xfrm>
             <a:off x="277535" y="265989"/>
-            <a:ext cx="10515600" cy="906011"/>
+            <a:ext cx="3262078" cy="906011"/>
           </a:xfrm>
           <a:prstGeom prst="rect">
             <a:avLst/>
@@ -41089,7 +42915,7 @@
               <a:buNone/>
             </a:pPr>
             <a:r>
-              <a:rPr lang="en-US" sz="4400">
+              <a:rPr lang="en-US" sz="4400" dirty="0">
                 <a:solidFill>
                   <a:schemeClr val="accent1"/>
                 </a:solidFill>
@@ -41100,7 +42926,7 @@
               </a:rPr>
               <a:t>Visualization: </a:t>
             </a:r>
-            <a:endParaRPr>
+            <a:endParaRPr dirty="0">
               <a:solidFill>
                 <a:schemeClr val="accent1"/>
               </a:solidFill>
@@ -41120,8 +42946,8 @@
         </p:nvSpPr>
         <p:spPr>
           <a:xfrm>
-            <a:off x="755650" y="3198481"/>
-            <a:ext cx="4957763" cy="2682875"/>
+            <a:off x="1274820" y="4077019"/>
+            <a:ext cx="3179194" cy="1697984"/>
           </a:xfrm>
           <a:prstGeom prst="rect">
             <a:avLst/>
@@ -41137,7 +42963,7 @@
           </a:bodyPr>
           <a:lstStyle/>
           <a:p>
-            <a:pPr marL="228600" lvl="0" indent="-50800" algn="l" rtl="0">
+            <a:pPr marL="635000" lvl="0" indent="-457200" algn="l" rtl="0">
               <a:lnSpc>
                 <a:spcPct val="90000"/>
               </a:lnSpc>
@@ -41151,9 +42977,117 @@
                 <a:schemeClr val="dk1"/>
               </a:buClr>
               <a:buSzPts val="2800"/>
-              <a:buNone/>
+              <a:buFont typeface="Arial" panose="020B0604020202020204" pitchFamily="34" charset="0"/>
+              <a:buChar char="•"/>
             </a:pPr>
-            <a:endParaRPr/>
+            <a:r>
+              <a:rPr lang="en-US" sz="2000" dirty="0">
+                <a:latin typeface="Calibri" panose="020F0502020204030204" pitchFamily="34" charset="0"/>
+                <a:cs typeface="Calibri" panose="020F0502020204030204" pitchFamily="34" charset="0"/>
+              </a:rPr>
+              <a:t>JavaScript</a:t>
+            </a:r>
+          </a:p>
+          <a:p>
+            <a:pPr marL="635000" lvl="0" indent="-457200" algn="l" rtl="0">
+              <a:lnSpc>
+                <a:spcPct val="90000"/>
+              </a:lnSpc>
+              <a:spcBef>
+                <a:spcPts val="0"/>
+              </a:spcBef>
+              <a:spcAft>
+                <a:spcPts val="0"/>
+              </a:spcAft>
+              <a:buClr>
+                <a:schemeClr val="dk1"/>
+              </a:buClr>
+              <a:buSzPts val="2800"/>
+              <a:buFont typeface="Arial" panose="020B0604020202020204" pitchFamily="34" charset="0"/>
+              <a:buChar char="•"/>
+            </a:pPr>
+            <a:r>
+              <a:rPr lang="en-US" sz="2000" dirty="0">
+                <a:latin typeface="Calibri" panose="020F0502020204030204" pitchFamily="34" charset="0"/>
+                <a:cs typeface="Calibri" panose="020F0502020204030204" pitchFamily="34" charset="0"/>
+              </a:rPr>
+              <a:t>HTML</a:t>
+            </a:r>
+          </a:p>
+          <a:p>
+            <a:pPr marL="635000" lvl="0" indent="-457200" algn="l" rtl="0">
+              <a:lnSpc>
+                <a:spcPct val="90000"/>
+              </a:lnSpc>
+              <a:spcBef>
+                <a:spcPts val="0"/>
+              </a:spcBef>
+              <a:spcAft>
+                <a:spcPts val="0"/>
+              </a:spcAft>
+              <a:buClr>
+                <a:schemeClr val="dk1"/>
+              </a:buClr>
+              <a:buSzPts val="2800"/>
+              <a:buFont typeface="Arial" panose="020B0604020202020204" pitchFamily="34" charset="0"/>
+              <a:buChar char="•"/>
+            </a:pPr>
+            <a:r>
+              <a:rPr lang="en-US" sz="2000" dirty="0">
+                <a:latin typeface="Calibri" panose="020F0502020204030204" pitchFamily="34" charset="0"/>
+                <a:cs typeface="Calibri" panose="020F0502020204030204" pitchFamily="34" charset="0"/>
+              </a:rPr>
+              <a:t>Flask</a:t>
+            </a:r>
+          </a:p>
+          <a:p>
+            <a:pPr marL="635000" lvl="0" indent="-457200" algn="l" rtl="0">
+              <a:lnSpc>
+                <a:spcPct val="90000"/>
+              </a:lnSpc>
+              <a:spcBef>
+                <a:spcPts val="0"/>
+              </a:spcBef>
+              <a:spcAft>
+                <a:spcPts val="0"/>
+              </a:spcAft>
+              <a:buClr>
+                <a:schemeClr val="dk1"/>
+              </a:buClr>
+              <a:buSzPts val="2800"/>
+              <a:buFont typeface="Arial" panose="020B0604020202020204" pitchFamily="34" charset="0"/>
+              <a:buChar char="•"/>
+            </a:pPr>
+            <a:r>
+              <a:rPr lang="en-US" sz="2000" dirty="0">
+                <a:latin typeface="Calibri" panose="020F0502020204030204" pitchFamily="34" charset="0"/>
+                <a:cs typeface="Calibri" panose="020F0502020204030204" pitchFamily="34" charset="0"/>
+              </a:rPr>
+              <a:t>CSS</a:t>
+            </a:r>
+          </a:p>
+          <a:p>
+            <a:pPr marL="635000" lvl="0" indent="-457200" algn="l" rtl="0">
+              <a:lnSpc>
+                <a:spcPct val="90000"/>
+              </a:lnSpc>
+              <a:spcBef>
+                <a:spcPts val="0"/>
+              </a:spcBef>
+              <a:spcAft>
+                <a:spcPts val="0"/>
+              </a:spcAft>
+              <a:buClr>
+                <a:schemeClr val="dk1"/>
+              </a:buClr>
+              <a:buSzPts val="2800"/>
+              <a:buFont typeface="Arial" panose="020B0604020202020204" pitchFamily="34" charset="0"/>
+              <a:buChar char="•"/>
+            </a:pPr>
+            <a:endParaRPr lang="en-US" sz="2000" dirty="0">
+              <a:latin typeface="Calibri" panose="020F0502020204030204" pitchFamily="34" charset="0"/>
+              <a:cs typeface="Calibri" panose="020F0502020204030204" pitchFamily="34" charset="0"/>
+            </a:endParaRPr>
           </a:p>
         </p:txBody>
       </p:sp>
@@ -41169,8 +43103,8 @@
         </p:nvSpPr>
         <p:spPr>
           <a:xfrm>
-            <a:off x="6490359" y="3178672"/>
-            <a:ext cx="4957763" cy="2682875"/>
+            <a:off x="6490361" y="4186647"/>
+            <a:ext cx="4957763" cy="1180015"/>
           </a:xfrm>
           <a:prstGeom prst="rect">
             <a:avLst/>
@@ -41186,7 +43120,7 @@
           </a:bodyPr>
           <a:lstStyle/>
           <a:p>
-            <a:pPr marL="228600" lvl="0" indent="-50800" algn="l" rtl="0">
+            <a:pPr marL="635000" lvl="0" indent="-457200" algn="l" rtl="0">
               <a:lnSpc>
                 <a:spcPct val="90000"/>
               </a:lnSpc>
@@ -41200,9 +43134,72 @@
                 <a:schemeClr val="dk1"/>
               </a:buClr>
               <a:buSzPts val="2800"/>
-              <a:buNone/>
+              <a:buFont typeface="Arial" panose="020B0604020202020204" pitchFamily="34" charset="0"/>
+              <a:buChar char="•"/>
             </a:pPr>
-            <a:endParaRPr/>
+            <a:r>
+              <a:rPr lang="en-US" sz="2000" dirty="0">
+                <a:latin typeface="Calibri" panose="020F0502020204030204" pitchFamily="34" charset="0"/>
+                <a:cs typeface="Calibri" panose="020F0502020204030204" pitchFamily="34" charset="0"/>
+              </a:rPr>
+              <a:t>Website with multiple pages</a:t>
+            </a:r>
+          </a:p>
+          <a:p>
+            <a:pPr marL="635000" lvl="0" indent="-457200" algn="l" rtl="0">
+              <a:lnSpc>
+                <a:spcPct val="90000"/>
+              </a:lnSpc>
+              <a:spcBef>
+                <a:spcPts val="0"/>
+              </a:spcBef>
+              <a:spcAft>
+                <a:spcPts val="0"/>
+              </a:spcAft>
+              <a:buClr>
+                <a:schemeClr val="dk1"/>
+              </a:buClr>
+              <a:buSzPts val="2800"/>
+              <a:buFont typeface="Arial" panose="020B0604020202020204" pitchFamily="34" charset="0"/>
+              <a:buChar char="•"/>
+            </a:pPr>
+            <a:r>
+              <a:rPr lang="en-US" sz="2000" dirty="0">
+                <a:latin typeface="Calibri" panose="020F0502020204030204" pitchFamily="34" charset="0"/>
+                <a:cs typeface="Calibri" panose="020F0502020204030204" pitchFamily="34" charset="0"/>
+              </a:rPr>
+              <a:t>Map having layers to choose</a:t>
+            </a:r>
+          </a:p>
+          <a:p>
+            <a:pPr marL="635000" lvl="0" indent="-457200" algn="l" rtl="0">
+              <a:lnSpc>
+                <a:spcPct val="90000"/>
+              </a:lnSpc>
+              <a:spcBef>
+                <a:spcPts val="0"/>
+              </a:spcBef>
+              <a:spcAft>
+                <a:spcPts val="0"/>
+              </a:spcAft>
+              <a:buClr>
+                <a:schemeClr val="dk1"/>
+              </a:buClr>
+              <a:buSzPts val="2800"/>
+              <a:buFont typeface="Arial" panose="020B0604020202020204" pitchFamily="34" charset="0"/>
+              <a:buChar char="•"/>
+            </a:pPr>
+            <a:r>
+              <a:rPr lang="en-US" sz="2000" dirty="0">
+                <a:latin typeface="Calibri" panose="020F0502020204030204" pitchFamily="34" charset="0"/>
+                <a:cs typeface="Calibri" panose="020F0502020204030204" pitchFamily="34" charset="0"/>
+              </a:rPr>
+              <a:t>Bar chart with drop down menu</a:t>
+            </a:r>
+            <a:endParaRPr sz="2000" dirty="0">
+              <a:latin typeface="Calibri" panose="020F0502020204030204" pitchFamily="34" charset="0"/>
+              <a:cs typeface="Calibri" panose="020F0502020204030204" pitchFamily="34" charset="0"/>
+            </a:endParaRPr>
           </a:p>
         </p:txBody>
       </p:sp>
@@ -42340,6 +44337,676 @@
               <a:cs typeface="Calibri"/>
               <a:sym typeface="Calibri"/>
             </a:endParaRPr>
+          </a:p>
+        </p:txBody>
+      </p:sp>
+      <p:sp>
+        <p:nvSpPr>
+          <p:cNvPr id="2" name="Google Shape;243;p14">
+            <a:extLst>
+              <a:ext uri="{FF2B5EF4-FFF2-40B4-BE49-F238E27FC236}">
+                <a16:creationId xmlns:a16="http://schemas.microsoft.com/office/drawing/2014/main" id="{03C5B56E-BD6E-DC68-0B76-1A962C25CF6E}"/>
+              </a:ext>
+            </a:extLst>
+          </p:cNvPr>
+          <p:cNvSpPr txBox="1"/>
+          <p:nvPr/>
+        </p:nvSpPr>
+        <p:spPr>
+          <a:xfrm>
+            <a:off x="3539613" y="265988"/>
+            <a:ext cx="4438844" cy="906011"/>
+          </a:xfrm>
+          <a:prstGeom prst="rect">
+            <a:avLst/>
+          </a:prstGeom>
+          <a:noFill/>
+          <a:ln>
+            <a:noFill/>
+          </a:ln>
+        </p:spPr>
+        <p:txBody>
+          <a:bodyPr spcFirstLastPara="1" wrap="square" lIns="91425" tIns="45700" rIns="91425" bIns="45700" anchor="ctr" anchorCtr="0">
+            <a:normAutofit/>
+          </a:bodyPr>
+          <a:lstStyle/>
+          <a:p>
+            <a:pPr marL="0" marR="0" lvl="0" indent="0" algn="l" rtl="0">
+              <a:lnSpc>
+                <a:spcPct val="90000"/>
+              </a:lnSpc>
+              <a:spcBef>
+                <a:spcPts val="0"/>
+              </a:spcBef>
+              <a:spcAft>
+                <a:spcPts val="0"/>
+              </a:spcAft>
+              <a:buClr>
+                <a:srgbClr val="FFD966"/>
+              </a:buClr>
+              <a:buSzPts val="4400"/>
+              <a:buFont typeface="Calibri"/>
+              <a:buNone/>
+            </a:pPr>
+            <a:r>
+              <a:rPr lang="en-US" sz="4400" dirty="0">
+                <a:solidFill>
+                  <a:schemeClr val="bg2">
+                    <a:lumMod val="75000"/>
+                  </a:schemeClr>
+                </a:solidFill>
+                <a:latin typeface="Calibri"/>
+                <a:ea typeface="Calibri"/>
+                <a:cs typeface="Calibri"/>
+                <a:sym typeface="Calibri"/>
+              </a:rPr>
+              <a:t>HTML Website</a:t>
+            </a:r>
+            <a:endParaRPr dirty="0">
+              <a:solidFill>
+                <a:schemeClr val="bg2">
+                  <a:lumMod val="75000"/>
+                </a:schemeClr>
+              </a:solidFill>
+            </a:endParaRPr>
+          </a:p>
+        </p:txBody>
+      </p:sp>
+      <p:sp>
+        <p:nvSpPr>
+          <p:cNvPr id="3" name="Google Shape;236;p13">
+            <a:extLst>
+              <a:ext uri="{FF2B5EF4-FFF2-40B4-BE49-F238E27FC236}">
+                <a16:creationId xmlns:a16="http://schemas.microsoft.com/office/drawing/2014/main" id="{861E70B7-3D3B-A128-5599-D9392E7D9044}"/>
+              </a:ext>
+            </a:extLst>
+          </p:cNvPr>
+          <p:cNvSpPr txBox="1">
+            <a:spLocks/>
+          </p:cNvSpPr>
+          <p:nvPr/>
+        </p:nvSpPr>
+        <p:spPr>
+          <a:xfrm>
+            <a:off x="478666" y="3198482"/>
+            <a:ext cx="5484729" cy="651624"/>
+          </a:xfrm>
+          <a:prstGeom prst="rect">
+            <a:avLst/>
+          </a:prstGeom>
+          <a:noFill/>
+          <a:ln>
+            <a:noFill/>
+          </a:ln>
+        </p:spPr>
+        <p:txBody>
+          <a:bodyPr spcFirstLastPara="1" wrap="square" lIns="91425" tIns="45700" rIns="91425" bIns="45700" anchor="t" anchorCtr="0">
+            <a:noAutofit/>
+          </a:bodyPr>
+          <a:lstStyle>
+            <a:defPPr marR="0" lvl="0" algn="l" rtl="0">
+              <a:lnSpc>
+                <a:spcPct val="100000"/>
+              </a:lnSpc>
+              <a:spcBef>
+                <a:spcPts val="0"/>
+              </a:spcBef>
+              <a:spcAft>
+                <a:spcPts val="0"/>
+              </a:spcAft>
+            </a:defPPr>
+            <a:lvl1pPr marL="457200" marR="0" lvl="0" indent="-406400" algn="l" rtl="0">
+              <a:lnSpc>
+                <a:spcPct val="90000"/>
+              </a:lnSpc>
+              <a:spcBef>
+                <a:spcPts val="1000"/>
+              </a:spcBef>
+              <a:spcAft>
+                <a:spcPts val="0"/>
+              </a:spcAft>
+              <a:buClr>
+                <a:schemeClr val="dk1"/>
+              </a:buClr>
+              <a:buSzPts val="2800"/>
+              <a:buFont typeface="Arial"/>
+              <a:buChar char="•"/>
+              <a:defRPr sz="2800" b="0" i="0" u="none" strike="noStrike" cap="none">
+                <a:solidFill>
+                  <a:schemeClr val="dk1"/>
+                </a:solidFill>
+                <a:latin typeface="Calibri"/>
+                <a:ea typeface="Calibri"/>
+                <a:cs typeface="Calibri"/>
+                <a:sym typeface="Calibri"/>
+              </a:defRPr>
+            </a:lvl1pPr>
+            <a:lvl2pPr marL="914400" marR="0" lvl="1" indent="-381000" algn="l" rtl="0">
+              <a:lnSpc>
+                <a:spcPct val="90000"/>
+              </a:lnSpc>
+              <a:spcBef>
+                <a:spcPts val="500"/>
+              </a:spcBef>
+              <a:spcAft>
+                <a:spcPts val="0"/>
+              </a:spcAft>
+              <a:buClr>
+                <a:schemeClr val="dk1"/>
+              </a:buClr>
+              <a:buSzPts val="2400"/>
+              <a:buFont typeface="Arial"/>
+              <a:buChar char="•"/>
+              <a:defRPr sz="2400" b="0" i="0" u="none" strike="noStrike" cap="none">
+                <a:solidFill>
+                  <a:schemeClr val="dk1"/>
+                </a:solidFill>
+                <a:latin typeface="Calibri"/>
+                <a:ea typeface="Calibri"/>
+                <a:cs typeface="Calibri"/>
+                <a:sym typeface="Calibri"/>
+              </a:defRPr>
+            </a:lvl2pPr>
+            <a:lvl3pPr marL="1371600" marR="0" lvl="2" indent="-355600" algn="l" rtl="0">
+              <a:lnSpc>
+                <a:spcPct val="90000"/>
+              </a:lnSpc>
+              <a:spcBef>
+                <a:spcPts val="500"/>
+              </a:spcBef>
+              <a:spcAft>
+                <a:spcPts val="0"/>
+              </a:spcAft>
+              <a:buClr>
+                <a:schemeClr val="dk1"/>
+              </a:buClr>
+              <a:buSzPts val="2000"/>
+              <a:buFont typeface="Arial"/>
+              <a:buChar char="•"/>
+              <a:defRPr sz="2000" b="0" i="0" u="none" strike="noStrike" cap="none">
+                <a:solidFill>
+                  <a:schemeClr val="dk1"/>
+                </a:solidFill>
+                <a:latin typeface="Calibri"/>
+                <a:ea typeface="Calibri"/>
+                <a:cs typeface="Calibri"/>
+                <a:sym typeface="Calibri"/>
+              </a:defRPr>
+            </a:lvl3pPr>
+            <a:lvl4pPr marL="1828800" marR="0" lvl="3" indent="-342900" algn="l" rtl="0">
+              <a:lnSpc>
+                <a:spcPct val="90000"/>
+              </a:lnSpc>
+              <a:spcBef>
+                <a:spcPts val="500"/>
+              </a:spcBef>
+              <a:spcAft>
+                <a:spcPts val="0"/>
+              </a:spcAft>
+              <a:buClr>
+                <a:schemeClr val="dk1"/>
+              </a:buClr>
+              <a:buSzPts val="1800"/>
+              <a:buFont typeface="Arial"/>
+              <a:buChar char="•"/>
+              <a:defRPr sz="1800" b="0" i="0" u="none" strike="noStrike" cap="none">
+                <a:solidFill>
+                  <a:schemeClr val="dk1"/>
+                </a:solidFill>
+                <a:latin typeface="Calibri"/>
+                <a:ea typeface="Calibri"/>
+                <a:cs typeface="Calibri"/>
+                <a:sym typeface="Calibri"/>
+              </a:defRPr>
+            </a:lvl4pPr>
+            <a:lvl5pPr marL="2286000" marR="0" lvl="4" indent="-342900" algn="l" rtl="0">
+              <a:lnSpc>
+                <a:spcPct val="90000"/>
+              </a:lnSpc>
+              <a:spcBef>
+                <a:spcPts val="500"/>
+              </a:spcBef>
+              <a:spcAft>
+                <a:spcPts val="0"/>
+              </a:spcAft>
+              <a:buClr>
+                <a:schemeClr val="dk1"/>
+              </a:buClr>
+              <a:buSzPts val="1800"/>
+              <a:buFont typeface="Arial"/>
+              <a:buChar char="•"/>
+              <a:defRPr sz="1800" b="0" i="0" u="none" strike="noStrike" cap="none">
+                <a:solidFill>
+                  <a:schemeClr val="dk1"/>
+                </a:solidFill>
+                <a:latin typeface="Calibri"/>
+                <a:ea typeface="Calibri"/>
+                <a:cs typeface="Calibri"/>
+                <a:sym typeface="Calibri"/>
+              </a:defRPr>
+            </a:lvl5pPr>
+            <a:lvl6pPr marL="2743200" marR="0" lvl="5" indent="-342900" algn="l" rtl="0">
+              <a:lnSpc>
+                <a:spcPct val="90000"/>
+              </a:lnSpc>
+              <a:spcBef>
+                <a:spcPts val="500"/>
+              </a:spcBef>
+              <a:spcAft>
+                <a:spcPts val="0"/>
+              </a:spcAft>
+              <a:buClr>
+                <a:schemeClr val="dk1"/>
+              </a:buClr>
+              <a:buSzPts val="1800"/>
+              <a:buFont typeface="Arial"/>
+              <a:buChar char="•"/>
+              <a:defRPr sz="1800" b="0" i="0" u="none" strike="noStrike" cap="none">
+                <a:solidFill>
+                  <a:schemeClr val="dk1"/>
+                </a:solidFill>
+                <a:latin typeface="Calibri"/>
+                <a:ea typeface="Calibri"/>
+                <a:cs typeface="Calibri"/>
+                <a:sym typeface="Calibri"/>
+              </a:defRPr>
+            </a:lvl6pPr>
+            <a:lvl7pPr marL="3200400" marR="0" lvl="6" indent="-342900" algn="l" rtl="0">
+              <a:lnSpc>
+                <a:spcPct val="90000"/>
+              </a:lnSpc>
+              <a:spcBef>
+                <a:spcPts val="500"/>
+              </a:spcBef>
+              <a:spcAft>
+                <a:spcPts val="0"/>
+              </a:spcAft>
+              <a:buClr>
+                <a:schemeClr val="dk1"/>
+              </a:buClr>
+              <a:buSzPts val="1800"/>
+              <a:buFont typeface="Arial"/>
+              <a:buChar char="•"/>
+              <a:defRPr sz="1800" b="0" i="0" u="none" strike="noStrike" cap="none">
+                <a:solidFill>
+                  <a:schemeClr val="dk1"/>
+                </a:solidFill>
+                <a:latin typeface="Calibri"/>
+                <a:ea typeface="Calibri"/>
+                <a:cs typeface="Calibri"/>
+                <a:sym typeface="Calibri"/>
+              </a:defRPr>
+            </a:lvl7pPr>
+            <a:lvl8pPr marL="3657600" marR="0" lvl="7" indent="-342900" algn="l" rtl="0">
+              <a:lnSpc>
+                <a:spcPct val="90000"/>
+              </a:lnSpc>
+              <a:spcBef>
+                <a:spcPts val="500"/>
+              </a:spcBef>
+              <a:spcAft>
+                <a:spcPts val="0"/>
+              </a:spcAft>
+              <a:buClr>
+                <a:schemeClr val="dk1"/>
+              </a:buClr>
+              <a:buSzPts val="1800"/>
+              <a:buFont typeface="Arial"/>
+              <a:buChar char="•"/>
+              <a:defRPr sz="1800" b="0" i="0" u="none" strike="noStrike" cap="none">
+                <a:solidFill>
+                  <a:schemeClr val="dk1"/>
+                </a:solidFill>
+                <a:latin typeface="Calibri"/>
+                <a:ea typeface="Calibri"/>
+                <a:cs typeface="Calibri"/>
+                <a:sym typeface="Calibri"/>
+              </a:defRPr>
+            </a:lvl8pPr>
+            <a:lvl9pPr marL="4114800" marR="0" lvl="8" indent="-342900" algn="l" rtl="0">
+              <a:lnSpc>
+                <a:spcPct val="90000"/>
+              </a:lnSpc>
+              <a:spcBef>
+                <a:spcPts val="500"/>
+              </a:spcBef>
+              <a:spcAft>
+                <a:spcPts val="0"/>
+              </a:spcAft>
+              <a:buClr>
+                <a:schemeClr val="dk1"/>
+              </a:buClr>
+              <a:buSzPts val="1800"/>
+              <a:buFont typeface="Arial"/>
+              <a:buChar char="•"/>
+              <a:defRPr sz="1800" b="0" i="0" u="none" strike="noStrike" cap="none">
+                <a:solidFill>
+                  <a:schemeClr val="dk1"/>
+                </a:solidFill>
+                <a:latin typeface="Calibri"/>
+                <a:ea typeface="Calibri"/>
+                <a:cs typeface="Calibri"/>
+                <a:sym typeface="Calibri"/>
+              </a:defRPr>
+            </a:lvl9pPr>
+          </a:lstStyle>
+          <a:p>
+            <a:pPr marL="228600" indent="-50800" algn="ctr">
+              <a:spcBef>
+                <a:spcPts val="0"/>
+              </a:spcBef>
+              <a:buFont typeface="Arial"/>
+              <a:buNone/>
+            </a:pPr>
+            <a:r>
+              <a:rPr lang="en-US" sz="3600" dirty="0">
+                <a:solidFill>
+                  <a:schemeClr val="bg2">
+                    <a:lumMod val="75000"/>
+                  </a:schemeClr>
+                </a:solidFill>
+              </a:rPr>
+              <a:t>Tools used for dashboard</a:t>
+            </a:r>
+          </a:p>
+        </p:txBody>
+      </p:sp>
+      <p:sp>
+        <p:nvSpPr>
+          <p:cNvPr id="4" name="Google Shape;236;p13">
+            <a:extLst>
+              <a:ext uri="{FF2B5EF4-FFF2-40B4-BE49-F238E27FC236}">
+                <a16:creationId xmlns:a16="http://schemas.microsoft.com/office/drawing/2014/main" id="{DB75041C-F3B4-D61D-0EE3-ED7D6D7805E7}"/>
+              </a:ext>
+            </a:extLst>
+          </p:cNvPr>
+          <p:cNvSpPr txBox="1">
+            <a:spLocks/>
+          </p:cNvSpPr>
+          <p:nvPr/>
+        </p:nvSpPr>
+        <p:spPr>
+          <a:xfrm>
+            <a:off x="5963395" y="3198482"/>
+            <a:ext cx="5484729" cy="651624"/>
+          </a:xfrm>
+          <a:prstGeom prst="rect">
+            <a:avLst/>
+          </a:prstGeom>
+          <a:noFill/>
+          <a:ln>
+            <a:noFill/>
+          </a:ln>
+        </p:spPr>
+        <p:txBody>
+          <a:bodyPr spcFirstLastPara="1" wrap="square" lIns="91425" tIns="45700" rIns="91425" bIns="45700" anchor="t" anchorCtr="0">
+            <a:noAutofit/>
+          </a:bodyPr>
+          <a:lstStyle>
+            <a:defPPr marR="0" lvl="0" algn="l" rtl="0">
+              <a:lnSpc>
+                <a:spcPct val="100000"/>
+              </a:lnSpc>
+              <a:spcBef>
+                <a:spcPts val="0"/>
+              </a:spcBef>
+              <a:spcAft>
+                <a:spcPts val="0"/>
+              </a:spcAft>
+            </a:defPPr>
+            <a:lvl1pPr marL="457200" marR="0" lvl="0" indent="-406400" algn="l" rtl="0">
+              <a:lnSpc>
+                <a:spcPct val="90000"/>
+              </a:lnSpc>
+              <a:spcBef>
+                <a:spcPts val="1000"/>
+              </a:spcBef>
+              <a:spcAft>
+                <a:spcPts val="0"/>
+              </a:spcAft>
+              <a:buClr>
+                <a:schemeClr val="dk1"/>
+              </a:buClr>
+              <a:buSzPts val="2800"/>
+              <a:buFont typeface="Arial"/>
+              <a:buChar char="•"/>
+              <a:defRPr sz="2800" b="0" i="0" u="none" strike="noStrike" cap="none">
+                <a:solidFill>
+                  <a:schemeClr val="dk1"/>
+                </a:solidFill>
+                <a:latin typeface="Calibri"/>
+                <a:ea typeface="Calibri"/>
+                <a:cs typeface="Calibri"/>
+                <a:sym typeface="Calibri"/>
+              </a:defRPr>
+            </a:lvl1pPr>
+            <a:lvl2pPr marL="914400" marR="0" lvl="1" indent="-381000" algn="l" rtl="0">
+              <a:lnSpc>
+                <a:spcPct val="90000"/>
+              </a:lnSpc>
+              <a:spcBef>
+                <a:spcPts val="500"/>
+              </a:spcBef>
+              <a:spcAft>
+                <a:spcPts val="0"/>
+              </a:spcAft>
+              <a:buClr>
+                <a:schemeClr val="dk1"/>
+              </a:buClr>
+              <a:buSzPts val="2400"/>
+              <a:buFont typeface="Arial"/>
+              <a:buChar char="•"/>
+              <a:defRPr sz="2400" b="0" i="0" u="none" strike="noStrike" cap="none">
+                <a:solidFill>
+                  <a:schemeClr val="dk1"/>
+                </a:solidFill>
+                <a:latin typeface="Calibri"/>
+                <a:ea typeface="Calibri"/>
+                <a:cs typeface="Calibri"/>
+                <a:sym typeface="Calibri"/>
+              </a:defRPr>
+            </a:lvl2pPr>
+            <a:lvl3pPr marL="1371600" marR="0" lvl="2" indent="-355600" algn="l" rtl="0">
+              <a:lnSpc>
+                <a:spcPct val="90000"/>
+              </a:lnSpc>
+              <a:spcBef>
+                <a:spcPts val="500"/>
+              </a:spcBef>
+              <a:spcAft>
+                <a:spcPts val="0"/>
+              </a:spcAft>
+              <a:buClr>
+                <a:schemeClr val="dk1"/>
+              </a:buClr>
+              <a:buSzPts val="2000"/>
+              <a:buFont typeface="Arial"/>
+              <a:buChar char="•"/>
+              <a:defRPr sz="2000" b="0" i="0" u="none" strike="noStrike" cap="none">
+                <a:solidFill>
+                  <a:schemeClr val="dk1"/>
+                </a:solidFill>
+                <a:latin typeface="Calibri"/>
+                <a:ea typeface="Calibri"/>
+                <a:cs typeface="Calibri"/>
+                <a:sym typeface="Calibri"/>
+              </a:defRPr>
+            </a:lvl3pPr>
+            <a:lvl4pPr marL="1828800" marR="0" lvl="3" indent="-342900" algn="l" rtl="0">
+              <a:lnSpc>
+                <a:spcPct val="90000"/>
+              </a:lnSpc>
+              <a:spcBef>
+                <a:spcPts val="500"/>
+              </a:spcBef>
+              <a:spcAft>
+                <a:spcPts val="0"/>
+              </a:spcAft>
+              <a:buClr>
+                <a:schemeClr val="dk1"/>
+              </a:buClr>
+              <a:buSzPts val="1800"/>
+              <a:buFont typeface="Arial"/>
+              <a:buChar char="•"/>
+              <a:defRPr sz="1800" b="0" i="0" u="none" strike="noStrike" cap="none">
+                <a:solidFill>
+                  <a:schemeClr val="dk1"/>
+                </a:solidFill>
+                <a:latin typeface="Calibri"/>
+                <a:ea typeface="Calibri"/>
+                <a:cs typeface="Calibri"/>
+                <a:sym typeface="Calibri"/>
+              </a:defRPr>
+            </a:lvl4pPr>
+            <a:lvl5pPr marL="2286000" marR="0" lvl="4" indent="-342900" algn="l" rtl="0">
+              <a:lnSpc>
+                <a:spcPct val="90000"/>
+              </a:lnSpc>
+              <a:spcBef>
+                <a:spcPts val="500"/>
+              </a:spcBef>
+              <a:spcAft>
+                <a:spcPts val="0"/>
+              </a:spcAft>
+              <a:buClr>
+                <a:schemeClr val="dk1"/>
+              </a:buClr>
+              <a:buSzPts val="1800"/>
+              <a:buFont typeface="Arial"/>
+              <a:buChar char="•"/>
+              <a:defRPr sz="1800" b="0" i="0" u="none" strike="noStrike" cap="none">
+                <a:solidFill>
+                  <a:schemeClr val="dk1"/>
+                </a:solidFill>
+                <a:latin typeface="Calibri"/>
+                <a:ea typeface="Calibri"/>
+                <a:cs typeface="Calibri"/>
+                <a:sym typeface="Calibri"/>
+              </a:defRPr>
+            </a:lvl5pPr>
+            <a:lvl6pPr marL="2743200" marR="0" lvl="5" indent="-342900" algn="l" rtl="0">
+              <a:lnSpc>
+                <a:spcPct val="90000"/>
+              </a:lnSpc>
+              <a:spcBef>
+                <a:spcPts val="500"/>
+              </a:spcBef>
+              <a:spcAft>
+                <a:spcPts val="0"/>
+              </a:spcAft>
+              <a:buClr>
+                <a:schemeClr val="dk1"/>
+              </a:buClr>
+              <a:buSzPts val="1800"/>
+              <a:buFont typeface="Arial"/>
+              <a:buChar char="•"/>
+              <a:defRPr sz="1800" b="0" i="0" u="none" strike="noStrike" cap="none">
+                <a:solidFill>
+                  <a:schemeClr val="dk1"/>
+                </a:solidFill>
+                <a:latin typeface="Calibri"/>
+                <a:ea typeface="Calibri"/>
+                <a:cs typeface="Calibri"/>
+                <a:sym typeface="Calibri"/>
+              </a:defRPr>
+            </a:lvl6pPr>
+            <a:lvl7pPr marL="3200400" marR="0" lvl="6" indent="-342900" algn="l" rtl="0">
+              <a:lnSpc>
+                <a:spcPct val="90000"/>
+              </a:lnSpc>
+              <a:spcBef>
+                <a:spcPts val="500"/>
+              </a:spcBef>
+              <a:spcAft>
+                <a:spcPts val="0"/>
+              </a:spcAft>
+              <a:buClr>
+                <a:schemeClr val="dk1"/>
+              </a:buClr>
+              <a:buSzPts val="1800"/>
+              <a:buFont typeface="Arial"/>
+              <a:buChar char="•"/>
+              <a:defRPr sz="1800" b="0" i="0" u="none" strike="noStrike" cap="none">
+                <a:solidFill>
+                  <a:schemeClr val="dk1"/>
+                </a:solidFill>
+                <a:latin typeface="Calibri"/>
+                <a:ea typeface="Calibri"/>
+                <a:cs typeface="Calibri"/>
+                <a:sym typeface="Calibri"/>
+              </a:defRPr>
+            </a:lvl7pPr>
+            <a:lvl8pPr marL="3657600" marR="0" lvl="7" indent="-342900" algn="l" rtl="0">
+              <a:lnSpc>
+                <a:spcPct val="90000"/>
+              </a:lnSpc>
+              <a:spcBef>
+                <a:spcPts val="500"/>
+              </a:spcBef>
+              <a:spcAft>
+                <a:spcPts val="0"/>
+              </a:spcAft>
+              <a:buClr>
+                <a:schemeClr val="dk1"/>
+              </a:buClr>
+              <a:buSzPts val="1800"/>
+              <a:buFont typeface="Arial"/>
+              <a:buChar char="•"/>
+              <a:defRPr sz="1800" b="0" i="0" u="none" strike="noStrike" cap="none">
+                <a:solidFill>
+                  <a:schemeClr val="dk1"/>
+                </a:solidFill>
+                <a:latin typeface="Calibri"/>
+                <a:ea typeface="Calibri"/>
+                <a:cs typeface="Calibri"/>
+                <a:sym typeface="Calibri"/>
+              </a:defRPr>
+            </a:lvl8pPr>
+            <a:lvl9pPr marL="4114800" marR="0" lvl="8" indent="-342900" algn="l" rtl="0">
+              <a:lnSpc>
+                <a:spcPct val="90000"/>
+              </a:lnSpc>
+              <a:spcBef>
+                <a:spcPts val="500"/>
+              </a:spcBef>
+              <a:spcAft>
+                <a:spcPts val="0"/>
+              </a:spcAft>
+              <a:buClr>
+                <a:schemeClr val="dk1"/>
+              </a:buClr>
+              <a:buSzPts val="1800"/>
+              <a:buFont typeface="Arial"/>
+              <a:buChar char="•"/>
+              <a:defRPr sz="1800" b="0" i="0" u="none" strike="noStrike" cap="none">
+                <a:solidFill>
+                  <a:schemeClr val="dk1"/>
+                </a:solidFill>
+                <a:latin typeface="Calibri"/>
+                <a:ea typeface="Calibri"/>
+                <a:cs typeface="Calibri"/>
+                <a:sym typeface="Calibri"/>
+              </a:defRPr>
+            </a:lvl9pPr>
+          </a:lstStyle>
+          <a:p>
+            <a:pPr marL="228600" indent="-50800" algn="ctr">
+              <a:spcBef>
+                <a:spcPts val="0"/>
+              </a:spcBef>
+              <a:buFont typeface="Arial"/>
+              <a:buNone/>
+            </a:pPr>
+            <a:r>
+              <a:rPr lang="en-US" sz="3600" dirty="0">
+                <a:solidFill>
+                  <a:schemeClr val="bg2">
+                    <a:lumMod val="75000"/>
+                  </a:schemeClr>
+                </a:solidFill>
+              </a:rPr>
+              <a:t>Interactive Elements</a:t>
+            </a:r>
           </a:p>
         </p:txBody>
       </p:sp>
@@ -42411,7 +45078,7 @@
               <a:buNone/>
             </a:pPr>
             <a:r>
-              <a:rPr lang="en-US" sz="4400">
+              <a:rPr lang="en-US" sz="4400" dirty="0">
                 <a:solidFill>
                   <a:srgbClr val="6E85D0"/>
                 </a:solidFill>
@@ -42423,7 +45090,7 @@
               <a:t>Conclusion:</a:t>
             </a:r>
             <a:r>
-              <a:rPr lang="en-US" sz="4400">
+              <a:rPr lang="en-US" sz="4400" dirty="0">
                 <a:solidFill>
                   <a:srgbClr val="FFD966"/>
                 </a:solidFill>
@@ -42434,7 +45101,7 @@
               </a:rPr>
               <a:t> </a:t>
             </a:r>
-            <a:endParaRPr/>
+            <a:endParaRPr dirty="0"/>
           </a:p>
         </p:txBody>
       </p:sp>
@@ -42483,7 +45150,7 @@
               <a:buSzPts val="2800"/>
               <a:buNone/>
             </a:pPr>
-            <a:endParaRPr/>
+            <a:endParaRPr dirty="0"/>
           </a:p>
         </p:txBody>
       </p:sp>
@@ -47845,6 +50512,49 @@
               <a:t>FINAL PROJECT PIPELINE</a:t>
             </a:r>
             <a:endParaRPr/>
+          </a:p>
+        </p:txBody>
+      </p:sp>
+      <p:sp>
+        <p:nvSpPr>
+          <p:cNvPr id="2" name="TextBox 1">
+            <a:extLst>
+              <a:ext uri="{FF2B5EF4-FFF2-40B4-BE49-F238E27FC236}">
+                <a16:creationId xmlns:a16="http://schemas.microsoft.com/office/drawing/2014/main" id="{BB004DDD-7EB0-D44E-8D0D-43DDE684A078}"/>
+              </a:ext>
+            </a:extLst>
+          </p:cNvPr>
+          <p:cNvSpPr txBox="1"/>
+          <p:nvPr/>
+        </p:nvSpPr>
+        <p:spPr>
+          <a:xfrm>
+            <a:off x="4826803" y="184456"/>
+            <a:ext cx="3154617" cy="830997"/>
+          </a:xfrm>
+          <a:prstGeom prst="rect">
+            <a:avLst/>
+          </a:prstGeom>
+          <a:noFill/>
+        </p:spPr>
+        <p:txBody>
+          <a:bodyPr wrap="square" rtlCol="0">
+            <a:spAutoFit/>
+          </a:bodyPr>
+          <a:lstStyle/>
+          <a:p>
+            <a:r>
+              <a:rPr lang="en-US" sz="4800" dirty="0">
+                <a:solidFill>
+                  <a:schemeClr val="bg1">
+                    <a:lumMod val="95000"/>
+                  </a:schemeClr>
+                </a:solidFill>
+                <a:latin typeface="Calibri" panose="020F0502020204030204" pitchFamily="34" charset="0"/>
+                <a:cs typeface="Calibri" panose="020F0502020204030204" pitchFamily="34" charset="0"/>
+              </a:rPr>
+              <a:t>Resources</a:t>
+            </a:r>
           </a:p>
         </p:txBody>
       </p:sp>

</xml_diff>